<commit_message>
figure, data, and code updates.
</commit_message>
<xml_diff>
--- a/figure/Figures.pptx
+++ b/figure/Figures.pptx
@@ -4,6 +4,9 @@
   <p:sldMasterIdLst>
     <p:sldMasterId id="2147483648" r:id="rId1"/>
   </p:sldMasterIdLst>
+  <p:notesMasterIdLst>
+    <p:notesMasterId r:id="rId13"/>
+  </p:notesMasterIdLst>
   <p:sldIdLst>
     <p:sldId id="256" r:id="rId2"/>
     <p:sldId id="257" r:id="rId3"/>
@@ -15,6 +18,7 @@
     <p:sldId id="264" r:id="rId9"/>
     <p:sldId id="265" r:id="rId10"/>
     <p:sldId id="266" r:id="rId11"/>
+    <p:sldId id="267" r:id="rId12"/>
   </p:sldIdLst>
   <p:sldSz cx="12192000" cy="6858000"/>
   <p:notesSz cx="6858000" cy="9144000"/>
@@ -203,68 +207,6 @@
           <inkml:channelProperty channel="OE" name="resolution" value="1000" units="1/deg"/>
         </inkml:channelProperties>
       </inkml:inkSource>
-      <inkml:timestamp xml:id="ts0" timeString="2023-12-01T23:50:32.812"/>
-    </inkml:context>
-    <inkml:brush xml:id="br0">
-      <inkml:brushProperty name="width" value="0.05" units="cm"/>
-      <inkml:brushProperty name="height" value="0.05" units="cm"/>
-    </inkml:brush>
-  </inkml:definitions>
-  <inkml:trace contextRef="#ctx0" brushRef="#br0">678 1 1375 0 0,'0'0'11160'0'0,"-4"10"-9421"0"0,3-8-1667 0 0,-10 15 1579 0 0,3-7-1203 0 0,7-9-384 0 0,-14 16 765 0 0,3-7-296 0 0,-4 15 3 0 0,14-22-482 0 0,0 0-44 0 0,0 0 1 0 0,1 2 36 0 0,1-5-47 0 0,0 0 0 0 0,0 0 0 0 0,0 0 0 0 0,0 0 0 0 0,0 0-1 0 0,0 0 1 0 0,0 0 0 0 0,0 0 0 0 0,0 0 0 0 0,0 0 0 0 0,0 0 0 0 0,0 0 0 0 0,0 0 0 0 0,0 0 0 0 0,0 0 0 0 0,0 0 0 0 0,0 0 0 0 0,0 0 0 0 0,0 0 0 0 0,0 0 0 0 0,0 0 0 0 0,0 0-1 0 0,0 0 1 0 0,0 0 0 0 0,0 0 0 0 0,0 0 0 0 0,0 0 0 0 0,0 1 0 0 0,0-1 0 0 0,0 0 0 0 0,0 0 0 0 0,0 0 0 0 0,0 0 0 0 0,0 0 0 0 0,0 0 0 0 0,0 0 0 0 0,1 0 0 0 0,-1 0-1 0 0,0 0 1 0 0,0 0 0 0 0,0 0 0 0 0,0 0 0 0 0,0 0 0 0 0,0 0 0 0 0,0 0 0 0 0,0 0 0 0 0,0 0 0 0 0,0 0 0 0 0,0 0 0 0 0,-10 20 393 0 0,8-17-393 0 0,0 0 0 0 0,0 0 0 0 0,1-1 11 0 0,0-1 32 0 0,0 1-22 0 0,0-1 32 0 0,1-1 1 0 0,-1 3-44 0 0,-1 0-10 0 0,1 0 0 0 0,0 1 0 0 0,0-1 0 0 0,0 0 0 0 0,0 1 0 0 0,0-1 0 0 0,-1 1 0 0 0,1 1 0 0 0,0 0 0 0 0,0-1 0 0 0,-1 7 0 0 0,1-8 0 0 0,0 0 0 0 0,0 1 0 0 0,0-1 0 0 0,1 0 0 0 0,-1 1 0 0 0,0-1 11 0 0,0-2 32 0 0,-17 43 95 0 0,9-23-74 0 0,1-3 0 0 0,-18 22 416 0 0,-12 13 256 0 0,33-48-696 0 0,0-2 18 0 0,-6 14-28 0 0,-3 10 34 0 0,8-16-64 0 0,5-10 0 0 0,-6 9 0 0 0,0 4 64 0 0,-3 2 0 0 0,10-14-64 0 0,-1 2 0 0 0,-12 11 0 0 0,4-2 0 0 0,-5 7 64 0 0,13-17-64 0 0,-1-1 0 0 0,0 1 0 0 0,0 0 0 0 0,0-1 0 0 0,0 1 0 0 0,-7 13 64 0 0,6-14-64 0 0,-1 4 0 0 0,0 1 0 0 0,3-4 0 0 0,-13 25 0 0 0,12-24 0 0 0,1-1 11 0 0,0-2 32 0 0,-16 37-33 0 0,16-35-10 0 0,0 1 0 0 0,0 0 0 0 0,-1 1 0 0 0,1-3 0 0 0,0 0 0 0 0,0 0 0 0 0,0 0 0 0 0,0 1 0 0 0,0-1 0 0 0,0 0 0 0 0,1 1 0 0 0,-1-1 0 0 0,1 5 0 0 0,-8 18 0 0 0,6-22 0 0 0,-1 10 0 0 0,1-10 0 0 0,0 0 0 0 0,0-1 0 0 0,0 1 0 0 0,0 0 0 0 0,1 0 0 0 0,-1-1 0 0 0,-4 9 0 0 0,5-8 0 0 0,0 0 0 0 0,-7 12 0 0 0,9-13 0 0 0,-10 15 0 0 0,3-9 18 0 0,1-3 12 0 0,-7 23-14 0 0,10-25-16 0 0,-8 19 0 0 0,9-19 0 0 0,-14 33 0 0 0,10-28 0 0 0,1 3 0 0 0,-2 12 0 0 0,0-9 0 0 0,4-11 0 0 0,1 1 0 0 0,-1-1 0 0 0,1 1 0 0 0,0-1 0 0 0,-1 6 0 0 0,-5 18 0 0 0,-7 10 0 0 0,8-23 0 0 0,-6 13 0 0 0,8-12 0 0 0,3-12 0 0 0,-1-1 0 0 0,-4 25 0 0 0,4-18 0 0 0,-5 20 0 0 0,5-20 0 0 0,0-2 0 0 0,0 0 0 0 0,-1 1 0 0 0,0-1 0 0 0,-5 9 0 0 0,6-13 0 0 0,2 0 0 0 0,0 2 0 0 0,-1-4 0 0 0,-6 14 0 0 0,6-12 11 0 0,1-3-11 0 0,0 0 1 0 0,0 0-1 0 0,0 0 1 0 0,0 0-1 0 0,0 0 1 0 0,0 0-1 0 0,0-1 1 0 0,0 1-1 0 0,-1 0 1 0 0,1 0-1 0 0,0 0 1 0 0,0 0-1 0 0,0 0 1 0 0,0 0-1 0 0,0 0 1 0 0,0 0-1 0 0,0 0 0 0 0,0 0 1 0 0,0 0-1 0 0,0 0 1 0 0,0 0-1 0 0,0 0 1 0 0,0 0-1 0 0,0 1 1 0 0,0-1-1 0 0,0 0 1 0 0,0 0-1 0 0,0 0 1 0 0,0 0-1 0 0,0 0 1 0 0,0 0-1 0 0,-1 0 1 0 0,1 0-1 0 0,0 0 1 0 0,0 0-1 0 0,0 0 1 0 0,0 0-1 0 0,0 0 1 0 0,0 0-1 0 0,0 0 0 0 0,0 0 1 0 0,0 0-1 0 0,0 0 1 0 0,0 0-1 0 0,0 0 1 0 0,-3 13 14 0 0,2-7-15 0 0,1-3 0 0 0,-1 0 0 0 0,0 0 0 0 0,0 0 0 0 0,0 0 14 0 0,1 0 50 0 0,-2 0-8 0 0,1 0-60 0 0,0 0-55 0 0,1-1 34 0 0,-2 0-4 0 0,2-1 17 0 0,-4 19-1 0 0,4-17 13 0 0,0 1 0 0 0,-1-1 0 0 0,1 0 0 0 0,0 0 0 0 0,0 0 0 0 0,-1 0 0 0 0,1 0 0 0 0,-2 2 0 0 0,2-5 0 0 0,0 15 0 0 0,-1 0 0 0 0,-4 31 0 0 0,1 3 128 0 0,1-29-192 0 0,1-5 75 0 0,0-2-20 0 0,0 1 0 0 0,0 21 0 0 0,0 54 9 0 0,2-83 0 0 0,1-8 0 0 0,-1 3 0 0 0,-3 25 0 0 0,3-23 0 0 0,-1-5 0 0 0,1 1 0 0 0,-1 3 0 0 0,1 24 0 0 0,0-23 0 0 0,1 0 0 0 0,-1 0 0 0 0,0 1 0 0 0,0 0 0 0 0,0 0 0 0 0,0 0 0 0 0,0-1 0 0 0,0 1 0 0 0,0-1 0 0 0,-1 0 0 0 0,1 1 0 0 0,0-1 0 0 0,1 1 0 0 0,-1 0 0 0 0,0 2 0 0 0,1-8 0 0 0,-1 2 0 0 0,-3 30 0 0 0,2-27 0 0 0,1 1 0 0 0,-1-1 0 0 0,1 0 0 0 0,-1 1 0 0 0,1-1 0 0 0,0 1 0 0 0,0-1 0 0 0,-1 0 0 0 0,2 0 0 0 0,-1 0 0 0 0,-1 1 0 0 0,1 29 0 0 0,3-6 0 0 0,-3-23 0 0 0,0 0 0 0 0,0-1 0 0 0,0 1 0 0 0,0-1 0 0 0,1 0 0 0 0,-1 1 0 0 0,1-1 0 0 0,5 42 72 0 0,-4-38-72 0 0,1 21 0 0 0,3-2 0 0 0,-5-22 0 0 0,0 8 0 0 0,-1-9 0 0 0,1 0 0 0 0,-1 0 0 0 0,1 0 0 0 0,0 0 0 0 0,0 0 0 0 0,-1 0 0 0 0,4 4 0 0 0,-4-7 0 0 0,4 12-18 0 0,-1 0 0 0 0,0 0 0 0 0,1 14 0 0 0,-4-23 18 0 0,1 0 0 0 0,0 1 0 0 0,1-2 0 0 0,-1 0 0 0 0,0 0 0 0 0,0 0 0 0 0,0 1 0 0 0,0-1 0 0 0,0 0 0 0 0,0 0 0 0 0,0 1 0 0 0,0 2 0 0 0,4 18 0 0 0,-4-20 0 0 0,1 0 0 0 0,-1 0 0 0 0,7 18 0 0 0,2 7 0 0 0,-9-24 0 0 0,0-1 0 0 0,0 5 0 0 0,0-4 0 0 0,1 1 0 0 0,-1-1 0 0 0,0 0 0 0 0,1 0 0 0 0,3 5 0 0 0,13 26 0 0 0,10 17 0 0 0,-19-34 0 0 0,-7-13 0 0 0,0 1 0 0 0,0-2 0 0 0,1 1 0 0 0,0 0 0 0 0,4 5 0 0 0,4 3 0 0 0,-9-11 0 0 0,0 0 0 0 0,0 0 0 0 0,0 1 0 0 0,0-1 0 0 0,0 1 0 0 0,-1-1 0 0 0,1 1 0 0 0,-1 0 0 0 0,2 4 0 0 0,-2-3 0 0 0,1-1 0 0 0,8 16 0 0 0,0-3 0 0 0,10 18 0 0 0,-12-22 0 0 0,6 4 0 0 0,0 6 0 0 0,-12-18 0 0 0,-1-3 0 0 0,0-1 0 0 0,-1 0 0 0 0,0 0 0 0 0,0 0 0 0 0,0 0 0 0 0,0 0 0 0 0,0 0 0 0 0,0 0 0 0 0,0 0 0 0 0,0 0 0 0 0,0 0 0 0 0,0 0 0 0 0,0 0 0 0 0,0 0 0 0 0,0 0 0 0 0,0 0 0 0 0,0 0 0 0 0,0 0 0 0 0,0 0 0 0 0,0 0 0 0 0,0 0 0 0 0,0 0 0 0 0,0 0 0 0 0,0 0 0 0 0,0 0 0 0 0,0 0 0 0 0,0 0 0 0 0,1 0 0 0 0,-1 0 0 0 0,0 0 0 0 0,0 0 0 0 0,0 0 0 0 0,0 0 0 0 0,0 0 0 0 0,0 0 0 0 0,0 0 0 0 0,0-1 0 0 0,0 1 0 0 0,0 0 0 0 0,0 0 0 0 0,0 0 0 0 0,0 0 0 0 0,0 0 0 0 0,0 0 0 0 0,0 0 0 0 0,0 0 0 0 0,0 0 0 0 0,0 0 0 0 0,0 0 0 0 0,0 0 0 0 0,0 0 0 0 0,0 0 0 0 0,0 0 0 0 0,0 0 0 0 0,0 0 0 0 0,0 0 0 0 0,0 0 0 0 0,0 0 0 0 0,18 16 0 0 0,-17-15 0 0 0,10 10 0 0 0,-8-9 0 0 0,1 0 0 0 0,0 0 0 0 0,0 0 0 0 0,-1 0 0 0 0,12 5 64 0 0,-1 0-64 0 0,-12-6 0 0 0,30 21 0 0 0,-29-20 0 0 0,23 8 0 0 0,-21-8 0 0 0,19 8 0 0 0,27 9 64 0 0,-50-18-64 0 0,2 3 0 0 0,14 1 0 0 0,-13-5 0 0 0,-1 1 0 0 0,0-1 0 0 0,0 0 12 0 0,-2 0 112 0 0,-1 0-60 0 0,3 0-22 0 0,-2 0-97 0 0,-1 0-26 0 0,3 0 63 0 0,1 1 18 0 0,0-1 0 0 0,0 1 0 0 0,0 0 0 0 0,0-1 0 0 0,1 1 0 0 0,-1 0 0 0 0,0 0 0 0 0,0-1 0 0 0,1-1 0 0 0,-1 1 0 0 0,0 1 0 0 0,0-1 0 0 0,0 2 0 0 0,0-1 0 0 0,0 0 0 0 0,0-1 0 0 0,-1 1 0 0 0,1-1 11 0 0,-3 1 32 0 0,1 0-33 0 0,1 1-10 0 0,2 1 0 0 0,-6-3 0 0 0,24 6 0 0 0,-20-6 0 0 0,1 0 0 0 0,-2 0-12 0 0,-1 0-36 0 0,2-1 36 0 0,0 1 12 0 0,0 2 0 0 0,0-1 0 0 0,-1 1 11 0 0,-2-1 32 0 0,2 0-1477 0 0</inkml:trace>
-</inkml:ink>
-</file>
-
-<file path=ppt/ink/ink101.xml><?xml version="1.0" encoding="utf-8"?>
-<inkml:ink xmlns:inkml="http://www.w3.org/2003/InkML">
-  <inkml:definitions>
-    <inkml:context xml:id="ctx0">
-      <inkml:inkSource xml:id="inkSrc0">
-        <inkml:traceFormat>
-          <inkml:channel name="X" type="integer" min="-2.14748E9" max="2.14748E9" units="cm"/>
-          <inkml:channel name="Y" type="integer" min="-2.14748E9" max="2.14748E9" units="cm"/>
-          <inkml:channel name="F" type="integer" max="32767" units="dev"/>
-          <inkml:channel name="OA" type="integer" max="360" units="deg"/>
-          <inkml:channel name="OE" type="integer" max="90" units="deg"/>
-        </inkml:traceFormat>
-        <inkml:channelProperties>
-          <inkml:channelProperty channel="X" name="resolution" value="1000" units="1/cm"/>
-          <inkml:channelProperty channel="Y" name="resolution" value="1000" units="1/cm"/>
-          <inkml:channelProperty channel="F" name="resolution" value="0" units="1/dev"/>
-          <inkml:channelProperty channel="OA" name="resolution" value="1000" units="1/deg"/>
-          <inkml:channelProperty channel="OE" name="resolution" value="1000" units="1/deg"/>
-        </inkml:channelProperties>
-      </inkml:inkSource>
-      <inkml:timestamp xml:id="ts0" timeString="2023-12-01T23:53:45.712"/>
-    </inkml:context>
-    <inkml:brush xml:id="br0">
-      <inkml:brushProperty name="width" value="0.05" units="cm"/>
-      <inkml:brushProperty name="height" value="0.05" units="cm"/>
-    </inkml:brush>
-  </inkml:definitions>
-  <inkml:trace contextRef="#ctx0" brushRef="#br0">637 1 3623 0 0,'0'0'7784'0'0,"-5"18"-6840"0"0,2-13-773 0 0,0 0 1 0 0,0 0-1 0 0,1 0 0 0 0,0 0 0 0 0,0 0 0 0 0,1 1 0 0 0,-2 5 1 0 0,-7 19 658 0 0,-9 7-154 0 0,3-5 161 0 0,-19 49 0 0 0,28-64-747 0 0,-15 25 0 0 0,15-30-33 0 0,1 0 0 0 0,0 1 1 0 0,0 0-1 0 0,-7 26 0 0 0,11-29-19 0 0,-1-1 0 0 0,0 0 1 0 0,-6 13-1 0 0,-7 14 17 0 0,-10 54-55 0 0,22-78 0 0 0,-1 0 0 0 0,-1-1 0 0 0,-12 22 0 0 0,-21 48 0 0 0,29-59 0 0 0,-44 95 0 0 0,17-44 64 0 0,18-33-64 0 0,9-21 0 0 0,2 0 0 0 0,0 0 0 0 0,-9 33 0 0 0,14-38 0 0 0,-2 0 0 0 0,-7 19 0 0 0,0-1 0 0 0,11-29 0 0 0,-6 14 41 0 0,-16 26-1 0 0,10-19 7 0 0,-12 16-47 0 0,23-37 0 0 0,-1 4 0 0 0,0 0 0 0 0,0 0 0 0 0,0 0 0 0 0,1 1 0 0 0,-3 13 0 0 0,1-3 0 0 0,1 0 0 0 0,-2 26 0 0 0,-4 80 0 0 0,4-8 0 0 0,1-16 0 0 0,2-46-1 0 0,-4 41 194 0 0,1-46-129 0 0,4-39-30 0 0,-1-1 5 0 0,1-1 1 0 0,1 0 0 0 0,0 17-1 0 0,-1-3-39 0 0,0-14 0 0 0,1 0 0 0 0,1 15 0 0 0,2 52 64 0 0,1-15 0 0 0,0-33-64 0 0,-2-13 32 0 0,0 24 0 0 0,2-16-32 0 0,-3-16 9 0 0,0 0 0 0 0,0 0 1 0 0,0 0-1 0 0,-1 0 1 0 0,0 0-1 0 0,0 0 0 0 0,-1 7 1 0 0,1 36 118 0 0,1-12-21 0 0,2 5-97 0 0,-2-39-10 0 0,-1 0 0 0 0,8 29 41 0 0,0-9-18 0 0,-2-1-25 0 0,10 23 15 0 0,-10-31 45 0 0,5 15-63 0 0,-10-26 5 0 0,11 40-5 0 0,-2-12 74 0 0,-6-11-69 0 0,-1-6 22 0 0,1 1-1 0 0,7 18 0 0 0,-5 12 43 0 0,-2-21 0 0 0,9 60-64 0 0,-11-72 0 0 0,7 46 54 0 0,-9-56-44 0 0,0 1-10 0 0,0 0 0 0 0,0-1 0 0 0,0 0 0 0 0,0 1 0 0 0,0-1 0 0 0,0 0 0 0 0,1 1 0 0 0,-1-1 0 0 0,1 0 0 0 0,0 4 0 0 0,2 1 0 0 0,-2 3 36 0 0,7 46 120 0 0,-5-38-96 0 0,6 23 72 0 0,-2-4-68 0 0,-3-24-66 0 0,-2-9 13 0 0,-1 1 0 0 0,1 0 0 0 0,-1 0 0 0 0,0 1 0 0 0,1 5 0 0 0,-1-8-11 0 0,11 47 64 0 0,-10-42-64 0 0,-1-4 0 0 0,0 0 0 0 0,0 0 0 0 0,0 0 0 0 0,0 0 0 0 0,1 0 0 0 0,0 0 0 0 0,0 0 0 0 0,3 3 0 0 0,14 31 37 0 0,-3-2-10 0 0,-8-19-27 0 0,10 14 0 0 0,-16-29 11 0 0,1 3 6 0 0,1-1 0 0 0,-1 1-1 0 0,0-1 1 0 0,-1 1 0 0 0,1 0 0 0 0,-1 0 0 0 0,2 6 0 0 0,-1-4 19 0 0,-2-4-26 0 0,7 18-12 0 0,0 4 15 0 0,-9-20 38 0 0,2-2-32 0 0,0 0 1 0 0,-1 0 0 0 0,1 0 0 0 0,0 0 0 0 0,1 0-1 0 0,1 3 1 0 0,5 11 44 0 0,0 9 0 0 0,-7-23-64 0 0,0 0 0 0 0,-1 0 0 0 0,1-1 0 0 0,-1 1 0 0 0,4 38 64 0 0,0-17-64 0 0,-3-22 11 0 0,1 4 22 0 0,-3 16-13 0 0,1-19-20 0 0,-1 0 0 0 0,-1 3 0 0 0,1-1 0 0 0,4 15 0 0 0,1-6 0 0 0,-3-9 0 0 0,0 1 0 0 0,-1 0 0 0 0,1-1 0 0 0,-1 1 0 0 0,-1 10 0 0 0,1-1 64 0 0,1-12-64 0 0,0-1 0 0 0,-1 1 0 0 0,0 0 0 0 0,1 0 0 0 0,-2 18 0 0 0,1-13 0 0 0,-1 0 0 0 0,1 0 0 0 0,1 0 0 0 0,2 11 0 0 0,-2-8 0 0 0,0-8 0 0 0,-1 0 0 0 0,12 63 11 0 0,-6-13-22 0 0,-3-39 11 0 0,0-1 0 0 0,-1 0 0 0 0,0 18 0 0 0,0-12 24 0 0,2 23 70 0 0,-3-39-94 0 0,0 9-54 0 0,-1-7 42 0 0,1 0 1 0 0,-1 1 0 0 0,1-1-1 0 0,1 0 1 0 0,-1 0 0 0 0,3 6-1 0 0,-3-9 9 0 0,11 53 54 0 0,5 32-51 0 0,-17-84 0 0 0,8 50 0 0 0,6 10 0 0 0,-1-16 0 0 0,1 11 0 0 0,-12-54 0 0 0,2 9 0 0 0,0 11 0 0 0,-3-21 0 0 0,0 0 0 0 0,0 0 0 0 0,0 0 0 0 0,0 0 0 0 0,-1 0 0 0 0,1 0 0 0 0,-1 0 0 0 0,1-1 0 0 0,0 1 0 0 0,0 0 0 0 0,0 0 0 0 0,0 0 0 0 0,1 0 0 0 0,-1 0 0 0 0,0 0 0 0 0,1 0 0 0 0,4 11 0 0 0,2 6 0 0 0,15 19 0 0 0,-21-36 0 0 0,-1-1 0 0 0,1 0 0 0 0,0 1 0 0 0,0-1 0 0 0,0 0 0 0 0,0 0 0 0 0,8 10-64 0 0,-9-12 65 0 0,1 0-5 0 0,7 11 61 0 0,-8-9-47 0 0,1 0-10 0 0,-1 1 0 0 0,1-1 0 0 0,-1 1 0 0 0,1 0 0 0 0,-1-1 0 0 0,0 0 0 0 0,1 1 0 0 0,-2-1-13 0 0,0-1-54 0 0</inkml:trace>
-</inkml:ink>
-</file>
-
-<file path=ppt/ink/ink102.xml><?xml version="1.0" encoding="utf-8"?>
-<inkml:ink xmlns:inkml="http://www.w3.org/2003/InkML">
-  <inkml:definitions>
-    <inkml:context xml:id="ctx0">
-      <inkml:inkSource xml:id="inkSrc0">
-        <inkml:traceFormat>
-          <inkml:channel name="X" type="integer" min="-2.14748E9" max="2.14748E9" units="cm"/>
-          <inkml:channel name="Y" type="integer" min="-2.14748E9" max="2.14748E9" units="cm"/>
-          <inkml:channel name="F" type="integer" max="32767" units="dev"/>
-          <inkml:channel name="OA" type="integer" max="360" units="deg"/>
-          <inkml:channel name="OE" type="integer" max="90" units="deg"/>
-        </inkml:traceFormat>
-        <inkml:channelProperties>
-          <inkml:channelProperty channel="X" name="resolution" value="1000" units="1/cm"/>
-          <inkml:channelProperty channel="Y" name="resolution" value="1000" units="1/cm"/>
-          <inkml:channelProperty channel="F" name="resolution" value="0" units="1/dev"/>
-          <inkml:channelProperty channel="OA" name="resolution" value="1000" units="1/deg"/>
-          <inkml:channelProperty channel="OE" name="resolution" value="1000" units="1/deg"/>
-        </inkml:channelProperties>
-      </inkml:inkSource>
       <inkml:timestamp xml:id="ts0" timeString="2023-12-01T23:54:38.992"/>
     </inkml:context>
     <inkml:brush xml:id="br0">
@@ -276,7 +218,7 @@
 </inkml:ink>
 </file>
 
-<file path=ppt/ink/ink103.xml><?xml version="1.0" encoding="utf-8"?>
+<file path=ppt/ink/ink101.xml><?xml version="1.0" encoding="utf-8"?>
 <inkml:ink xmlns:inkml="http://www.w3.org/2003/InkML">
   <inkml:definitions>
     <inkml:context xml:id="ctx0">
@@ -307,7 +249,7 @@
 </inkml:ink>
 </file>
 
-<file path=ppt/ink/ink104.xml><?xml version="1.0" encoding="utf-8"?>
+<file path=ppt/ink/ink102.xml><?xml version="1.0" encoding="utf-8"?>
 <inkml:ink xmlns:inkml="http://www.w3.org/2003/InkML">
   <inkml:definitions>
     <inkml:context xml:id="ctx0">
@@ -338,7 +280,7 @@
 </inkml:ink>
 </file>
 
-<file path=ppt/ink/ink105.xml><?xml version="1.0" encoding="utf-8"?>
+<file path=ppt/ink/ink103.xml><?xml version="1.0" encoding="utf-8"?>
 <inkml:ink xmlns:inkml="http://www.w3.org/2003/InkML">
   <inkml:definitions>
     <inkml:context xml:id="ctx0">
@@ -369,7 +311,7 @@
 </inkml:ink>
 </file>
 
-<file path=ppt/ink/ink106.xml><?xml version="1.0" encoding="utf-8"?>
+<file path=ppt/ink/ink104.xml><?xml version="1.0" encoding="utf-8"?>
 <inkml:ink xmlns:inkml="http://www.w3.org/2003/InkML">
   <inkml:definitions>
     <inkml:context xml:id="ctx0">
@@ -400,7 +342,7 @@
 </inkml:ink>
 </file>
 
-<file path=ppt/ink/ink107.xml><?xml version="1.0" encoding="utf-8"?>
+<file path=ppt/ink/ink105.xml><?xml version="1.0" encoding="utf-8"?>
 <inkml:ink xmlns:inkml="http://www.w3.org/2003/InkML">
   <inkml:definitions>
     <inkml:context xml:id="ctx0">
@@ -431,7 +373,7 @@
 </inkml:ink>
 </file>
 
-<file path=ppt/ink/ink108.xml><?xml version="1.0" encoding="utf-8"?>
+<file path=ppt/ink/ink106.xml><?xml version="1.0" encoding="utf-8"?>
 <inkml:ink xmlns:inkml="http://www.w3.org/2003/InkML">
   <inkml:definitions>
     <inkml:context xml:id="ctx0">
@@ -462,7 +404,7 @@
 </inkml:ink>
 </file>
 
-<file path=ppt/ink/ink109.xml><?xml version="1.0" encoding="utf-8"?>
+<file path=ppt/ink/ink107.xml><?xml version="1.0" encoding="utf-8"?>
 <inkml:ink xmlns:inkml="http://www.w3.org/2003/InkML">
   <inkml:definitions>
     <inkml:context xml:id="ctx0">
@@ -490,6 +432,68 @@
     </inkml:brush>
   </inkml:definitions>
   <inkml:trace contextRef="#ctx0" brushRef="#br0">59 24 5983 0 0,'0'0'9344'0'0,"6"6"-8413"0"0,-4-5-862 0 0,21 13 1305 0 0,-22-14-1148 0 0,-1 0-162 0 0,16 7 467 0 0,-4-1-390 0 0,6 5 51 0 0,-9-3-196 0 0,23 16 326 0 0,-24-18-335 0 0,-1-1 40 0 0,-1 0 0 0 0,1-1 0 0 0,0 1-1 0 0,0-2 1 0 0,0 1 0 0 0,1-1 0 0 0,-1 0 0 0 0,1 0 0 0 0,8 1 0 0 0,1 0 44 0 0,-1 0 0 0 0,1 1 1 0 0,21 10-1 0 0,-35-14-28 0 0,0 1-33 0 0,97 76 118 0 0,-89-72-128 0 0,0-1 0 0 0,0-1 0 0 0,19 6 0 0 0,19 7 0 0 0,32 26 0 0 0,-30-10 22 0 0,-36-22-8 0 0,1-1 0 0 0,21 11 0 0 0,-16-12-14 0 0,-4-2 0 0 0,-1 0 0 0 0,-1 1 0 0 0,28 19 0 0 0,-27-16 0 0 0,-6-5 0 0 0,0 1 0 0 0,-1 1 0 0 0,1 0 0 0 0,9 11 0 0 0,-10-9 0 0 0,1 0 0 0 0,23 15 0 0 0,-9-8 0 0 0,5 5 0 0 0,7 4 0 0 0,-33-24 0 0 0,0 0 0 0 0,-1-1 0 0 0,0 1 0 0 0,15 12 0 0 0,-1-3 0 0 0,-11-7 0 0 0,-1 1 0 0 0,0-1 0 0 0,0 1 0 0 0,0 0 0 0 0,0 0 0 0 0,3 6 0 0 0,-2-4 0 0 0,-3-3 0 0 0,8 19 0 0 0,0-5 0 0 0,7 14 0 0 0,-10-16 0 0 0,0 3 0 0 0,11 25 0 0 0,8 23 0 0 0,-12-33 0 0 0,9 42-72 0 0,-22-73 72 0 0,5 14 0 0 0,-5-13 0 0 0,1 1 0 0 0,-1-1 0 0 0,1 0 0 0 0,0 0 0 0 0,0 0 0 0 0,1-1 0 0 0,2 5 0 0 0,8 16 0 0 0,-8-11 0 0 0,4 4 0 0 0,-3-8 0 0 0,5 24 0 0 0,2 9 0 0 0,-10-29 0 0 0,1 5 0 0 0,-3-15 0 0 0,0 1 0 0 0,14 59 0 0 0,-12-47 0 0 0,11 54 0 0 0,-13-66 0 0 0,2 77 0 0 0,-3-47 0 0 0,-3-1 0 0 0,4-27 0 0 0,-1-4 0 0 0,0 1 0 0 0,0 0 0 0 0,0-1 0 0 0,0 1 0 0 0,-1 0 0 0 0,1-1 0 0 0,-2 6 0 0 0,1-5 0 0 0,-6 35-64 0 0,-4 5 64 0 0,3-20 0 0 0,6-14 0 0 0,0-1 0 0 0,0 0 0 0 0,0 0 0 0 0,-4 7 0 0 0,4-11 0 0 0,-6 29 0 0 0,7-30 0 0 0,0 0 0 0 0,0 1 0 0 0,-1 0 0 0 0,-6 21 0 0 0,-1 6 0 0 0,-1-3 0 0 0,-21 74 310 0 0,29-97-317 0 0,-9 38 88 0 0,10-41-81 0 0,-1 9 0 0 0,-1 0 0 0 0,-7 19 0 0 0,-8 35 118 0 0,-4 12 10 0 0,16-59-101 0 0,-1 6 28 0 0,-13 25 1 0 0,11-31-56 0 0,-8 18 54 0 0,8-18-44 0 0,-37 49 174 0 0,32-47-56 0 0,-28 31 0 0 0,-9-4 0 0 0,40-36-53 0 0,0 1-1 0 0,1 0 0 0 0,-14 22 1 0 0,9-13-53 0 0,-19 17 245 0 0,26-28-118 0 0,-6 3 61 0 0,-7 2 12 0 0,19-13-210 0 0,1-1 36 0 0,-1 1-24 0 0,1-1 24 0 0,-2 1-36 0 0,-3 4-1 0 0,3-5-4 0 0,1 1 1 0 0,0 0 0 0 0,0 0-1 0 0,1 0 1 0 0,-1 0 0 0 0,-2 4-1 0 0,-8 7 46 0 0,-18 15 17 0 0,3-6-12 0 0,2-3 38 0 0,23-17-82 0 0,-1 0 0 0 0,1 0 0 0 0,-1 0 0 0 0,1 0 1 0 0,0 1-1 0 0,-3 2 0 0 0,4-3-14 0 0,3-3 0 0 0,-4 2 0 0 0,-18 17 0 0 0,7-6 0 0 0,11-10 11 0 0,1-1 31 0 0,0 1-31 0 0,-2 1-11 0 0,0-1 21 0 0,-19 17 78 0 0,-2 1-99 0 0,13-10 2 0 0,-8 5 30 0 0,-5 1-13 0 0,20-13-8 0 0,0 0-11 0 0,-8 3 0 0 0,-23 7 64 0 0,-16 1 0 0 0,47-13-64 0 0,1 0 0 0 0,-1 1 0 0 0,1-1 0 0 0,0 0 0 0 0,-2 0 0 0 0,5-2 0 0 0,0 1 0 0 0,0 0 0 0 0,0 0 0 0 0,0 0 0 0 0,0 0 0 0 0,0 0 0 0 0,0 0 0 0 0,0 0 0 0 0,0 0 0 0 0,0 0 0 0 0,0 0 0 0 0,0 0 0 0 0,0 0 0 0 0,0 0 0 0 0,0 0 0 0 0,0 0 0 0 0,0 0 0 0 0,0 0 0 0 0,0 0 0 0 0,0 0 0 0 0,0 0 0 0 0,0 0 0 0 0,0 0 0 0 0,0 0 0 0 0,0 0 0 0 0,0 0 0 0 0,-1 0 0 0 0,1 0 0 0 0,0 0 0 0 0,0 0 0 0 0,0-1 0 0 0,0 1 0 0 0,0 0 0 0 0,0 0 0 0 0,0 0 0 0 0,0 0 0 0 0,0 0 0 0 0,-24 8 0 0 0,20-7 0 0 0,0 0 0 0 0,0 1 0 0 0,-1-1 0 0 0,1 0 0 0 0,0 1 0 0 0,0-1 0 0 0,-40 15 64 0 0,40-15-64 0 0,0 0 0 0 0,0-1 0 0 0,0 1 0 0 0,0 0 0 0 0,0-1 0 0 0,0 1 0 0 0,0 0 0 0 0,1 0 0 0 0,-1 0 0 0 0,0-1 0 0 0,-21 2 0 0 0,24-1 0 0 0,-11 0 0 0 0,-2-2 0 0 0,-14 2 0 0 0,25-1 0 0 0,0 1 0 0 0,-1-1 0 0 0,1 0 0 0 0,-1 0 0 0 0,1 1 0 0 0,-13 2-64 0 0,3 1 64 0 0,13-4 0 0 0,0 0 0 0 0,-1 0 0 0 0,1 0 0 0 0,0 0 0 0 0,0 0 0 0 0,0 0 0 0 0,0 0 0 0 0,0 0 0 0 0,0 0 0 0 0,0 0 0 0 0,0 0 0 0 0,0 0 0 0 0,0 0 0 0 0,0 0 0 0 0,0 0 0 0 0,0 0 0 0 0,0 0 0 0 0,0 0 0 0 0,0 0 0 0 0,0 0 0 0 0,0 0 0 0 0,0 0 0 0 0,0 0 0 0 0,0 0 0 0 0,0 0 0 0 0,0-1 0 0 0,0 1 0 0 0,0 0 0 0 0,0 0 0 0 0,0 0 0 0 0,0 0 0 0 0,0 0 0 0 0,0 0 0 0 0,-1 0 0 0 0,1 0 0 0 0,0 0 0 0 0,0 1 0 0 0,0-1 0 0 0,0 0 0 0 0,-18 10 0 0 0,14-7 0 0 0,0-1 0 0 0,1 1 0 0 0,0-1 13 0 0,2-1 51 0 0,-16 6 47 0 0,16-6-136 0 0,-15 1-82 0 0,12-2 96 0 0,1 0-9 0 0,4 1-10 0 0,-21-2-45 0 0,19 0 59 0 0,0 0-15 0 0,-14 2 14 0 0,11 0 17 0 0,0 0 0 0 0,0-1 0 0 0,0 0 0 0 0,1 1 0 0 0,-1-1 0 0 0,0 0 0 0 0,-6-3-46 0 0,10 2 41 0 0,-1 1 0 0 0,0 0 0 0 0,0-1 1 0 0,1 1-1 0 0,-1 0 0 0 0,0 0 0 0 0,0 0 0 0 0,1-1 1 0 0,-1 1-1 0 0,0 0 0 0 0,0 0 0 0 0,0 0 0 0 0,1 0 1 0 0,-1 1-1 0 0,0-1 0 0 0,0 0 0 0 0,1 0 0 0 0,-1 0 1 0 0,0 0-1 0 0,0 1 0 0 0,0 0 0 0 0,0-1-72 0 0,-2-1-62 0 0</inkml:trace>
+</inkml:ink>
+</file>
+
+<file path=ppt/ink/ink108.xml><?xml version="1.0" encoding="utf-8"?>
+<inkml:ink xmlns:inkml="http://www.w3.org/2003/InkML">
+  <inkml:definitions>
+    <inkml:context xml:id="ctx0">
+      <inkml:inkSource xml:id="inkSrc0">
+        <inkml:traceFormat>
+          <inkml:channel name="X" type="integer" min="-2.14748E9" max="2.14748E9" units="cm"/>
+          <inkml:channel name="Y" type="integer" min="-2.14748E9" max="2.14748E9" units="cm"/>
+          <inkml:channel name="F" type="integer" max="32767" units="dev"/>
+          <inkml:channel name="OA" type="integer" max="360" units="deg"/>
+          <inkml:channel name="OE" type="integer" max="90" units="deg"/>
+        </inkml:traceFormat>
+        <inkml:channelProperties>
+          <inkml:channelProperty channel="X" name="resolution" value="1000" units="1/cm"/>
+          <inkml:channelProperty channel="Y" name="resolution" value="1000" units="1/cm"/>
+          <inkml:channelProperty channel="F" name="resolution" value="0" units="1/dev"/>
+          <inkml:channelProperty channel="OA" name="resolution" value="1000" units="1/deg"/>
+          <inkml:channelProperty channel="OE" name="resolution" value="1000" units="1/deg"/>
+        </inkml:channelProperties>
+      </inkml:inkSource>
+      <inkml:timestamp xml:id="ts0" timeString="2023-12-04T19:04:04.776"/>
+    </inkml:context>
+    <inkml:brush xml:id="br0">
+      <inkml:brushProperty name="width" value="0.05" units="cm"/>
+      <inkml:brushProperty name="height" value="0.05" units="cm"/>
+    </inkml:brush>
+  </inkml:definitions>
+  <inkml:trace contextRef="#ctx0" brushRef="#br0">483 1 919 0 0,'0'0'16240'0'0,"0"0"-16166"0"0,-2 2 31 0 0,2-2-13 0 0,0 0-24 0 0,-1 3-44 0 0,-1 0 31 0 0,2 0 17 0 0,0-2 8 0 0,-1 1 8 0 0,-1 21 742 0 0,1-22-686 0 0,-3 16 474 0 0,1 1-350 0 0,3-17-80 0 0,0 0-103 0 0,-2 9-134 0 0,2-9 114 0 0,-2 7 83 0 0,1-5-95 0 0,-2 15 195 0 0,2-9-126 0 0,0 0-1 0 0,-1 0 0 0 0,0-1 0 0 0,-1 1 0 0 0,0 0 0 0 0,-8 16 0 0 0,3-9-91 0 0,5-12-14 0 0,1 1 1 0 0,0-1-1 0 0,0 1 0 0 0,0-1 1 0 0,-1 7-1 0 0,3-8-5 0 0,-1-2 32 0 0,-6 27-32 0 0,-1-2-12 0 0,3-12 13 0 0,-10 22 1 0 0,5-12 26 0 0,-19 37-39 0 0,27-57 0 0 0,1-2 0 0 0,0-1 0 0 0,0 0 0 0 0,0 0 0 0 0,0 0 0 0 0,1 1 0 0 0,-1-1 0 0 0,0 1 0 0 0,1-1 0 0 0,-1 0 0 0 0,1 1 0 0 0,-1-1 0 0 0,1 1 0 0 0,0-1 0 0 0,0 3 0 0 0,-10 29 0 0 0,2 0 0 0 0,8-29 0 0 0,0 0 0 0 0,-5 34 376 0 0,2 5-752 0 0,3-40 376 0 0,-8 48 0 0 0,3-8 0 0 0,1-8 0 0 0,-9 46 0 0 0,3-24 0 0 0,-5 16 64 0 0,6-34-64 0 0,7-22 0 0 0,-2-1 0 0 0,-9 26 0 0 0,2-5 0 0 0,9-23 0 0 0,-2 13 0 0 0,-9 29 0 0 0,5-23 346 0 0,5-15-448 0 0,-2-1 0 0 0,-9 25 0 0 0,4-17 254 0 0,0 1 1 0 0,-5 30-1 0 0,9-35-28 0 0,-29 134 527 0 0,26-114-462 0 0,-2 19 185 0 0,11-57-351 0 0,-1-1 0 0 0,1 0 0 0 0,-1 1 0 0 0,0-1 0 0 0,0 1 0 0 0,-3 3 0 0 0,-6 19-59 0 0,1 17 273 0 0,-6 59-1 0 0,5-8-213 0 0,5-14-215 0 0,1 33 168 0 0,2 15 24 0 0,3-70 0 0 0,2 106 64 0 0,-3-159-64 0 0,0-1 0 0 0,-2 100 136 0 0,6-19-136 0 0,15 44 0 0 0,-15-107 0 0 0,2 11 0 0 0,6 54 0 0 0,-11-78 0 0 0,7 41 0 0 0,-5-30 0 0 0,-1-12 0 0 0,-1-2 0 0 0,0-1 0 0 0,0 0 0 0 0,-1 0 0 0 0,1 1 0 0 0,-1 8 0 0 0,2 5 32 0 0,7 32 0 0 0,-5-33-16 0 0,-2-1-16 0 0,8 24 0 0 0,-10-39 0 0 0,4 15 0 0 0,16 32 0 0 0,-9-12 0 0 0,-8-15-5 0 0,-2-14 3 0 0,0-1 0 0 0,0 1-1 0 0,1-1 1 0 0,3 11 0 0 0,-3-11 10 0 0,0 0 0 0 0,0 0 0 0 0,-1 1 0 0 0,1-1 0 0 0,-1 0 0 0 0,0 10 0 0 0,3 1 27 0 0,-3-13-22 0 0,0-1 0 0 0,0 1 1 0 0,0-1-1 0 0,0 1 0 0 0,-1 0 1 0 0,1 3-1 0 0,2 25 8 0 0,7 38-1 0 0,-8-62-35 0 0,3 18 21 0 0,-4-17-18 0 0,2 8-87 0 0,1 5 102 0 0,3 14 114 0 0,-7-36-186 0 0,10 39-7 0 0,14 59 212 0 0,-14-40-320 0 0,14 32 377 0 0,-22-78-338 0 0,10 33 89 0 0,-4-22 56 0 0,1 4 0 0 0,-8-24 0 0 0,8 21 0 0 0,2 6 0 0 0,-10-27 0 0 0,1 0 0 0 0,-1 0-11 0 0,1 1-31 0 0,7 15 31 0 0,-7-17 11 0 0,0 1 0 0 0,0 0 0 0 0,0 0 0 0 0,0 0 0 0 0,-1 0 0 0 0,1-1 0 0 0,0 1 0 0 0,1 0 0 0 0,-2 0 0 0 0,1 1 0 0 0,0-1 0 0 0,0-1 0 0 0,0 1 0 0 0,1-1 0 0 0,-1 1 0 0 0,1 0 0 0 0,-1-1 0 0 0,0 0 0 0 0,0 0 0 0 0,1 0 0 0 0,0 0 0 0 0,4 2-20 0 0,11 8-24 0 0,-15-9 44 0 0,-1-1 0 0 0,1 1 0 0 0,0-1 0 0 0,0-1 0 0 0,-1 1 0 0 0,1 0 0 0 0,1 1-32 0 0,12 1 0 0 0,-14-3 29 0 0,-2-1-4 0 0,-1 1-2 0 0,3 0-2 0 0,23 4-12 0 0,-21-5 12 0 0,-1 1 11 0 0,0-1 0 0 0,-2-1-181 0 0,0 1-1 0 0,0 0 1 0 0,0 0 0 0 0,0 0-1 0 0,0 0 1 0 0,0 1 0 0 0,0-1-1 0 0,0 0 1 0 0,0 0 0 0 0,0 1-1 0 0,0-1 1 0 0,0 0 0 0 0,0 1 0 0 0,0-1-1 0 0,0 1 1 0 0,1 0 0 0 0,3 2-3591 0 0</inkml:trace>
+</inkml:ink>
+</file>
+
+<file path=ppt/ink/ink109.xml><?xml version="1.0" encoding="utf-8"?>
+<inkml:ink xmlns:inkml="http://www.w3.org/2003/InkML">
+  <inkml:definitions>
+    <inkml:context xml:id="ctx0">
+      <inkml:inkSource xml:id="inkSrc0">
+        <inkml:traceFormat>
+          <inkml:channel name="X" type="integer" min="-2.14748E9" max="2.14748E9" units="cm"/>
+          <inkml:channel name="Y" type="integer" min="-2.14748E9" max="2.14748E9" units="cm"/>
+          <inkml:channel name="F" type="integer" max="32767" units="dev"/>
+          <inkml:channel name="OA" type="integer" max="360" units="deg"/>
+          <inkml:channel name="OE" type="integer" max="90" units="deg"/>
+        </inkml:traceFormat>
+        <inkml:channelProperties>
+          <inkml:channelProperty channel="X" name="resolution" value="1000" units="1/cm"/>
+          <inkml:channelProperty channel="Y" name="resolution" value="1000" units="1/cm"/>
+          <inkml:channelProperty channel="F" name="resolution" value="0" units="1/dev"/>
+          <inkml:channelProperty channel="OA" name="resolution" value="1000" units="1/deg"/>
+          <inkml:channelProperty channel="OE" name="resolution" value="1000" units="1/deg"/>
+        </inkml:channelProperties>
+      </inkml:inkSource>
+      <inkml:timestamp xml:id="ts0" timeString="2023-12-04T19:04:04.776"/>
+    </inkml:context>
+    <inkml:brush xml:id="br0">
+      <inkml:brushProperty name="width" value="0.05" units="cm"/>
+      <inkml:brushProperty name="height" value="0.05" units="cm"/>
+    </inkml:brush>
+  </inkml:definitions>
+  <inkml:trace contextRef="#ctx0" brushRef="#br0">54 26 919 0 0,'0'0'16240'0'0,"0"0"-16166"0"0,2 2 31 0 0,-2-2-13 0 0,0 0-24 0 0,1 3-44 0 0,1 0 31 0 0,-2 0 17 0 0,0-2 8 0 0,1 1 8 0 0,1 21 742 0 0,-1-22-686 0 0,3 16 474 0 0,-1 1-350 0 0,-3-17-80 0 0,0 0-103 0 0,2 9-134 0 0,-2-9 114 0 0,2 7 83 0 0,-1-5-95 0 0,2 15 195 0 0,-2-9-126 0 0,0 0-1 0 0,1 0 0 0 0,0-1 0 0 0,1 1 0 0 0,0 0 0 0 0,8 16 0 0 0,-3-9-91 0 0,-5-12-14 0 0,-1 1 1 0 0,0-1-1 0 0,0 1 0 0 0,0-1 1 0 0,1 7-1 0 0,-3-8-5 0 0,1-2 32 0 0,6 27-32 0 0,1-2-12 0 0,-3-12 13 0 0,10 22 1 0 0,-5-12 26 0 0,19 37-39 0 0,-27-57 0 0 0,-1-2 0 0 0,0-1 0 0 0,0 0 0 0 0,0 0 0 0 0,0 0 0 0 0,-1 1 0 0 0,1-1 0 0 0,0 1 0 0 0,-1-1 0 0 0,1 0 0 0 0,-1 1 0 0 0,1-1 0 0 0,-1 1 0 0 0,0-1 0 0 0,0 3 0 0 0,10 29 0 0 0,-2 0 0 0 0,-8-29 0 0 0,0 0 0 0 0,5 34 376 0 0,-2 5-752 0 0,-3-40 376 0 0,8 48 0 0 0,-3-8 0 0 0,-1-8 0 0 0,9 46 0 0 0,-3-24 0 0 0,5 16 64 0 0,-6-34-64 0 0,-7-22 0 0 0,2-1 0 0 0,9 26 0 0 0,-2-5 0 0 0,-9-23 0 0 0,2 13 0 0 0,9 29 0 0 0,-5-23 346 0 0,-5-15-448 0 0,2-1 0 0 0,9 25 0 0 0,-4-17 254 0 0,0 1 1 0 0,5 30-1 0 0,-9-35-28 0 0,29 134 527 0 0,-26-114-462 0 0,2 19 185 0 0,-11-57-351 0 0,1-1 0 0 0,-1 0 0 0 0,1 1 0 0 0,0-1 0 0 0,0 1 0 0 0,3 3 0 0 0,6 19-59 0 0,-1 17 273 0 0,6 59-1 0 0,-5-8-213 0 0,-5-14-215 0 0,-1 33 168 0 0,-2 15 24 0 0,-3-70 0 0 0,-2 106 64 0 0,3-159-64 0 0,0-1 0 0 0,2 100 136 0 0,-6-19-136 0 0,-15 44 0 0 0,15-107 0 0 0,-2 11 0 0 0,-6 54 0 0 0,11-78 0 0 0,-7 41 0 0 0,5-30 0 0 0,1-12 0 0 0,1-2 0 0 0,0-1 0 0 0,0 0 0 0 0,1 0 0 0 0,-1 1 0 0 0,1 8 0 0 0,-2 5 32 0 0,-7 32 0 0 0,5-33-16 0 0,2-1-16 0 0,-8 24 0 0 0,10-39 0 0 0,-4 15 0 0 0,-16 32 0 0 0,9-12 0 0 0,8-15-5 0 0,2-14 3 0 0,0-1 0 0 0,0 1-1 0 0,-1-1 1 0 0,-3 11 0 0 0,3-11 10 0 0,0 0 0 0 0,0 0 0 0 0,1 1 0 0 0,-1-1 0 0 0,1 0 0 0 0,0 10 0 0 0,-3 1 27 0 0,3-13-22 0 0,0-1 0 0 0,0 1 1 0 0,0-1-1 0 0,0 1 0 0 0,1 0 1 0 0,-1 3-1 0 0,-2 25 8 0 0,-7 38-1 0 0,8-62-35 0 0,-3 18 21 0 0,4-17-18 0 0,-2 8-87 0 0,-1 5 102 0 0,-3 14 114 0 0,7-36-186 0 0,-10 39-7 0 0,-14 59 212 0 0,14-40-320 0 0,-14 32 377 0 0,22-78-338 0 0,-10 33 89 0 0,4-22 56 0 0,-1 4 0 0 0,8-24 0 0 0,-8 21 0 0 0,-2 6 0 0 0,10-27 0 0 0,-1 0 0 0 0,1 0-11 0 0,-1 1-31 0 0,-7 15 31 0 0,7-17 11 0 0,0 1 0 0 0,0 0 0 0 0,0 0 0 0 0,0 0 0 0 0,1 0 0 0 0,-1-1 0 0 0,0 1 0 0 0,-1 0 0 0 0,2 0 0 0 0,-1 1 0 0 0,0-1 0 0 0,0-1 0 0 0,0 1 0 0 0,-1-1 0 0 0,1 1 0 0 0,-1 0 0 0 0,1-1 0 0 0,0 0 0 0 0,0 0 0 0 0,-1 0 0 0 0,0 0 0 0 0,-4 2-20 0 0,-11 8-24 0 0,15-9 44 0 0,1-1 0 0 0,-1 1 0 0 0,0-1 0 0 0,0-1 0 0 0,1 1 0 0 0,-1 0 0 0 0,-1 1-32 0 0,-12 1 0 0 0,14-3 29 0 0,2-1-4 0 0,1 1-2 0 0,-3 0-2 0 0,-23 4-12 0 0,21-5 12 0 0,1 1 11 0 0,0-1 0 0 0,2-1-181 0 0,0 1-1 0 0,0 0 1 0 0,0 0 0 0 0,0 0-1 0 0,0 0 1 0 0,0 1 0 0 0,0-1-1 0 0,0 0 1 0 0,0 0 0 0 0,0 1-1 0 0,0-1 1 0 0,0 0 0 0 0,0 1 0 0 0,0-1-1 0 0,0 1 1 0 0,-1 0 0 0 0,-3 2-3591 0 0</inkml:trace>
 </inkml:ink>
 </file>
 
@@ -544,68 +548,6 @@
           <inkml:channelProperty channel="OE" name="resolution" value="1000" units="1/deg"/>
         </inkml:channelProperties>
       </inkml:inkSource>
-      <inkml:timestamp xml:id="ts0" timeString="2023-12-04T19:04:04.776"/>
-    </inkml:context>
-    <inkml:brush xml:id="br0">
-      <inkml:brushProperty name="width" value="0.05" units="cm"/>
-      <inkml:brushProperty name="height" value="0.05" units="cm"/>
-    </inkml:brush>
-  </inkml:definitions>
-  <inkml:trace contextRef="#ctx0" brushRef="#br0">483 1 919 0 0,'0'0'16240'0'0,"0"0"-16166"0"0,-2 2 31 0 0,2-2-13 0 0,0 0-24 0 0,-1 3-44 0 0,-1 0 31 0 0,2 0 17 0 0,0-2 8 0 0,-1 1 8 0 0,-1 21 742 0 0,1-22-686 0 0,-3 16 474 0 0,1 1-350 0 0,3-17-80 0 0,0 0-103 0 0,-2 9-134 0 0,2-9 114 0 0,-2 7 83 0 0,1-5-95 0 0,-2 15 195 0 0,2-9-126 0 0,0 0-1 0 0,-1 0 0 0 0,0-1 0 0 0,-1 1 0 0 0,0 0 0 0 0,-8 16 0 0 0,3-9-91 0 0,5-12-14 0 0,1 1 1 0 0,0-1-1 0 0,0 1 0 0 0,0-1 1 0 0,-1 7-1 0 0,3-8-5 0 0,-1-2 32 0 0,-6 27-32 0 0,-1-2-12 0 0,3-12 13 0 0,-10 22 1 0 0,5-12 26 0 0,-19 37-39 0 0,27-57 0 0 0,1-2 0 0 0,0-1 0 0 0,0 0 0 0 0,0 0 0 0 0,0 0 0 0 0,1 1 0 0 0,-1-1 0 0 0,0 1 0 0 0,1-1 0 0 0,-1 0 0 0 0,1 1 0 0 0,-1-1 0 0 0,1 1 0 0 0,0-1 0 0 0,0 3 0 0 0,-10 29 0 0 0,2 0 0 0 0,8-29 0 0 0,0 0 0 0 0,-5 34 376 0 0,2 5-752 0 0,3-40 376 0 0,-8 48 0 0 0,3-8 0 0 0,1-8 0 0 0,-9 46 0 0 0,3-24 0 0 0,-5 16 64 0 0,6-34-64 0 0,7-22 0 0 0,-2-1 0 0 0,-9 26 0 0 0,2-5 0 0 0,9-23 0 0 0,-2 13 0 0 0,-9 29 0 0 0,5-23 346 0 0,5-15-448 0 0,-2-1 0 0 0,-9 25 0 0 0,4-17 254 0 0,0 1 1 0 0,-5 30-1 0 0,9-35-28 0 0,-29 134 527 0 0,26-114-462 0 0,-2 19 185 0 0,11-57-351 0 0,-1-1 0 0 0,1 0 0 0 0,-1 1 0 0 0,0-1 0 0 0,0 1 0 0 0,-3 3 0 0 0,-6 19-59 0 0,1 17 273 0 0,-6 59-1 0 0,5-8-213 0 0,5-14-215 0 0,1 33 168 0 0,2 15 24 0 0,3-70 0 0 0,2 106 64 0 0,-3-159-64 0 0,0-1 0 0 0,-2 100 136 0 0,6-19-136 0 0,15 44 0 0 0,-15-107 0 0 0,2 11 0 0 0,6 54 0 0 0,-11-78 0 0 0,7 41 0 0 0,-5-30 0 0 0,-1-12 0 0 0,-1-2 0 0 0,0-1 0 0 0,0 0 0 0 0,-1 0 0 0 0,1 1 0 0 0,-1 8 0 0 0,2 5 32 0 0,7 32 0 0 0,-5-33-16 0 0,-2-1-16 0 0,8 24 0 0 0,-10-39 0 0 0,4 15 0 0 0,16 32 0 0 0,-9-12 0 0 0,-8-15-5 0 0,-2-14 3 0 0,0-1 0 0 0,0 1-1 0 0,1-1 1 0 0,3 11 0 0 0,-3-11 10 0 0,0 0 0 0 0,0 0 0 0 0,-1 1 0 0 0,1-1 0 0 0,-1 0 0 0 0,0 10 0 0 0,3 1 27 0 0,-3-13-22 0 0,0-1 0 0 0,0 1 1 0 0,0-1-1 0 0,0 1 0 0 0,-1 0 1 0 0,1 3-1 0 0,2 25 8 0 0,7 38-1 0 0,-8-62-35 0 0,3 18 21 0 0,-4-17-18 0 0,2 8-87 0 0,1 5 102 0 0,3 14 114 0 0,-7-36-186 0 0,10 39-7 0 0,14 59 212 0 0,-14-40-320 0 0,14 32 377 0 0,-22-78-338 0 0,10 33 89 0 0,-4-22 56 0 0,1 4 0 0 0,-8-24 0 0 0,8 21 0 0 0,2 6 0 0 0,-10-27 0 0 0,1 0 0 0 0,-1 0-11 0 0,1 1-31 0 0,7 15 31 0 0,-7-17 11 0 0,0 1 0 0 0,0 0 0 0 0,0 0 0 0 0,0 0 0 0 0,-1 0 0 0 0,1-1 0 0 0,0 1 0 0 0,1 0 0 0 0,-2 0 0 0 0,1 1 0 0 0,0-1 0 0 0,0-1 0 0 0,0 1 0 0 0,1-1 0 0 0,-1 1 0 0 0,1 0 0 0 0,-1-1 0 0 0,0 0 0 0 0,0 0 0 0 0,1 0 0 0 0,0 0 0 0 0,4 2-20 0 0,11 8-24 0 0,-15-9 44 0 0,-1-1 0 0 0,1 1 0 0 0,0-1 0 0 0,0-1 0 0 0,-1 1 0 0 0,1 0 0 0 0,1 1-32 0 0,12 1 0 0 0,-14-3 29 0 0,-2-1-4 0 0,-1 1-2 0 0,3 0-2 0 0,23 4-12 0 0,-21-5 12 0 0,-1 1 11 0 0,0-1 0 0 0,-2-1-181 0 0,0 1-1 0 0,0 0 1 0 0,0 0 0 0 0,0 0-1 0 0,0 0 1 0 0,0 1 0 0 0,0-1-1 0 0,0 0 1 0 0,0 0 0 0 0,0 1-1 0 0,0-1 1 0 0,0 0 0 0 0,0 1 0 0 0,0-1-1 0 0,0 1 1 0 0,1 0 0 0 0,3 2-3591 0 0</inkml:trace>
-</inkml:ink>
-</file>
-
-<file path=ppt/ink/ink111.xml><?xml version="1.0" encoding="utf-8"?>
-<inkml:ink xmlns:inkml="http://www.w3.org/2003/InkML">
-  <inkml:definitions>
-    <inkml:context xml:id="ctx0">
-      <inkml:inkSource xml:id="inkSrc0">
-        <inkml:traceFormat>
-          <inkml:channel name="X" type="integer" min="-2.14748E9" max="2.14748E9" units="cm"/>
-          <inkml:channel name="Y" type="integer" min="-2.14748E9" max="2.14748E9" units="cm"/>
-          <inkml:channel name="F" type="integer" max="32767" units="dev"/>
-          <inkml:channel name="OA" type="integer" max="360" units="deg"/>
-          <inkml:channel name="OE" type="integer" max="90" units="deg"/>
-        </inkml:traceFormat>
-        <inkml:channelProperties>
-          <inkml:channelProperty channel="X" name="resolution" value="1000" units="1/cm"/>
-          <inkml:channelProperty channel="Y" name="resolution" value="1000" units="1/cm"/>
-          <inkml:channelProperty channel="F" name="resolution" value="0" units="1/dev"/>
-          <inkml:channelProperty channel="OA" name="resolution" value="1000" units="1/deg"/>
-          <inkml:channelProperty channel="OE" name="resolution" value="1000" units="1/deg"/>
-        </inkml:channelProperties>
-      </inkml:inkSource>
-      <inkml:timestamp xml:id="ts0" timeString="2023-12-04T19:04:04.776"/>
-    </inkml:context>
-    <inkml:brush xml:id="br0">
-      <inkml:brushProperty name="width" value="0.05" units="cm"/>
-      <inkml:brushProperty name="height" value="0.05" units="cm"/>
-    </inkml:brush>
-  </inkml:definitions>
-  <inkml:trace contextRef="#ctx0" brushRef="#br0">54 26 919 0 0,'0'0'16240'0'0,"0"0"-16166"0"0,2 2 31 0 0,-2-2-13 0 0,0 0-24 0 0,1 3-44 0 0,1 0 31 0 0,-2 0 17 0 0,0-2 8 0 0,1 1 8 0 0,1 21 742 0 0,-1-22-686 0 0,3 16 474 0 0,-1 1-350 0 0,-3-17-80 0 0,0 0-103 0 0,2 9-134 0 0,-2-9 114 0 0,2 7 83 0 0,-1-5-95 0 0,2 15 195 0 0,-2-9-126 0 0,0 0-1 0 0,1 0 0 0 0,0-1 0 0 0,1 1 0 0 0,0 0 0 0 0,8 16 0 0 0,-3-9-91 0 0,-5-12-14 0 0,-1 1 1 0 0,0-1-1 0 0,0 1 0 0 0,0-1 1 0 0,1 7-1 0 0,-3-8-5 0 0,1-2 32 0 0,6 27-32 0 0,1-2-12 0 0,-3-12 13 0 0,10 22 1 0 0,-5-12 26 0 0,19 37-39 0 0,-27-57 0 0 0,-1-2 0 0 0,0-1 0 0 0,0 0 0 0 0,0 0 0 0 0,0 0 0 0 0,-1 1 0 0 0,1-1 0 0 0,0 1 0 0 0,-1-1 0 0 0,1 0 0 0 0,-1 1 0 0 0,1-1 0 0 0,-1 1 0 0 0,0-1 0 0 0,0 3 0 0 0,10 29 0 0 0,-2 0 0 0 0,-8-29 0 0 0,0 0 0 0 0,5 34 376 0 0,-2 5-752 0 0,-3-40 376 0 0,8 48 0 0 0,-3-8 0 0 0,-1-8 0 0 0,9 46 0 0 0,-3-24 0 0 0,5 16 64 0 0,-6-34-64 0 0,-7-22 0 0 0,2-1 0 0 0,9 26 0 0 0,-2-5 0 0 0,-9-23 0 0 0,2 13 0 0 0,9 29 0 0 0,-5-23 346 0 0,-5-15-448 0 0,2-1 0 0 0,9 25 0 0 0,-4-17 254 0 0,0 1 1 0 0,5 30-1 0 0,-9-35-28 0 0,29 134 527 0 0,-26-114-462 0 0,2 19 185 0 0,-11-57-351 0 0,1-1 0 0 0,-1 0 0 0 0,1 1 0 0 0,0-1 0 0 0,0 1 0 0 0,3 3 0 0 0,6 19-59 0 0,-1 17 273 0 0,6 59-1 0 0,-5-8-213 0 0,-5-14-215 0 0,-1 33 168 0 0,-2 15 24 0 0,-3-70 0 0 0,-2 106 64 0 0,3-159-64 0 0,0-1 0 0 0,2 100 136 0 0,-6-19-136 0 0,-15 44 0 0 0,15-107 0 0 0,-2 11 0 0 0,-6 54 0 0 0,11-78 0 0 0,-7 41 0 0 0,5-30 0 0 0,1-12 0 0 0,1-2 0 0 0,0-1 0 0 0,0 0 0 0 0,1 0 0 0 0,-1 1 0 0 0,1 8 0 0 0,-2 5 32 0 0,-7 32 0 0 0,5-33-16 0 0,2-1-16 0 0,-8 24 0 0 0,10-39 0 0 0,-4 15 0 0 0,-16 32 0 0 0,9-12 0 0 0,8-15-5 0 0,2-14 3 0 0,0-1 0 0 0,0 1-1 0 0,-1-1 1 0 0,-3 11 0 0 0,3-11 10 0 0,0 0 0 0 0,0 0 0 0 0,1 1 0 0 0,-1-1 0 0 0,1 0 0 0 0,0 10 0 0 0,-3 1 27 0 0,3-13-22 0 0,0-1 0 0 0,0 1 1 0 0,0-1-1 0 0,0 1 0 0 0,1 0 1 0 0,-1 3-1 0 0,-2 25 8 0 0,-7 38-1 0 0,8-62-35 0 0,-3 18 21 0 0,4-17-18 0 0,-2 8-87 0 0,-1 5 102 0 0,-3 14 114 0 0,7-36-186 0 0,-10 39-7 0 0,-14 59 212 0 0,14-40-320 0 0,-14 32 377 0 0,22-78-338 0 0,-10 33 89 0 0,4-22 56 0 0,-1 4 0 0 0,8-24 0 0 0,-8 21 0 0 0,-2 6 0 0 0,10-27 0 0 0,-1 0 0 0 0,1 0-11 0 0,-1 1-31 0 0,-7 15 31 0 0,7-17 11 0 0,0 1 0 0 0,0 0 0 0 0,0 0 0 0 0,0 0 0 0 0,1 0 0 0 0,-1-1 0 0 0,0 1 0 0 0,-1 0 0 0 0,2 0 0 0 0,-1 1 0 0 0,0-1 0 0 0,0-1 0 0 0,0 1 0 0 0,-1-1 0 0 0,1 1 0 0 0,-1 0 0 0 0,1-1 0 0 0,0 0 0 0 0,0 0 0 0 0,-1 0 0 0 0,0 0 0 0 0,-4 2-20 0 0,-11 8-24 0 0,15-9 44 0 0,1-1 0 0 0,-1 1 0 0 0,0-1 0 0 0,0-1 0 0 0,1 1 0 0 0,-1 0 0 0 0,-1 1-32 0 0,-12 1 0 0 0,14-3 29 0 0,2-1-4 0 0,1 1-2 0 0,-3 0-2 0 0,-23 4-12 0 0,21-5 12 0 0,1 1 11 0 0,0-1 0 0 0,2-1-181 0 0,0 1-1 0 0,0 0 1 0 0,0 0 0 0 0,0 0-1 0 0,0 0 1 0 0,0 1 0 0 0,0-1-1 0 0,0 0 1 0 0,0 0 0 0 0,0 1-1 0 0,0-1 1 0 0,0 0 0 0 0,0 1 0 0 0,0-1-1 0 0,0 1 1 0 0,-1 0 0 0 0,-3 2-3591 0 0</inkml:trace>
-</inkml:ink>
-</file>
-
-<file path=ppt/ink/ink112.xml><?xml version="1.0" encoding="utf-8"?>
-<inkml:ink xmlns:inkml="http://www.w3.org/2003/InkML">
-  <inkml:definitions>
-    <inkml:context xml:id="ctx0">
-      <inkml:inkSource xml:id="inkSrc0">
-        <inkml:traceFormat>
-          <inkml:channel name="X" type="integer" min="-2.14748E9" max="2.14748E9" units="cm"/>
-          <inkml:channel name="Y" type="integer" min="-2.14748E9" max="2.14748E9" units="cm"/>
-          <inkml:channel name="F" type="integer" max="32767" units="dev"/>
-          <inkml:channel name="OA" type="integer" max="360" units="deg"/>
-          <inkml:channel name="OE" type="integer" max="90" units="deg"/>
-        </inkml:traceFormat>
-        <inkml:channelProperties>
-          <inkml:channelProperty channel="X" name="resolution" value="1000" units="1/cm"/>
-          <inkml:channelProperty channel="Y" name="resolution" value="1000" units="1/cm"/>
-          <inkml:channelProperty channel="F" name="resolution" value="0" units="1/dev"/>
-          <inkml:channelProperty channel="OA" name="resolution" value="1000" units="1/deg"/>
-          <inkml:channelProperty channel="OE" name="resolution" value="1000" units="1/deg"/>
-        </inkml:channelProperties>
-      </inkml:inkSource>
       <inkml:timestamp xml:id="ts0" timeString="2023-12-04T19:05:20.035"/>
     </inkml:context>
     <inkml:brush xml:id="br0">
@@ -617,7 +559,7 @@
 </inkml:ink>
 </file>
 
-<file path=ppt/ink/ink113.xml><?xml version="1.0" encoding="utf-8"?>
+<file path=ppt/ink/ink111.xml><?xml version="1.0" encoding="utf-8"?>
 <inkml:ink xmlns:inkml="http://www.w3.org/2003/InkML">
   <inkml:definitions>
     <inkml:context xml:id="ctx0">
@@ -648,7 +590,7 @@
 </inkml:ink>
 </file>
 
-<file path=ppt/ink/ink114.xml><?xml version="1.0" encoding="utf-8"?>
+<file path=ppt/ink/ink112.xml><?xml version="1.0" encoding="utf-8"?>
 <inkml:ink xmlns:inkml="http://www.w3.org/2003/InkML">
   <inkml:definitions>
     <inkml:context xml:id="ctx0">
@@ -679,7 +621,7 @@
 </inkml:ink>
 </file>
 
-<file path=ppt/ink/ink115.xml><?xml version="1.0" encoding="utf-8"?>
+<file path=ppt/ink/ink113.xml><?xml version="1.0" encoding="utf-8"?>
 <inkml:ink xmlns:inkml="http://www.w3.org/2003/InkML">
   <inkml:definitions>
     <inkml:context xml:id="ctx0">
@@ -707,6 +649,192 @@
     </inkml:brush>
   </inkml:definitions>
   <inkml:trace contextRef="#ctx0" brushRef="#br0">59 24 5983 0 0,'0'0'9344'0'0,"6"6"-8413"0"0,-4-5-862 0 0,21 13 1305 0 0,-22-14-1148 0 0,-1 0-162 0 0,16 7 467 0 0,-4-1-390 0 0,6 5 51 0 0,-9-3-196 0 0,23 16 326 0 0,-24-18-335 0 0,-1-1 40 0 0,-1 0 0 0 0,1-1 0 0 0,0 1-1 0 0,0-2 1 0 0,0 1 0 0 0,1-1 0 0 0,-1 0 0 0 0,1 0 0 0 0,8 1 0 0 0,1 0 44 0 0,-1 0 0 0 0,1 1 1 0 0,21 10-1 0 0,-35-14-28 0 0,0 1-33 0 0,97 76 118 0 0,-89-72-128 0 0,0-1 0 0 0,0-1 0 0 0,19 6 0 0 0,19 7 0 0 0,32 26 0 0 0,-30-10 22 0 0,-36-22-8 0 0,1-1 0 0 0,21 11 0 0 0,-16-12-14 0 0,-4-2 0 0 0,-1 0 0 0 0,-1 1 0 0 0,28 19 0 0 0,-27-16 0 0 0,-6-5 0 0 0,0 1 0 0 0,-1 1 0 0 0,1 0 0 0 0,9 11 0 0 0,-10-9 0 0 0,1 0 0 0 0,23 15 0 0 0,-9-8 0 0 0,5 5 0 0 0,7 4 0 0 0,-33-24 0 0 0,0 0 0 0 0,-1-1 0 0 0,0 1 0 0 0,15 12 0 0 0,-1-3 0 0 0,-11-7 0 0 0,-1 1 0 0 0,0-1 0 0 0,0 1 0 0 0,0 0 0 0 0,0 0 0 0 0,3 6 0 0 0,-2-4 0 0 0,-3-3 0 0 0,8 19 0 0 0,0-5 0 0 0,7 14 0 0 0,-10-16 0 0 0,0 3 0 0 0,11 25 0 0 0,8 23 0 0 0,-12-33 0 0 0,9 42-72 0 0,-22-73 72 0 0,5 14 0 0 0,-5-13 0 0 0,1 1 0 0 0,-1-1 0 0 0,1 0 0 0 0,0 0 0 0 0,0 0 0 0 0,1-1 0 0 0,2 5 0 0 0,8 16 0 0 0,-8-11 0 0 0,4 4 0 0 0,-3-8 0 0 0,5 24 0 0 0,2 9 0 0 0,-10-29 0 0 0,1 5 0 0 0,-3-15 0 0 0,0 1 0 0 0,14 59 0 0 0,-12-47 0 0 0,11 54 0 0 0,-13-66 0 0 0,2 77 0 0 0,-3-47 0 0 0,-3-1 0 0 0,4-27 0 0 0,-1-4 0 0 0,0 1 0 0 0,0 0 0 0 0,0-1 0 0 0,0 1 0 0 0,-1 0 0 0 0,1-1 0 0 0,-2 6 0 0 0,1-5 0 0 0,-6 35-64 0 0,-4 5 64 0 0,3-20 0 0 0,6-14 0 0 0,0-1 0 0 0,0 0 0 0 0,0 0 0 0 0,-4 7 0 0 0,4-11 0 0 0,-6 29 0 0 0,7-30 0 0 0,0 0 0 0 0,0 1 0 0 0,-1 0 0 0 0,-6 21 0 0 0,-1 6 0 0 0,-1-3 0 0 0,-21 74 310 0 0,29-97-317 0 0,-9 38 88 0 0,10-41-81 0 0,-1 9 0 0 0,-1 0 0 0 0,-7 19 0 0 0,-8 35 118 0 0,-4 12 10 0 0,16-59-101 0 0,-1 6 28 0 0,-13 25 1 0 0,11-31-56 0 0,-8 18 54 0 0,8-18-44 0 0,-37 49 174 0 0,32-47-56 0 0,-28 31 0 0 0,-9-4 0 0 0,40-36-53 0 0,0 1-1 0 0,1 0 0 0 0,-14 22 1 0 0,9-13-53 0 0,-19 17 245 0 0,26-28-118 0 0,-6 3 61 0 0,-7 2 12 0 0,19-13-210 0 0,1-1 36 0 0,-1 1-24 0 0,1-1 24 0 0,-2 1-36 0 0,-3 4-1 0 0,3-5-4 0 0,1 1 1 0 0,0 0 0 0 0,0 0-1 0 0,1 0 1 0 0,-1 0 0 0 0,-2 4-1 0 0,-8 7 46 0 0,-18 15 17 0 0,3-6-12 0 0,2-3 38 0 0,23-17-82 0 0,-1 0 0 0 0,1 0 0 0 0,-1 0 0 0 0,1 0 1 0 0,0 1-1 0 0,-3 2 0 0 0,4-3-14 0 0,3-3 0 0 0,-4 2 0 0 0,-18 17 0 0 0,7-6 0 0 0,11-10 11 0 0,1-1 31 0 0,0 1-31 0 0,-2 1-11 0 0,0-1 21 0 0,-19 17 78 0 0,-2 1-99 0 0,13-10 2 0 0,-8 5 30 0 0,-5 1-13 0 0,20-13-8 0 0,0 0-11 0 0,-8 3 0 0 0,-23 7 64 0 0,-16 1 0 0 0,47-13-64 0 0,1 0 0 0 0,-1 1 0 0 0,1-1 0 0 0,0 0 0 0 0,-2 0 0 0 0,5-2 0 0 0,0 1 0 0 0,0 0 0 0 0,0 0 0 0 0,0 0 0 0 0,0 0 0 0 0,0 0 0 0 0,0 0 0 0 0,0 0 0 0 0,0 0 0 0 0,0 0 0 0 0,0 0 0 0 0,0 0 0 0 0,0 0 0 0 0,0 0 0 0 0,0 0 0 0 0,0 0 0 0 0,0 0 0 0 0,0 0 0 0 0,0 0 0 0 0,0 0 0 0 0,0 0 0 0 0,0 0 0 0 0,0 0 0 0 0,0 0 0 0 0,0 0 0 0 0,0 0 0 0 0,-1 0 0 0 0,1 0 0 0 0,0 0 0 0 0,0 0 0 0 0,0-1 0 0 0,0 1 0 0 0,0 0 0 0 0,0 0 0 0 0,0 0 0 0 0,0 0 0 0 0,0 0 0 0 0,-24 8 0 0 0,20-7 0 0 0,0 0 0 0 0,0 1 0 0 0,-1-1 0 0 0,1 0 0 0 0,0 1 0 0 0,0-1 0 0 0,-40 15 64 0 0,40-15-64 0 0,0 0 0 0 0,0-1 0 0 0,0 1 0 0 0,0 0 0 0 0,0-1 0 0 0,0 1 0 0 0,0 0 0 0 0,1 0 0 0 0,-1 0 0 0 0,0-1 0 0 0,-21 2 0 0 0,24-1 0 0 0,-11 0 0 0 0,-2-2 0 0 0,-14 2 0 0 0,25-1 0 0 0,0 1 0 0 0,-1-1 0 0 0,1 0 0 0 0,-1 0 0 0 0,1 1 0 0 0,-13 2-64 0 0,3 1 64 0 0,13-4 0 0 0,0 0 0 0 0,-1 0 0 0 0,1 0 0 0 0,0 0 0 0 0,0 0 0 0 0,0 0 0 0 0,0 0 0 0 0,0 0 0 0 0,0 0 0 0 0,0 0 0 0 0,0 0 0 0 0,0 0 0 0 0,0 0 0 0 0,0 0 0 0 0,0 0 0 0 0,0 0 0 0 0,0 0 0 0 0,0 0 0 0 0,0 0 0 0 0,0 0 0 0 0,0 0 0 0 0,0 0 0 0 0,0 0 0 0 0,0 0 0 0 0,0 0 0 0 0,0-1 0 0 0,0 1 0 0 0,0 0 0 0 0,0 0 0 0 0,0 0 0 0 0,0 0 0 0 0,0 0 0 0 0,0 0 0 0 0,-1 0 0 0 0,1 0 0 0 0,0 0 0 0 0,0 1 0 0 0,0-1 0 0 0,0 0 0 0 0,-18 10 0 0 0,14-7 0 0 0,0-1 0 0 0,1 1 0 0 0,0-1 13 0 0,2-1 51 0 0,-16 6 47 0 0,16-6-136 0 0,-15 1-82 0 0,12-2 96 0 0,1 0-9 0 0,4 1-10 0 0,-21-2-45 0 0,19 0 59 0 0,0 0-15 0 0,-14 2 14 0 0,11 0 17 0 0,0 0 0 0 0,0-1 0 0 0,0 0 0 0 0,1 1 0 0 0,-1-1 0 0 0,0 0 0 0 0,-6-3-46 0 0,10 2 41 0 0,-1 1 0 0 0,0 0 0 0 0,0-1 1 0 0,1 1-1 0 0,-1 0 0 0 0,0 0 0 0 0,0 0 0 0 0,1-1 1 0 0,-1 1-1 0 0,0 0 0 0 0,0 0 0 0 0,0 0 0 0 0,1 0 1 0 0,-1 1-1 0 0,0-1 0 0 0,0 0 0 0 0,1 0 0 0 0,-1 0 1 0 0,0 0-1 0 0,0 1 0 0 0,0 0 0 0 0,0-1-72 0 0,-2-1-62 0 0</inkml:trace>
+</inkml:ink>
+</file>
+
+<file path=ppt/ink/ink114.xml><?xml version="1.0" encoding="utf-8"?>
+<inkml:ink xmlns:inkml="http://www.w3.org/2003/InkML">
+  <inkml:definitions>
+    <inkml:context xml:id="ctx0">
+      <inkml:inkSource xml:id="inkSrc0">
+        <inkml:traceFormat>
+          <inkml:channel name="X" type="integer" min="-2.14748E9" max="2.14748E9" units="cm"/>
+          <inkml:channel name="Y" type="integer" min="-2.14748E9" max="2.14748E9" units="cm"/>
+          <inkml:channel name="F" type="integer" max="32767" units="dev"/>
+          <inkml:channel name="OA" type="integer" max="360" units="deg"/>
+          <inkml:channel name="OE" type="integer" max="90" units="deg"/>
+        </inkml:traceFormat>
+        <inkml:channelProperties>
+          <inkml:channelProperty channel="X" name="resolution" value="1000" units="1/cm"/>
+          <inkml:channelProperty channel="Y" name="resolution" value="1000" units="1/cm"/>
+          <inkml:channelProperty channel="F" name="resolution" value="0" units="1/dev"/>
+          <inkml:channelProperty channel="OA" name="resolution" value="1000" units="1/deg"/>
+          <inkml:channelProperty channel="OE" name="resolution" value="1000" units="1/deg"/>
+        </inkml:channelProperties>
+      </inkml:inkSource>
+      <inkml:timestamp xml:id="ts0" timeString="2023-11-30T23:51:11.146"/>
+    </inkml:context>
+    <inkml:brush xml:id="br0">
+      <inkml:brushProperty name="width" value="0.05" units="cm"/>
+      <inkml:brushProperty name="height" value="0.05" units="cm"/>
+    </inkml:brush>
+  </inkml:definitions>
+  <inkml:trace contextRef="#ctx0" brushRef="#br0">654 141 3223 0 0,'0'0'440'0'0,"0"-1"639"0"0,8-31 5577 0 0,0 1-3215 0 0,-7 30-2585 0 0,0-4 2048 0 0,3 48-2522 0 0,-3-35-324 0 0,0-7-51 0 0,-1 0-1 0 0,0 1 1 0 0,0-1 0 0 0,1 0-1 0 0,-1 0 1 0 0,0 0-1 0 0,0 0 1 0 0,0 0-1 0 0,0 1 1 0 0,0-1-1 0 0,-1 2 1 0 0,-3 16 69 0 0,0 12 12 0 0,3-19-34 0 0,0 0 1 0 0,-1 0-1 0 0,-5 16 0 0 0,-17 57 508 0 0,21-76-519 0 0,-3 9 109 0 0,-12 27-1 0 0,13-36-125 0 0,-48 87 364 0 0,-2-2 192 0 0,33-54-412 0 0,15-26-132 0 0,-1 0 0 0 0,-7 24 0 0 0,8-20 10 0 0,-10 22 1 0 0,0 0 66 0 0,13-30-73 0 0,0 0 1 0 0,-10 18 0 0 0,-5 11-2 0 0,15-30-12 0 0,0 0 0 0 0,-10 16 0 0 0,7-15-28 0 0,1 1 0 0 0,0 0 0 0 0,-8 21 1 0 0,-15 32 67 0 0,23-54-69 0 0,4-5 0 0 0,0 9 0 0 0,-20 38 0 0 0,20-49 0 0 0,-7 21 0 0 0,5-16 11 0 0,3-5 31 0 0,-2 3-31 0 0,-2 2-11 0 0,-5 6 0 0 0,1 2 0 0 0,9-16 0 0 0,-8 18 0 0 0,-34 65 11 0 0,37-76 45 0 0,4-5-57 0 0,0 0 1 0 0,0-1 0 0 0,0 1 0 0 0,0 0-1 0 0,1 0 1 0 0,-1 0 0 0 0,0 0-1 0 0,0 3 1 0 0,1-1 0 0 0,-8 19 54 0 0,4-17-44 0 0,-4 14-10 0 0,8-14 0 0 0,0-4 0 0 0,0 0 0 0 0,0 0 0 0 0,-1 0 0 0 0,1-1 0 0 0,0 1 0 0 0,-1 0 0 0 0,1-1 0 0 0,-1 1 0 0 0,0 0 0 0 0,0 1 0 0 0,-2 2 0 0 0,-2 7 0 0 0,-4 33 0 0 0,5-8 0 0 0,-2 10-1 0 0,-8 44 119 0 0,10-74-53 0 0,-4 14 89 0 0,2-11-90 0 0,1 1-11 0 0,-10 62 98 0 0,3-20-27 0 0,9-24-7 0 0,1-27-111 0 0,-5 26 74 0 0,4-24-21 0 0,0 11-1 0 0,2 4-58 0 0,1-11 0 0 0,-3-2 0 0 0,3-10 11 0 0,0 21 42 0 0,2-4 0 0 0,3 8-42 0 0,-4-21-11 0 0,-1 12 0 0 0,2-1 0 0 0,5 52 0 0 0,-6-59-4 0 0,-1-13 4 0 0,4 25 57 0 0,1-4 7 0 0,-5-21-59 0 0,1 7 29 0 0,0 0 0 0 0,-1 0 1 0 0,0 9-1 0 0,1-6 40 0 0,5 21 46 0 0,-2-13-109 0 0,-1-6 25 0 0,13 61 67 0 0,-15-68-53 0 0,0-4-48 0 0,5 14 59 0 0,4 14 24 0 0,-7-21-19 0 0,1 1-53 0 0,-1 0-13 0 0,-2-4 0 0 0,1 0 0 0 0,0 0 0 0 0,0-1 0 0 0,1 1 0 0 0,3 5 0 0 0,-5-10 0 0 0,21 52 0 0 0,-14-38 0 0 0,-6-12 0 0 0,2 10 0 0 0,4 7 0 0 0,2 2 0 0 0,3 19 0 0 0,-11-35 9 0 0,1 0-1 0 0,0 0 1 0 0,0 0-1 0 0,0 0 0 0 0,1-1 1 0 0,5 7-1 0 0,3 4-3 0 0,-10-13-5 0 0,8 11 0 0 0,5 15 0 0 0,-3-8 0 0 0,2 1-2 0 0,0-7 15 0 0,-8-8-2 0 0,0 1 1 0 0,1-2 0 0 0,8 8-1 0 0,8 6-4 0 0,3 4 1 0 0,43 33 48 0 0,-39-35-27 0 0,0-3 1 0 0,1 0-1 0 0,64 27 0 0 0,-42-28 9 0 0,59 14-1 0 0,-84-25-9 0 0,63 13 83 0 0,-37-10-47 0 0,-41-8-22 0 0,-2-1 9 0 0,0 0-1 0 0,17 0 0 0 0,11-1-22 0 0,201 7-28 0 0,-225-7 11 0 0,0 0-1 0 0,0-1 1 0 0,0-1 0 0 0,0-1-1 0 0,25-7 1 0 0,-24 5-11 0 0,2-1 0 0 0,24-11 0 0 0,-32 14 0 0 0,-8 3 0 0 0,0-1 0 0 0,0 0 0 0 0,1 1 0 0 0,-1-1 0 0 0,0 0 0 0 0,0 0 0 0 0,0 0 0 0 0,0-1 0 0 0,3-1 0 0 0,12-8 53 0 0,51-39-42 0 0,-49 36-11 0 0,6-8 64 0 0,-2 1-64 0 0,-15 14 0 0 0,13-13 0 0 0,-16 12 0 0 0,-3 4 0 0 0,1 1 0 0 0,-1 1 0 0 0,0-1 0 0 0,1 0 0 0 0,-1 0 0 0 0,4-2 0 0 0,8-8 11 0 0,-13 10 14 0 0,20-15 3 0 0,-7 5-28 0 0,20-22 0 0 0,-19 18 31 0 0,-1-1 1 0 0,0 0-1 0 0,15-30 1 0 0,-21 35-30 0 0,-3 4-2 0 0,16-21 0 0 0,17-29 0 0 0,-5 8 0 0 0,5-17 53 0 0,-31 59-42 0 0,-5 8-8 0 0,0-1-4 0 0,8-14-1 0 0,9-16 2 0 0,-13 24 0 0 0,-4 5 0 0 0,2-10 0 0 0,3-4 0 0 0,7-7 0 0 0,2-12 64 0 0,-13 28-64 0 0,-1-1 0 0 0,1 1 0 0 0,13-38 0 0 0,-13 33 0 0 0,-3 13 0 0 0,6-22 0 0 0,-5 17 0 0 0,1-4 0 0 0,1 0 0 0 0,-1 0 0 0 0,6-11 0 0 0,-5 11 0 0 0,5-42 64 0 0,1-36-64 0 0,-8 53 0 0 0,-1 26 0 0 0,0-20 0 0 0,0-6 0 0 0,0 9 0 0 0,1-9 0 0 0,2 8 0 0 0,-3 16 0 0 0,1-17 0 0 0,-1 17 20 0 0,0 6-12 0 0,-1 0-1 0 0,1-1 0 0 0,0 1 1 0 0,0-1-1 0 0,2-6 0 0 0,-1 8-7 0 0,0 1 0 0 0,0-19 0 0 0,-1-13 0 0 0,0 28 0 0 0,0 0 0 0 0,-4-16 0 0 0,-2-10 64 0 0,4 24-64 0 0,2-5 0 0 0,-4 0 0 0 0,3 9 0 0 0,-1-1 0 0 0,-4-9 0 0 0,-5-24 0 0 0,1 3 0 0 0,9 28 0 0 0,0 4 0 0 0,1 0 0 0 0,-1 0 0 0 0,1 0 0 0 0,-1 0 0 0 0,0 0 0 0 0,0 0 0 0 0,-2-5 0 0 0,-3-9 0 0 0,2 2 0 0 0,-1-10 0 0 0,-12-34 0 0 0,-5 0 64 0 0,19 52-64 0 0,-42-81 0 0 0,42 81 0 0 0,-11-10 0 0 0,12 15 0 0 0,-11-13 0 0 0,9 8 11 0 0,0 0 42 0 0,-1 1 0 0 0,0 0-42 0 0,1-1-11 0 0,0 1 0 0 0,-1-2 3 0 0,-8-12-94 0 0,9 14 91 0 0,-8-22 0 0 0,4 6 0 0 0,4 2 0 0 0,4 15 0 0 0,-1 1 0 0 0,0-1 0 0 0,0 0 0 0 0,0 1 0 0 0,-3-9 0 0 0,3 9 0 0 0,-3-14 0 0 0,3 16-3 0 0,1 1 0 0 0,-1-1 0 0 0,1 0 0 0 0,-1 1 0 0 0,1-1 0 0 0,0 0 0 0 0,0 1 0 0 0,0-1 0 0 0,0-2 0 0 0,0 2-1 0 0,1-1 1 0 0,-1 1-1 0 0,-1 0 0 0 0,1-1 0 0 0,0 1 0 0 0,-1 0 1 0 0,1 0-1 0 0,-2-4 0 0 0,0-1-7 0 0,1 5-31 0 0,-1-9 30 0 0,1 7 12 0 0,0 1 0 0 0,1-1 0 0 0,-1 1 1 0 0,1-1-1 0 0,-1 0 0 0 0,1 1 0 0 0,0-1 0 0 0,1-4 0 0 0,-1-25 0 0 0,0 26 0 0 0,0-1 0 0 0,1-2 0 0 0,-1 9 0 0 0,-6-17 0 0 0,5 11 0 0 0,2 5 0 0 0,-1 0 0 0 0,0 0 0 0 0,0 0 0 0 0,0-1 0 0 0,0 1 0 0 0,0 0 0 0 0,-1 0 0 0 0,1 0 0 0 0,0 0 0 0 0,-3-5 0 0 0,-3-23 0 0 0,4 23 0 0 0,2-1 0 0 0,-1-2 9 0 0,1 9 4 0 0,-8-25 29 0 0,2 3-42 0 0,-3-6 0 0 0,-3-9 0 0 0,9 30 0 0 0,-1 1 0 0 0,1-1 0 0 0,-4-13 0 0 0,7 18 0 0 0,1 4 0 0 0,-11-28 0 0 0,-1 5 32 0 0,-22-19 0 0 0,18 21-32 0 0,10 16 0 0 0,-8-3 0 0 0,4-4 0 0 0,2 2 0 0 0,-10-18 0 0 0,14 23 0 0 0,0 0 0 0 0,1 4 0 0 0,-18-21 0 0 0,11 11 0 0 0,9 9 0 0 0,-6-9 0 0 0,-35-29 0 0 0,35 34 0 0 0,-22-21 0 0 0,8 8 0 0 0,16 11 0 0 0,3 6 0 0 0,0-1-1 0 0,0 1 1 0 0,0-1-1 0 0,0 1 0 0 0,0 0 1 0 0,-1 0-1 0 0,1-1 1 0 0,-1 1-1 0 0,-1-1 1 0 0,1 1 5 0 0,1 0 1 0 0,0 0-1 0 0,0 0 1 0 0,0 0 0 0 0,0 0-1 0 0,0 0 1 0 0,0 0-1 0 0,0 0 1 0 0,0 0-1 0 0,0-1 1 0 0,0 1-1 0 0,-1-3 1 0 0,-24-22 60 0 0,24 22-121 0 0,-17-8 57 0 0,12 7-2 0 0,-8-8 0 0 0,12 10 0 0 0,0 0 0 0 0,-1 1 0 0 0,1 0 0 0 0,-1-1 0 0 0,-7-2 0 0 0,-62-34 0 0 0,-3-2 0 0 0,38 24 0 0 0,-23 0 0 0 0,58 16 0 0 0,-1 0 0 0 0,1 0 0 0 0,0 0 0 0 0,0-1 0 0 0,-5-2 0 0 0,-1 0 0 0 0,3 2 4 0 0,-4-2 10 0 0,0 0-1 0 0,1-1 1 0 0,0 0 0 0 0,-15-10-1 0 0,7 4-101 0 0,-9-3 88 0 0,23 12 0 0 0,0 1 0 0 0,0-1 0 0 0,0 0 0 0 0,0 0 0 0 0,0 0 0 0 0,0 0 0 0 0,-3-4 0 0 0,4 6 0 0 0,-13-13 0 0 0,-8-4 0 0 0,17 12 0 0 0,-2 0 0 0 0,-2-1 0 0 0,9 5 0 0 0,-10-13 0 0 0,9 11 0 0 0,3 4 0 0 0,-6-5 0 0 0,-13-12 0 0 0,17 13 0 0 0,0 1 0 0 0,-14-10 0 0 0,-4 0-64 0 0,12 9 64 0 0,0 0-11 0 0,4 2-31 0 0,-3 0 31 0 0,-6-3-18 0 0,11 4 16 0 0,-23 0-9 0 0,14 0 22 0 0,0 1 0 0 0,1 0 0 0 0,2 0-11 0 0,4 0-31 0 0,-5 2 31 0 0,-2 1 11 0 0,2 1 0 0 0,0 1 0 0 0,1-3-11 0 0,4-1-31 0 0,-4 4 31 0 0,-1 0 11 0 0,0 1 0 0 0,1-1 0 0 0,2-1 11 0 0,3-3 31 0 0,-4 1-31 0 0,-4 2-8 0 0,3 2-17 0 0,5-6-39 0 0,2 1-75 0 0,-1 0-33 0 0,-1 1-290 0 0</inkml:trace>
+</inkml:ink>
+</file>
+
+<file path=ppt/ink/ink115.xml><?xml version="1.0" encoding="utf-8"?>
+<inkml:ink xmlns:inkml="http://www.w3.org/2003/InkML">
+  <inkml:definitions>
+    <inkml:context xml:id="ctx0">
+      <inkml:inkSource xml:id="inkSrc0">
+        <inkml:traceFormat>
+          <inkml:channel name="X" type="integer" min="-2.14748E9" max="2.14748E9" units="cm"/>
+          <inkml:channel name="Y" type="integer" min="-2.14748E9" max="2.14748E9" units="cm"/>
+          <inkml:channel name="F" type="integer" max="32767" units="dev"/>
+          <inkml:channel name="OA" type="integer" max="360" units="deg"/>
+          <inkml:channel name="OE" type="integer" max="90" units="deg"/>
+        </inkml:traceFormat>
+        <inkml:channelProperties>
+          <inkml:channelProperty channel="X" name="resolution" value="1000" units="1/cm"/>
+          <inkml:channelProperty channel="Y" name="resolution" value="1000" units="1/cm"/>
+          <inkml:channelProperty channel="F" name="resolution" value="0" units="1/dev"/>
+          <inkml:channelProperty channel="OA" name="resolution" value="1000" units="1/deg"/>
+          <inkml:channelProperty channel="OE" name="resolution" value="1000" units="1/deg"/>
+        </inkml:channelProperties>
+      </inkml:inkSource>
+      <inkml:timestamp xml:id="ts0" timeString="2023-11-30T23:51:21.766"/>
+    </inkml:context>
+    <inkml:brush xml:id="br0">
+      <inkml:brushProperty name="width" value="0.05" units="cm"/>
+      <inkml:brushProperty name="height" value="0.05" units="cm"/>
+    </inkml:brush>
+  </inkml:definitions>
+  <inkml:trace contextRef="#ctx0" brushRef="#br0">0 0 919 0 0,'0'0'12046'0'0,"2"2"-11853"0"0,29 31 1647 0 0,-30-32-1591 0 0,0-1-219 0 0,1 1 0 0 0,-1-1 0 0 0,0 1 0 0 0,0-1 0 0 0,0 1 0 0 0,0 0 0 0 0,0-1 0 0 0,0 1 0 0 0,-1 0 0 0 0,1 0 0 0 0,1 1-1 0 0,-1-1 9 0 0,0 0-1 0 0,0 0 1 0 0,-1 0-1 0 0,1 0 0 0 0,0-1 1 0 0,0 1-1 0 0,0 0 1 0 0,0-1-1 0 0,0 1 0 0 0,0-1 1 0 0,2 2-1 0 0,16 9 327 0 0,-18-10-222 0 0,1-1 8 0 0,11 7 215 0 0,23 16-1 0 0,-27-17-290 0 0,-2-2 13 0 0,1 1 1 0 0,0-2-1 0 0,13 6 0 0 0,-19-8-7 0 0,2 1-19 0 0,-1 1 0 0 0,1 0-1 0 0,0-1 1 0 0,1 0 0 0 0,7 3 0 0 0,-12-5-55 0 0,26 16 297 0 0,-23-14-266 0 0,1 1 1 0 0,-1-1-1 0 0,1 0 1 0 0,-1 0-1 0 0,1 0 1 0 0,4 1-1 0 0,62 26 518 0 0,-44-25-77 0 0,1 0-1 0 0,-1-2 1 0 0,53-1-1 0 0,-38-2-313 0 0,-7 8 21 0 0,8-3-53 0 0,34 2 143 0 0,-68-6-252 0 0,45 6 357 0 0,-14 0-263 0 0,-30-5-95 0 0,-4 2 5 0 0,20-2-1 0 0,-24-1-25 0 0,0 1 0 0 0,0-1-1 0 0,-1 0 1 0 0,1 0 0 0 0,0 0 0 0 0,0 0 0 0 0,-1 0-1 0 0,1 0 1 0 0,0 0 0 0 0,0 0 0 0 0,-1-1-1 0 0,1 1 1 0 0,0 0 0 0 0,-1 0 0 0 0,1 0 0 0 0,0-1-1 0 0,-1 1 1 0 0,2-1 0 0 0,12 3 30 0 0,-2 1-24 0 0,21 1 68 0 0,-21-2-75 0 0,-2-1 11 0 0,-7 0 31 0 0,6 0-31 0 0,3 1-11 0 0,0-2 0 0 0,0 0 0 0 0,1-2 0 0 0,-2 1 0 0 0,0 0 0 0 0,0 1 0 0 0,1-1 0 0 0,-1 0 0 0 0,-1 0 11 0 0,-6 0 31 0 0,3-1-20 0 0,-4 1 20 0 0,0 0-188 0 0,-1 0-1 0 0,0 1 0 0 0,1-1 0 0 0,-1 0 0 0 0,0 1 1 0 0,1 0-1 0 0,-1 0 0 0 0,1-1 0 0 0,-1 2 0 0 0,1-1 0 0 0,2 0 1 0 0,2 1-4562 0 0</inkml:trace>
+</inkml:ink>
+</file>
+
+<file path=ppt/ink/ink116.xml><?xml version="1.0" encoding="utf-8"?>
+<inkml:ink xmlns:inkml="http://www.w3.org/2003/InkML">
+  <inkml:definitions>
+    <inkml:context xml:id="ctx0">
+      <inkml:inkSource xml:id="inkSrc0">
+        <inkml:traceFormat>
+          <inkml:channel name="X" type="integer" min="-2.14748E9" max="2.14748E9" units="cm"/>
+          <inkml:channel name="Y" type="integer" min="-2.14748E9" max="2.14748E9" units="cm"/>
+          <inkml:channel name="F" type="integer" max="32767" units="dev"/>
+          <inkml:channel name="OA" type="integer" max="360" units="deg"/>
+          <inkml:channel name="OE" type="integer" max="90" units="deg"/>
+        </inkml:traceFormat>
+        <inkml:channelProperties>
+          <inkml:channelProperty channel="X" name="resolution" value="1000" units="1/cm"/>
+          <inkml:channelProperty channel="Y" name="resolution" value="1000" units="1/cm"/>
+          <inkml:channelProperty channel="F" name="resolution" value="0" units="1/dev"/>
+          <inkml:channelProperty channel="OA" name="resolution" value="1000" units="1/deg"/>
+          <inkml:channelProperty channel="OE" name="resolution" value="1000" units="1/deg"/>
+        </inkml:channelProperties>
+      </inkml:inkSource>
+      <inkml:timestamp xml:id="ts0" timeString="2023-11-30T23:51:50.745"/>
+    </inkml:context>
+    <inkml:brush xml:id="br0">
+      <inkml:brushProperty name="width" value="0.05" units="cm"/>
+      <inkml:brushProperty name="height" value="0.05" units="cm"/>
+    </inkml:brush>
+  </inkml:definitions>
+  <inkml:trace contextRef="#ctx0" brushRef="#br0">532 0 4607 0 0,'0'0'12744'0'0,"4"12"-12370"0"0,-4-4-167 0 0,0 0 0 0 0,1 1 0 0 0,0-1 0 0 0,1 0 0 0 0,3 11 0 0 0,2 8-127 0 0,17 84 616 0 0,-20-81-440 0 0,-1 1-1 0 0,-1-1 0 0 0,-4 37 1 0 0,1-35-264 0 0,-1 2 240 0 0,-6 38 0 0 0,5-51-181 0 0,1-9-26 0 0,0 0 0 0 0,-1 1 1 0 0,0-1-1 0 0,-1 0 0 0 0,-5 11 0 0 0,-21 53 103 0 0,-83 167 0 0 0,95-206-128 0 0,-42 64 0 0 0,39-68 0 0 0,7-9-13 0 0,-1 0 39 0 0,0-1-1 0 0,-25 29 1 0 0,29-40-4 0 0,-1-1-1 0 0,-25 18 0 0 0,15-11 0 0 0,16-12-12 0 0,1-2-1 0 0,-1 1 1 0 0,-1 0 0 0 0,-9 4-1 0 0,-31 6 56 0 0,45-14-71 0 0,1-1 3 0 0,-1 0 0 0 0,1 1 0 0 0,-1-1 1 0 0,1 1-1 0 0,-1-1 0 0 0,1 1 0 0 0,0 0 0 0 0,-1 0 1 0 0,1-1-1 0 0,0 1 0 0 0,-1 0 0 0 0,1 0 1 0 0,0 0-1 0 0,-1 2 0 0 0,1-2 4 0 0,-1 0 0 0 0,1 0 0 0 0,0 0 0 0 0,0-1 0 0 0,-1 1 0 0 0,1 0 0 0 0,-1 0 0 0 0,1-1 0 0 0,-1 1 0 0 0,1-1 0 0 0,-1 1 0 0 0,1 0 0 0 0,-9 3-93 0 0</inkml:trace>
+</inkml:ink>
+</file>
+
+<file path=ppt/ink/ink117.xml><?xml version="1.0" encoding="utf-8"?>
+<inkml:ink xmlns:inkml="http://www.w3.org/2003/InkML">
+  <inkml:definitions>
+    <inkml:context xml:id="ctx0">
+      <inkml:inkSource xml:id="inkSrc0">
+        <inkml:traceFormat>
+          <inkml:channel name="X" type="integer" min="-2.14748E9" max="2.14748E9" units="cm"/>
+          <inkml:channel name="Y" type="integer" min="-2.14748E9" max="2.14748E9" units="cm"/>
+          <inkml:channel name="F" type="integer" max="32767" units="dev"/>
+          <inkml:channel name="OA" type="integer" max="360" units="deg"/>
+          <inkml:channel name="OE" type="integer" max="90" units="deg"/>
+        </inkml:traceFormat>
+        <inkml:channelProperties>
+          <inkml:channelProperty channel="X" name="resolution" value="1000" units="1/cm"/>
+          <inkml:channelProperty channel="Y" name="resolution" value="1000" units="1/cm"/>
+          <inkml:channelProperty channel="F" name="resolution" value="0" units="1/dev"/>
+          <inkml:channelProperty channel="OA" name="resolution" value="1000" units="1/deg"/>
+          <inkml:channelProperty channel="OE" name="resolution" value="1000" units="1/deg"/>
+        </inkml:channelProperties>
+      </inkml:inkSource>
+      <inkml:timestamp xml:id="ts0" timeString="2023-11-30T23:51:52.383"/>
+    </inkml:context>
+    <inkml:brush xml:id="br0">
+      <inkml:brushProperty name="width" value="0.05" units="cm"/>
+      <inkml:brushProperty name="height" value="0.05" units="cm"/>
+    </inkml:brush>
+  </inkml:definitions>
+  <inkml:trace contextRef="#ctx0" brushRef="#br0">0 1 919 0 0,'0'0'128'0'0,"5"0"2288"0"0,0 11 859 0 0,-4-10-3097 0 0,-1 0 1 0 0,1 1 0 0 0,-1-1 0 0 0,1 0 0 0 0,-1 0 0 0 0,1 0 0 0 0,0 1 0 0 0,-1-1 0 0 0,1 0 0 0 0,0 0 0 0 0,0 0 0 0 0,0 0 0 0 0,0 0 0 0 0,0 0 0 0 0,0 0 0 0 0,0-1 0 0 0,1 1 0 0 0,1 1 0 0 0,1-1-126 0 0</inkml:trace>
+</inkml:ink>
+</file>
+
+<file path=ppt/ink/ink118.xml><?xml version="1.0" encoding="utf-8"?>
+<inkml:ink xmlns:inkml="http://www.w3.org/2003/InkML">
+  <inkml:definitions>
+    <inkml:context xml:id="ctx0">
+      <inkml:inkSource xml:id="inkSrc0">
+        <inkml:traceFormat>
+          <inkml:channel name="X" type="integer" min="-2.14748E9" max="2.14748E9" units="cm"/>
+          <inkml:channel name="Y" type="integer" min="-2.14748E9" max="2.14748E9" units="cm"/>
+          <inkml:channel name="F" type="integer" max="32767" units="dev"/>
+          <inkml:channel name="OA" type="integer" max="360" units="deg"/>
+          <inkml:channel name="OE" type="integer" max="90" units="deg"/>
+        </inkml:traceFormat>
+        <inkml:channelProperties>
+          <inkml:channelProperty channel="X" name="resolution" value="1000" units="1/cm"/>
+          <inkml:channelProperty channel="Y" name="resolution" value="1000" units="1/cm"/>
+          <inkml:channelProperty channel="F" name="resolution" value="0" units="1/dev"/>
+          <inkml:channelProperty channel="OA" name="resolution" value="1000" units="1/deg"/>
+          <inkml:channelProperty channel="OE" name="resolution" value="1000" units="1/deg"/>
+        </inkml:channelProperties>
+      </inkml:inkSource>
+      <inkml:timestamp xml:id="ts0" timeString="2023-11-30T23:51:57.317"/>
+    </inkml:context>
+    <inkml:brush xml:id="br0">
+      <inkml:brushProperty name="width" value="0.05" units="cm"/>
+      <inkml:brushProperty name="height" value="0.05" units="cm"/>
+    </inkml:brush>
+  </inkml:definitions>
+  <inkml:trace contextRef="#ctx0" brushRef="#br0">6 0 8607 0 0,'-1'3'10239'0'0,"-4"10"-10662"0"0,7 6 662 0 0,1 1 0 0 0,0-1 0 0 0,2 0 0 0 0,0 0-1 0 0,1 0 1 0 0,10 22 0 0 0,34 61 965 0 0,-12-37-458 0 0,-25-47-582 0 0,0-1 1 0 0,1 0 0 0 0,1-1 0 0 0,18 14 0 0 0,0 3-3 0 0,-2 2-2 0 0,-21-22-48 0 0,20 18 0 0 0,-21-24-86 0 0,0 0-1 0 0,13 7 0 0 0,-12-8-1 0 0,0 1-1 0 0,0 0 0 0 0,-1 0 0 0 0,9 10 0 0 0,-13-12-23 0 0,-2-2 0 0 0,0 0 0 0 0,0 0 0 0 0,0 0 0 0 0,0 0 0 0 0,5 3 0 0 0,-6-5 0 0 0,34 21 0 0 0,-16-9-67 0 0</inkml:trace>
+</inkml:ink>
+</file>
+
+<file path=ppt/ink/ink119.xml><?xml version="1.0" encoding="utf-8"?>
+<inkml:ink xmlns:inkml="http://www.w3.org/2003/InkML">
+  <inkml:definitions>
+    <inkml:context xml:id="ctx0">
+      <inkml:inkSource xml:id="inkSrc0">
+        <inkml:traceFormat>
+          <inkml:channel name="X" type="integer" min="-2.14748E9" max="2.14748E9" units="cm"/>
+          <inkml:channel name="Y" type="integer" min="-2.14748E9" max="2.14748E9" units="cm"/>
+          <inkml:channel name="F" type="integer" max="32767" units="dev"/>
+          <inkml:channel name="OA" type="integer" max="360" units="deg"/>
+          <inkml:channel name="OE" type="integer" max="90" units="deg"/>
+        </inkml:traceFormat>
+        <inkml:channelProperties>
+          <inkml:channelProperty channel="X" name="resolution" value="1000" units="1/cm"/>
+          <inkml:channelProperty channel="Y" name="resolution" value="1000" units="1/cm"/>
+          <inkml:channelProperty channel="F" name="resolution" value="0" units="1/dev"/>
+          <inkml:channelProperty channel="OA" name="resolution" value="1000" units="1/deg"/>
+          <inkml:channelProperty channel="OE" name="resolution" value="1000" units="1/deg"/>
+        </inkml:channelProperties>
+      </inkml:inkSource>
+      <inkml:timestamp xml:id="ts0" timeString="2023-11-30T23:51:59.638"/>
+    </inkml:context>
+    <inkml:brush xml:id="br0">
+      <inkml:brushProperty name="width" value="0.05" units="cm"/>
+      <inkml:brushProperty name="height" value="0.05" units="cm"/>
+    </inkml:brush>
+  </inkml:definitions>
+  <inkml:trace contextRef="#ctx0" brushRef="#br0">3 1 15199 0 0,'0'0'1488'0'0,"-2"1"128"0"0,4-2-1856 0 0,0 1-880 0 0,0 0-200 0 0</inkml:trace>
 </inkml:ink>
 </file>
 
@@ -741,6 +869,318 @@
 </inkml:ink>
 </file>
 
+<file path=ppt/ink/ink120.xml><?xml version="1.0" encoding="utf-8"?>
+<inkml:ink xmlns:inkml="http://www.w3.org/2003/InkML">
+  <inkml:definitions>
+    <inkml:context xml:id="ctx0">
+      <inkml:inkSource xml:id="inkSrc0">
+        <inkml:traceFormat>
+          <inkml:channel name="X" type="integer" min="-2.14748E9" max="2.14748E9" units="cm"/>
+          <inkml:channel name="Y" type="integer" min="-2.14748E9" max="2.14748E9" units="cm"/>
+          <inkml:channel name="F" type="integer" max="32767" units="dev"/>
+          <inkml:channel name="OA" type="integer" max="360" units="deg"/>
+          <inkml:channel name="OE" type="integer" max="90" units="deg"/>
+        </inkml:traceFormat>
+        <inkml:channelProperties>
+          <inkml:channelProperty channel="X" name="resolution" value="1000" units="1/cm"/>
+          <inkml:channelProperty channel="Y" name="resolution" value="1000" units="1/cm"/>
+          <inkml:channelProperty channel="F" name="resolution" value="0" units="1/dev"/>
+          <inkml:channelProperty channel="OA" name="resolution" value="1000" units="1/deg"/>
+          <inkml:channelProperty channel="OE" name="resolution" value="1000" units="1/deg"/>
+        </inkml:channelProperties>
+      </inkml:inkSource>
+      <inkml:timestamp xml:id="ts0" timeString="2023-11-30T23:51:59.968"/>
+    </inkml:context>
+    <inkml:brush xml:id="br0">
+      <inkml:brushProperty name="width" value="0.05" units="cm"/>
+      <inkml:brushProperty name="height" value="0.05" units="cm"/>
+    </inkml:brush>
+  </inkml:definitions>
+  <inkml:trace contextRef="#ctx0" brushRef="#br0">9 1 11975 0 0,'-3'4'528'0'0,"2"-2"112"0"0,0 0-512 0 0,-1 0-128 0 0,1 0 0 0 0</inkml:trace>
+</inkml:ink>
+</file>
+
+<file path=ppt/ink/ink121.xml><?xml version="1.0" encoding="utf-8"?>
+<inkml:ink xmlns:inkml="http://www.w3.org/2003/InkML">
+  <inkml:definitions>
+    <inkml:context xml:id="ctx0">
+      <inkml:inkSource xml:id="inkSrc0">
+        <inkml:traceFormat>
+          <inkml:channel name="X" type="integer" min="-2.14748E9" max="2.14748E9" units="cm"/>
+          <inkml:channel name="Y" type="integer" min="-2.14748E9" max="2.14748E9" units="cm"/>
+          <inkml:channel name="F" type="integer" max="32767" units="dev"/>
+          <inkml:channel name="OA" type="integer" max="360" units="deg"/>
+          <inkml:channel name="OE" type="integer" max="90" units="deg"/>
+        </inkml:traceFormat>
+        <inkml:channelProperties>
+          <inkml:channelProperty channel="X" name="resolution" value="1000" units="1/cm"/>
+          <inkml:channelProperty channel="Y" name="resolution" value="1000" units="1/cm"/>
+          <inkml:channelProperty channel="F" name="resolution" value="0" units="1/dev"/>
+          <inkml:channelProperty channel="OA" name="resolution" value="1000" units="1/deg"/>
+          <inkml:channelProperty channel="OE" name="resolution" value="1000" units="1/deg"/>
+        </inkml:channelProperties>
+      </inkml:inkSource>
+      <inkml:timestamp xml:id="ts0" timeString="2023-11-30T23:52:00.300"/>
+    </inkml:context>
+    <inkml:brush xml:id="br0">
+      <inkml:brushProperty name="width" value="0.05" units="cm"/>
+      <inkml:brushProperty name="height" value="0.05" units="cm"/>
+    </inkml:brush>
+  </inkml:definitions>
+  <inkml:trace contextRef="#ctx0" brushRef="#br0">1 1 8983 0 0,'0'0'968'0'0</inkml:trace>
+</inkml:ink>
+</file>
+
+<file path=ppt/ink/ink122.xml><?xml version="1.0" encoding="utf-8"?>
+<inkml:ink xmlns:inkml="http://www.w3.org/2003/InkML">
+  <inkml:definitions>
+    <inkml:context xml:id="ctx0">
+      <inkml:inkSource xml:id="inkSrc0">
+        <inkml:traceFormat>
+          <inkml:channel name="X" type="integer" min="-2.14748E9" max="2.14748E9" units="cm"/>
+          <inkml:channel name="Y" type="integer" min="-2.14748E9" max="2.14748E9" units="cm"/>
+          <inkml:channel name="F" type="integer" max="32767" units="dev"/>
+          <inkml:channel name="OA" type="integer" max="360" units="deg"/>
+          <inkml:channel name="OE" type="integer" max="90" units="deg"/>
+        </inkml:traceFormat>
+        <inkml:channelProperties>
+          <inkml:channelProperty channel="X" name="resolution" value="1000" units="1/cm"/>
+          <inkml:channelProperty channel="Y" name="resolution" value="1000" units="1/cm"/>
+          <inkml:channelProperty channel="F" name="resolution" value="0" units="1/dev"/>
+          <inkml:channelProperty channel="OA" name="resolution" value="1000" units="1/deg"/>
+          <inkml:channelProperty channel="OE" name="resolution" value="1000" units="1/deg"/>
+        </inkml:channelProperties>
+      </inkml:inkSource>
+      <inkml:timestamp xml:id="ts0" timeString="2023-11-30T23:52:00.710"/>
+    </inkml:context>
+    <inkml:brush xml:id="br0">
+      <inkml:brushProperty name="width" value="0.05" units="cm"/>
+      <inkml:brushProperty name="height" value="0.05" units="cm"/>
+    </inkml:brush>
+  </inkml:definitions>
+  <inkml:trace contextRef="#ctx0" brushRef="#br0">1 1 17503 0 0,'0'0'3600'0'0,"6"3"-7632"0"0</inkml:trace>
+</inkml:ink>
+</file>
+
+<file path=ppt/ink/ink123.xml><?xml version="1.0" encoding="utf-8"?>
+<inkml:ink xmlns:inkml="http://www.w3.org/2003/InkML">
+  <inkml:definitions>
+    <inkml:context xml:id="ctx0">
+      <inkml:inkSource xml:id="inkSrc0">
+        <inkml:traceFormat>
+          <inkml:channel name="X" type="integer" min="-2.14748E9" max="2.14748E9" units="cm"/>
+          <inkml:channel name="Y" type="integer" min="-2.14748E9" max="2.14748E9" units="cm"/>
+          <inkml:channel name="F" type="integer" max="32767" units="dev"/>
+          <inkml:channel name="OA" type="integer" max="360" units="deg"/>
+          <inkml:channel name="OE" type="integer" max="90" units="deg"/>
+        </inkml:traceFormat>
+        <inkml:channelProperties>
+          <inkml:channelProperty channel="X" name="resolution" value="1000" units="1/cm"/>
+          <inkml:channelProperty channel="Y" name="resolution" value="1000" units="1/cm"/>
+          <inkml:channelProperty channel="F" name="resolution" value="0" units="1/dev"/>
+          <inkml:channelProperty channel="OA" name="resolution" value="1000" units="1/deg"/>
+          <inkml:channelProperty channel="OE" name="resolution" value="1000" units="1/deg"/>
+        </inkml:channelProperties>
+      </inkml:inkSource>
+      <inkml:timestamp xml:id="ts0" timeString="2023-11-30T23:52:02.485"/>
+    </inkml:context>
+    <inkml:brush xml:id="br0">
+      <inkml:brushProperty name="width" value="0.05" units="cm"/>
+      <inkml:brushProperty name="height" value="0.05" units="cm"/>
+    </inkml:brush>
+  </inkml:definitions>
+  <inkml:trace contextRef="#ctx0" brushRef="#br0">1 1 8287 0 0,'0'0'8520'0'0</inkml:trace>
+</inkml:ink>
+</file>
+
+<file path=ppt/ink/ink124.xml><?xml version="1.0" encoding="utf-8"?>
+<inkml:ink xmlns:inkml="http://www.w3.org/2003/InkML">
+  <inkml:definitions>
+    <inkml:context xml:id="ctx0">
+      <inkml:inkSource xml:id="inkSrc0">
+        <inkml:traceFormat>
+          <inkml:channel name="X" type="integer" min="-2.14748E9" max="2.14748E9" units="cm"/>
+          <inkml:channel name="Y" type="integer" min="-2.14748E9" max="2.14748E9" units="cm"/>
+          <inkml:channel name="F" type="integer" max="32767" units="dev"/>
+          <inkml:channel name="OA" type="integer" max="360" units="deg"/>
+          <inkml:channel name="OE" type="integer" max="90" units="deg"/>
+        </inkml:traceFormat>
+        <inkml:channelProperties>
+          <inkml:channelProperty channel="X" name="resolution" value="1000" units="1/cm"/>
+          <inkml:channelProperty channel="Y" name="resolution" value="1000" units="1/cm"/>
+          <inkml:channelProperty channel="F" name="resolution" value="0" units="1/dev"/>
+          <inkml:channelProperty channel="OA" name="resolution" value="1000" units="1/deg"/>
+          <inkml:channelProperty channel="OE" name="resolution" value="1000" units="1/deg"/>
+        </inkml:channelProperties>
+      </inkml:inkSource>
+      <inkml:timestamp xml:id="ts0" timeString="2023-11-30T23:52:02.816"/>
+    </inkml:context>
+    <inkml:brush xml:id="br0">
+      <inkml:brushProperty name="width" value="0.05" units="cm"/>
+      <inkml:brushProperty name="height" value="0.05" units="cm"/>
+    </inkml:brush>
+  </inkml:definitions>
+  <inkml:trace contextRef="#ctx0" brushRef="#br0">6 1 18487 0 0,'0'0'816'0'0,"-3"0"176"0"0,1 0-800 0 0</inkml:trace>
+</inkml:ink>
+</file>
+
+<file path=ppt/ink/ink125.xml><?xml version="1.0" encoding="utf-8"?>
+<inkml:ink xmlns:inkml="http://www.w3.org/2003/InkML">
+  <inkml:definitions>
+    <inkml:context xml:id="ctx0">
+      <inkml:inkSource xml:id="inkSrc0">
+        <inkml:traceFormat>
+          <inkml:channel name="X" type="integer" min="-2.14748E9" max="2.14748E9" units="cm"/>
+          <inkml:channel name="Y" type="integer" min="-2.14748E9" max="2.14748E9" units="cm"/>
+          <inkml:channel name="F" type="integer" max="32767" units="dev"/>
+          <inkml:channel name="OA" type="integer" max="360" units="deg"/>
+          <inkml:channel name="OE" type="integer" max="90" units="deg"/>
+        </inkml:traceFormat>
+        <inkml:channelProperties>
+          <inkml:channelProperty channel="X" name="resolution" value="1000" units="1/cm"/>
+          <inkml:channelProperty channel="Y" name="resolution" value="1000" units="1/cm"/>
+          <inkml:channelProperty channel="F" name="resolution" value="0" units="1/dev"/>
+          <inkml:channelProperty channel="OA" name="resolution" value="1000" units="1/deg"/>
+          <inkml:channelProperty channel="OE" name="resolution" value="1000" units="1/deg"/>
+        </inkml:channelProperties>
+      </inkml:inkSource>
+      <inkml:timestamp xml:id="ts0" timeString="2023-11-30T23:52:03.146"/>
+    </inkml:context>
+    <inkml:brush xml:id="br0">
+      <inkml:brushProperty name="width" value="0.05" units="cm"/>
+      <inkml:brushProperty name="height" value="0.05" units="cm"/>
+    </inkml:brush>
+  </inkml:definitions>
+  <inkml:trace contextRef="#ctx0" brushRef="#br0">15 1 17967 0 0,'-4'7'800'0'0,"1"-3"160"0"0,0-1-768 0 0,1 1-192 0 0,1-1 0 0 0,0 1 0 0 0,1-1 0 0 0,0 0 72 0 0,1 0-72 0 0</inkml:trace>
+</inkml:ink>
+</file>
+
+<file path=ppt/ink/ink126.xml><?xml version="1.0" encoding="utf-8"?>
+<inkml:ink xmlns:inkml="http://www.w3.org/2003/InkML">
+  <inkml:definitions>
+    <inkml:context xml:id="ctx0">
+      <inkml:inkSource xml:id="inkSrc0">
+        <inkml:traceFormat>
+          <inkml:channel name="X" type="integer" min="-2.14748E9" max="2.14748E9" units="cm"/>
+          <inkml:channel name="Y" type="integer" min="-2.14748E9" max="2.14748E9" units="cm"/>
+          <inkml:channel name="F" type="integer" max="32767" units="dev"/>
+          <inkml:channel name="OA" type="integer" max="360" units="deg"/>
+          <inkml:channel name="OE" type="integer" max="90" units="deg"/>
+        </inkml:traceFormat>
+        <inkml:channelProperties>
+          <inkml:channelProperty channel="X" name="resolution" value="1000" units="1/cm"/>
+          <inkml:channelProperty channel="Y" name="resolution" value="1000" units="1/cm"/>
+          <inkml:channelProperty channel="F" name="resolution" value="0" units="1/dev"/>
+          <inkml:channelProperty channel="OA" name="resolution" value="1000" units="1/deg"/>
+          <inkml:channelProperty channel="OE" name="resolution" value="1000" units="1/deg"/>
+        </inkml:channelProperties>
+      </inkml:inkSource>
+      <inkml:timestamp xml:id="ts0" timeString="2023-11-30T23:52:01.072"/>
+    </inkml:context>
+    <inkml:brush xml:id="br0">
+      <inkml:brushProperty name="width" value="0.05" units="cm"/>
+      <inkml:brushProperty name="height" value="0.05" units="cm"/>
+    </inkml:brush>
+  </inkml:definitions>
+  <inkml:trace contextRef="#ctx0" brushRef="#br0">12 0 19351 0 0,'-3'3'856'0'0,"1"-1"176"0"0,0 0-824 0 0,-1 1-208 0 0,1-1 0 0 0</inkml:trace>
+</inkml:ink>
+</file>
+
+<file path=ppt/ink/ink127.xml><?xml version="1.0" encoding="utf-8"?>
+<inkml:ink xmlns:inkml="http://www.w3.org/2003/InkML">
+  <inkml:definitions>
+    <inkml:context xml:id="ctx0">
+      <inkml:inkSource xml:id="inkSrc0">
+        <inkml:traceFormat>
+          <inkml:channel name="X" type="integer" min="-2.14748E9" max="2.14748E9" units="cm"/>
+          <inkml:channel name="Y" type="integer" min="-2.14748E9" max="2.14748E9" units="cm"/>
+          <inkml:channel name="F" type="integer" max="32767" units="dev"/>
+          <inkml:channel name="OA" type="integer" max="360" units="deg"/>
+          <inkml:channel name="OE" type="integer" max="90" units="deg"/>
+        </inkml:traceFormat>
+        <inkml:channelProperties>
+          <inkml:channelProperty channel="X" name="resolution" value="1000" units="1/cm"/>
+          <inkml:channelProperty channel="Y" name="resolution" value="1000" units="1/cm"/>
+          <inkml:channelProperty channel="F" name="resolution" value="0" units="1/dev"/>
+          <inkml:channelProperty channel="OA" name="resolution" value="1000" units="1/deg"/>
+          <inkml:channelProperty channel="OE" name="resolution" value="1000" units="1/deg"/>
+        </inkml:channelProperties>
+      </inkml:inkSource>
+      <inkml:timestamp xml:id="ts0" timeString="2023-11-30T23:52:01.419"/>
+    </inkml:context>
+    <inkml:brush xml:id="br0">
+      <inkml:brushProperty name="width" value="0.05" units="cm"/>
+      <inkml:brushProperty name="height" value="0.05" units="cm"/>
+    </inkml:brush>
+  </inkml:definitions>
+  <inkml:trace contextRef="#ctx0" brushRef="#br0">269 603 20735 0 0,'-3'3'2208'0'0,"2"0"-2136"0"0,0-1-72 0 0</inkml:trace>
+  <inkml:trace contextRef="#ctx0" brushRef="#br0" timeOffset="1">3 1 18887 0 0,'0'0'2016'0'0,"-2"0"-1360"0"0,7 1-2312 0 0,1 0-360 0 0</inkml:trace>
+</inkml:ink>
+</file>
+
+<file path=ppt/ink/ink128.xml><?xml version="1.0" encoding="utf-8"?>
+<inkml:ink xmlns:inkml="http://www.w3.org/2003/InkML">
+  <inkml:definitions>
+    <inkml:context xml:id="ctx0">
+      <inkml:inkSource xml:id="inkSrc0">
+        <inkml:traceFormat>
+          <inkml:channel name="X" type="integer" min="-2.14748E9" max="2.14748E9" units="cm"/>
+          <inkml:channel name="Y" type="integer" min="-2.14748E9" max="2.14748E9" units="cm"/>
+          <inkml:channel name="F" type="integer" max="32767" units="dev"/>
+          <inkml:channel name="OA" type="integer" max="360" units="deg"/>
+          <inkml:channel name="OE" type="integer" max="90" units="deg"/>
+        </inkml:traceFormat>
+        <inkml:channelProperties>
+          <inkml:channelProperty channel="X" name="resolution" value="1000" units="1/cm"/>
+          <inkml:channelProperty channel="Y" name="resolution" value="1000" units="1/cm"/>
+          <inkml:channelProperty channel="F" name="resolution" value="0" units="1/dev"/>
+          <inkml:channelProperty channel="OA" name="resolution" value="1000" units="1/deg"/>
+          <inkml:channelProperty channel="OE" name="resolution" value="1000" units="1/deg"/>
+        </inkml:channelProperties>
+      </inkml:inkSource>
+      <inkml:timestamp xml:id="ts0" timeString="2023-11-30T23:52:01.746"/>
+    </inkml:context>
+    <inkml:brush xml:id="br0">
+      <inkml:brushProperty name="width" value="0.05" units="cm"/>
+      <inkml:brushProperty name="height" value="0.05" units="cm"/>
+    </inkml:brush>
+  </inkml:definitions>
+  <inkml:trace contextRef="#ctx0" brushRef="#br0">12 5 17159 0 0,'0'0'760'0'0,"-2"0"160"0"0,-1-1-736 0 0,0 1-184 0 0,1-1 0 0 0,1 1 256 0 0,1-3-136 0 0</inkml:trace>
+</inkml:ink>
+</file>
+
+<file path=ppt/ink/ink129.xml><?xml version="1.0" encoding="utf-8"?>
+<inkml:ink xmlns:inkml="http://www.w3.org/2003/InkML">
+  <inkml:definitions>
+    <inkml:context xml:id="ctx0">
+      <inkml:inkSource xml:id="inkSrc0">
+        <inkml:traceFormat>
+          <inkml:channel name="X" type="integer" min="-2.14748E9" max="2.14748E9" units="cm"/>
+          <inkml:channel name="Y" type="integer" min="-2.14748E9" max="2.14748E9" units="cm"/>
+          <inkml:channel name="F" type="integer" max="32767" units="dev"/>
+          <inkml:channel name="OA" type="integer" max="360" units="deg"/>
+          <inkml:channel name="OE" type="integer" max="90" units="deg"/>
+        </inkml:traceFormat>
+        <inkml:channelProperties>
+          <inkml:channelProperty channel="X" name="resolution" value="1000" units="1/cm"/>
+          <inkml:channelProperty channel="Y" name="resolution" value="1000" units="1/cm"/>
+          <inkml:channelProperty channel="F" name="resolution" value="0" units="1/dev"/>
+          <inkml:channelProperty channel="OA" name="resolution" value="1000" units="1/deg"/>
+          <inkml:channelProperty channel="OE" name="resolution" value="1000" units="1/deg"/>
+        </inkml:channelProperties>
+      </inkml:inkSource>
+      <inkml:timestamp xml:id="ts0" timeString="2023-11-30T23:52:02.139"/>
+    </inkml:context>
+    <inkml:brush xml:id="br0">
+      <inkml:brushProperty name="width" value="0.05" units="cm"/>
+      <inkml:brushProperty name="height" value="0.05" units="cm"/>
+    </inkml:brush>
+  </inkml:definitions>
+  <inkml:trace contextRef="#ctx0" brushRef="#br0">6 521 20015 0 0,'-1'6'888'0'0,"0"-3"176"0"0,0 0-848 0 0,-1 0-216 0 0,2 0 0 0 0</inkml:trace>
+  <inkml:trace contextRef="#ctx0" brushRef="#br0" timeOffset="1">306 0 9671 0 0,'-1'4'864'0'0,"-4"5"5912"0"0</inkml:trace>
+</inkml:ink>
+</file>
+
 <file path=ppt/ink/ink13.xml><?xml version="1.0" encoding="utf-8"?>
 <inkml:ink xmlns:inkml="http://www.w3.org/2003/InkML">
   <inkml:definitions>
@@ -769,6 +1209,130 @@
     </inkml:brush>
   </inkml:definitions>
   <inkml:trace contextRef="#ctx0" brushRef="#br0">71 5 5063 0 0,'-4'-1'10887'0'0,"-11"-2"-7898"0"0,13 4-2909 0 0,-1 0 0 0 0,1 0 0 0 0,-1 0 0 0 0,1 1-1 0 0,-1-1 1 0 0,1 0 0 0 0,0 1 0 0 0,0 0 0 0 0,0 0 0 0 0,0-1 0 0 0,0 1-1 0 0,0 1 1 0 0,1-1 0 0 0,-1 0 0 0 0,0 0 0 0 0,1 0 0 0 0,0 1-1 0 0,-2 2 1 0 0,1-1-96 0 0,0 1-1 0 0,0 0 0 0 0,1-1 1 0 0,-1 1-1 0 0,1 0 0 0 0,0 0 1 0 0,1-1-1 0 0,-1 1 1 0 0,1 7-1 0 0,0-7-21 0 0,1-1 0 0 0,-1 1-1 0 0,1 0 1 0 0,1-1 0 0 0,-1 1 0 0 0,1-1 0 0 0,-1 0 0 0 0,1 1 0 0 0,1-1 0 0 0,-1 0-1 0 0,0 0 1 0 0,1 0 0 0 0,0 0 0 0 0,0-1 0 0 0,0 1 0 0 0,1-1 0 0 0,-1 0 0 0 0,1 0 0 0 0,-1 0-1 0 0,1 0 1 0 0,0-1 0 0 0,0 1 0 0 0,0-1 0 0 0,1 0 0 0 0,-1 0 0 0 0,5 1 0 0 0,-3-1-440 0 0</inkml:trace>
+</inkml:ink>
+</file>
+
+<file path=ppt/ink/ink130.xml><?xml version="1.0" encoding="utf-8"?>
+<inkml:ink xmlns:inkml="http://www.w3.org/2003/InkML">
+  <inkml:definitions>
+    <inkml:context xml:id="ctx0">
+      <inkml:inkSource xml:id="inkSrc0">
+        <inkml:traceFormat>
+          <inkml:channel name="X" type="integer" min="-2.14748E9" max="2.14748E9" units="cm"/>
+          <inkml:channel name="Y" type="integer" min="-2.14748E9" max="2.14748E9" units="cm"/>
+          <inkml:channel name="F" type="integer" max="32767" units="dev"/>
+          <inkml:channel name="OA" type="integer" max="360" units="deg"/>
+          <inkml:channel name="OE" type="integer" max="90" units="deg"/>
+        </inkml:traceFormat>
+        <inkml:channelProperties>
+          <inkml:channelProperty channel="X" name="resolution" value="1000" units="1/cm"/>
+          <inkml:channelProperty channel="Y" name="resolution" value="1000" units="1/cm"/>
+          <inkml:channelProperty channel="F" name="resolution" value="0" units="1/dev"/>
+          <inkml:channelProperty channel="OA" name="resolution" value="1000" units="1/deg"/>
+          <inkml:channelProperty channel="OE" name="resolution" value="1000" units="1/deg"/>
+        </inkml:channelProperties>
+      </inkml:inkSource>
+      <inkml:timestamp xml:id="ts0" timeString="2023-11-30T23:52:03.543"/>
+    </inkml:context>
+    <inkml:brush xml:id="br0">
+      <inkml:brushProperty name="width" value="0.05" units="cm"/>
+      <inkml:brushProperty name="height" value="0.05" units="cm"/>
+    </inkml:brush>
+  </inkml:definitions>
+  <inkml:trace contextRef="#ctx0" brushRef="#br0">3 0 16127 0 0,'-2'6'1744'0'0,"4"-4"-1744"0"0,2-1 488 0 0,2 0 64 0 0,2-1 16 0 0,2-1 0 0 0</inkml:trace>
+</inkml:ink>
+</file>
+
+<file path=ppt/ink/ink131.xml><?xml version="1.0" encoding="utf-8"?>
+<inkml:ink xmlns:inkml="http://www.w3.org/2003/InkML">
+  <inkml:definitions>
+    <inkml:context xml:id="ctx0">
+      <inkml:inkSource xml:id="inkSrc0">
+        <inkml:traceFormat>
+          <inkml:channel name="X" type="integer" min="-2.14748E9" max="2.14748E9" units="cm"/>
+          <inkml:channel name="Y" type="integer" min="-2.14748E9" max="2.14748E9" units="cm"/>
+          <inkml:channel name="F" type="integer" max="32767" units="dev"/>
+          <inkml:channel name="OA" type="integer" max="360" units="deg"/>
+          <inkml:channel name="OE" type="integer" max="90" units="deg"/>
+        </inkml:traceFormat>
+        <inkml:channelProperties>
+          <inkml:channelProperty channel="X" name="resolution" value="1000" units="1/cm"/>
+          <inkml:channelProperty channel="Y" name="resolution" value="1000" units="1/cm"/>
+          <inkml:channelProperty channel="F" name="resolution" value="0" units="1/dev"/>
+          <inkml:channelProperty channel="OA" name="resolution" value="1000" units="1/deg"/>
+          <inkml:channelProperty channel="OE" name="resolution" value="1000" units="1/deg"/>
+        </inkml:channelProperties>
+      </inkml:inkSource>
+      <inkml:timestamp xml:id="ts0" timeString="2023-11-30T23:52:08.703"/>
+    </inkml:context>
+    <inkml:brush xml:id="br0">
+      <inkml:brushProperty name="width" value="0.05" units="cm"/>
+      <inkml:brushProperty name="height" value="0.05" units="cm"/>
+    </inkml:brush>
+  </inkml:definitions>
+  <inkml:trace contextRef="#ctx0" brushRef="#br0">11 5 12799 0 0,'0'0'0'0'0,"-8"2"5184"0"0,6-8-4480 0 0,6 12-1072 0 0,3 0 144 0 0,2 0-7040 0 0</inkml:trace>
+</inkml:ink>
+</file>
+
+<file path=ppt/ink/ink132.xml><?xml version="1.0" encoding="utf-8"?>
+<inkml:ink xmlns:inkml="http://www.w3.org/2003/InkML">
+  <inkml:definitions>
+    <inkml:context xml:id="ctx0">
+      <inkml:inkSource xml:id="inkSrc0">
+        <inkml:traceFormat>
+          <inkml:channel name="X" type="integer" min="-2.14748E9" max="2.14748E9" units="cm"/>
+          <inkml:channel name="Y" type="integer" min="-2.14748E9" max="2.14748E9" units="cm"/>
+          <inkml:channel name="F" type="integer" max="32767" units="dev"/>
+          <inkml:channel name="OA" type="integer" max="360" units="deg"/>
+          <inkml:channel name="OE" type="integer" max="90" units="deg"/>
+        </inkml:traceFormat>
+        <inkml:channelProperties>
+          <inkml:channelProperty channel="X" name="resolution" value="1000" units="1/cm"/>
+          <inkml:channelProperty channel="Y" name="resolution" value="1000" units="1/cm"/>
+          <inkml:channelProperty channel="F" name="resolution" value="0" units="1/dev"/>
+          <inkml:channelProperty channel="OA" name="resolution" value="1000" units="1/deg"/>
+          <inkml:channelProperty channel="OE" name="resolution" value="1000" units="1/deg"/>
+        </inkml:channelProperties>
+      </inkml:inkSource>
+      <inkml:timestamp xml:id="ts0" timeString="2023-11-30T23:52:09.066"/>
+    </inkml:context>
+    <inkml:brush xml:id="br0">
+      <inkml:brushProperty name="width" value="0.05" units="cm"/>
+      <inkml:brushProperty name="height" value="0.05" units="cm"/>
+    </inkml:brush>
+  </inkml:definitions>
+  <inkml:trace contextRef="#ctx0" brushRef="#br0">1 0 5983 0 0,'0'0'6328'0'0</inkml:trace>
+</inkml:ink>
+</file>
+
+<file path=ppt/ink/ink133.xml><?xml version="1.0" encoding="utf-8"?>
+<inkml:ink xmlns:inkml="http://www.w3.org/2003/InkML">
+  <inkml:definitions>
+    <inkml:context xml:id="ctx0">
+      <inkml:inkSource xml:id="inkSrc0">
+        <inkml:traceFormat>
+          <inkml:channel name="X" type="integer" min="-2.14748E9" max="2.14748E9" units="cm"/>
+          <inkml:channel name="Y" type="integer" min="-2.14748E9" max="2.14748E9" units="cm"/>
+          <inkml:channel name="F" type="integer" max="32767" units="dev"/>
+          <inkml:channel name="OA" type="integer" max="360" units="deg"/>
+          <inkml:channel name="OE" type="integer" max="90" units="deg"/>
+        </inkml:traceFormat>
+        <inkml:channelProperties>
+          <inkml:channelProperty channel="X" name="resolution" value="1000" units="1/cm"/>
+          <inkml:channelProperty channel="Y" name="resolution" value="1000" units="1/cm"/>
+          <inkml:channelProperty channel="F" name="resolution" value="0" units="1/dev"/>
+          <inkml:channelProperty channel="OA" name="resolution" value="1000" units="1/deg"/>
+          <inkml:channelProperty channel="OE" name="resolution" value="1000" units="1/deg"/>
+        </inkml:channelProperties>
+      </inkml:inkSource>
+      <inkml:timestamp xml:id="ts0" timeString="2023-11-30T23:52:09.398"/>
+    </inkml:context>
+    <inkml:brush xml:id="br0">
+      <inkml:brushProperty name="width" value="0.05" units="cm"/>
+      <inkml:brushProperty name="height" value="0.05" units="cm"/>
+    </inkml:brush>
+  </inkml:definitions>
+  <inkml:trace contextRef="#ctx0" brushRef="#br0">42 1 14743 0 0,'-11'13'1312'0'0,"6"-8"-1056"0"0,-2 0-256 0 0,1 0 0 0 0,-2 0 536 0 0,3-1 2232 0 0,11-2-3024 0 0,5 0 88 0 0</inkml:trace>
 </inkml:ink>
 </file>
 
@@ -3082,68 +3646,6 @@
           <inkml:channelProperty channel="OE" name="resolution" value="1000" units="1/deg"/>
         </inkml:channelProperties>
       </inkml:inkSource>
-      <inkml:timestamp xml:id="ts0" timeString="2023-11-30T23:51:57.317"/>
-    </inkml:context>
-    <inkml:brush xml:id="br0">
-      <inkml:brushProperty name="width" value="0.05" units="cm"/>
-      <inkml:brushProperty name="height" value="0.05" units="cm"/>
-    </inkml:brush>
-  </inkml:definitions>
-  <inkml:trace contextRef="#ctx0" brushRef="#br0">6 0 8607 0 0,'-1'3'10239'0'0,"-4"10"-10662"0"0,7 6 662 0 0,1 1 0 0 0,0-1 0 0 0,2 0 0 0 0,0 0-1 0 0,1 0 1 0 0,10 22 0 0 0,34 61 965 0 0,-12-37-458 0 0,-25-47-582 0 0,0-1 1 0 0,1 0 0 0 0,1-1 0 0 0,18 14 0 0 0,0 3-3 0 0,-2 2-2 0 0,-21-22-48 0 0,20 18 0 0 0,-21-24-86 0 0,0 0-1 0 0,13 7 0 0 0,-12-8-1 0 0,0 1-1 0 0,0 0 0 0 0,-1 0 0 0 0,9 10 0 0 0,-13-12-23 0 0,-2-2 0 0 0,0 0 0 0 0,0 0 0 0 0,0 0 0 0 0,0 0 0 0 0,5 3 0 0 0,-6-5 0 0 0,34 21 0 0 0,-16-9-67 0 0</inkml:trace>
-</inkml:ink>
-</file>
-
-<file path=ppt/ink/ink81.xml><?xml version="1.0" encoding="utf-8"?>
-<inkml:ink xmlns:inkml="http://www.w3.org/2003/InkML">
-  <inkml:definitions>
-    <inkml:context xml:id="ctx0">
-      <inkml:inkSource xml:id="inkSrc0">
-        <inkml:traceFormat>
-          <inkml:channel name="X" type="integer" min="-2.14748E9" max="2.14748E9" units="cm"/>
-          <inkml:channel name="Y" type="integer" min="-2.14748E9" max="2.14748E9" units="cm"/>
-          <inkml:channel name="F" type="integer" max="32767" units="dev"/>
-          <inkml:channel name="OA" type="integer" max="360" units="deg"/>
-          <inkml:channel name="OE" type="integer" max="90" units="deg"/>
-        </inkml:traceFormat>
-        <inkml:channelProperties>
-          <inkml:channelProperty channel="X" name="resolution" value="1000" units="1/cm"/>
-          <inkml:channelProperty channel="Y" name="resolution" value="1000" units="1/cm"/>
-          <inkml:channelProperty channel="F" name="resolution" value="0" units="1/dev"/>
-          <inkml:channelProperty channel="OA" name="resolution" value="1000" units="1/deg"/>
-          <inkml:channelProperty channel="OE" name="resolution" value="1000" units="1/deg"/>
-        </inkml:channelProperties>
-      </inkml:inkSource>
-      <inkml:timestamp xml:id="ts0" timeString="2023-11-30T23:51:59.638"/>
-    </inkml:context>
-    <inkml:brush xml:id="br0">
-      <inkml:brushProperty name="width" value="0.05" units="cm"/>
-      <inkml:brushProperty name="height" value="0.05" units="cm"/>
-    </inkml:brush>
-  </inkml:definitions>
-  <inkml:trace contextRef="#ctx0" brushRef="#br0">3 1 15199 0 0,'0'0'1488'0'0,"-2"1"128"0"0,4-2-1856 0 0,0 1-880 0 0,0 0-200 0 0</inkml:trace>
-</inkml:ink>
-</file>
-
-<file path=ppt/ink/ink82.xml><?xml version="1.0" encoding="utf-8"?>
-<inkml:ink xmlns:inkml="http://www.w3.org/2003/InkML">
-  <inkml:definitions>
-    <inkml:context xml:id="ctx0">
-      <inkml:inkSource xml:id="inkSrc0">
-        <inkml:traceFormat>
-          <inkml:channel name="X" type="integer" min="-2.14748E9" max="2.14748E9" units="cm"/>
-          <inkml:channel name="Y" type="integer" min="-2.14748E9" max="2.14748E9" units="cm"/>
-          <inkml:channel name="F" type="integer" max="32767" units="dev"/>
-          <inkml:channel name="OA" type="integer" max="360" units="deg"/>
-          <inkml:channel name="OE" type="integer" max="90" units="deg"/>
-        </inkml:traceFormat>
-        <inkml:channelProperties>
-          <inkml:channelProperty channel="X" name="resolution" value="1000" units="1/cm"/>
-          <inkml:channelProperty channel="Y" name="resolution" value="1000" units="1/cm"/>
-          <inkml:channelProperty channel="F" name="resolution" value="0" units="1/dev"/>
-          <inkml:channelProperty channel="OA" name="resolution" value="1000" units="1/deg"/>
-          <inkml:channelProperty channel="OE" name="resolution" value="1000" units="1/deg"/>
-        </inkml:channelProperties>
-      </inkml:inkSource>
       <inkml:timestamp xml:id="ts0" timeString="2023-11-30T23:51:59.968"/>
     </inkml:context>
     <inkml:brush xml:id="br0">
@@ -3155,7 +3657,7 @@
 </inkml:ink>
 </file>
 
-<file path=ppt/ink/ink83.xml><?xml version="1.0" encoding="utf-8"?>
+<file path=ppt/ink/ink81.xml><?xml version="1.0" encoding="utf-8"?>
 <inkml:ink xmlns:inkml="http://www.w3.org/2003/InkML">
   <inkml:definitions>
     <inkml:context xml:id="ctx0">
@@ -3186,7 +3688,7 @@
 </inkml:ink>
 </file>
 
-<file path=ppt/ink/ink84.xml><?xml version="1.0" encoding="utf-8"?>
+<file path=ppt/ink/ink82.xml><?xml version="1.0" encoding="utf-8"?>
 <inkml:ink xmlns:inkml="http://www.w3.org/2003/InkML">
   <inkml:definitions>
     <inkml:context xml:id="ctx0">
@@ -3217,38 +3719,7 @@
 </inkml:ink>
 </file>
 
-<file path=ppt/ink/ink85.xml><?xml version="1.0" encoding="utf-8"?>
-<inkml:ink xmlns:inkml="http://www.w3.org/2003/InkML">
-  <inkml:definitions>
-    <inkml:context xml:id="ctx0">
-      <inkml:inkSource xml:id="inkSrc0">
-        <inkml:traceFormat>
-          <inkml:channel name="X" type="integer" min="-2.14748E9" max="2.14748E9" units="cm"/>
-          <inkml:channel name="Y" type="integer" min="-2.14748E9" max="2.14748E9" units="cm"/>
-          <inkml:channel name="F" type="integer" max="32767" units="dev"/>
-          <inkml:channel name="OA" type="integer" max="360" units="deg"/>
-          <inkml:channel name="OE" type="integer" max="90" units="deg"/>
-        </inkml:traceFormat>
-        <inkml:channelProperties>
-          <inkml:channelProperty channel="X" name="resolution" value="1000" units="1/cm"/>
-          <inkml:channelProperty channel="Y" name="resolution" value="1000" units="1/cm"/>
-          <inkml:channelProperty channel="F" name="resolution" value="0" units="1/dev"/>
-          <inkml:channelProperty channel="OA" name="resolution" value="1000" units="1/deg"/>
-          <inkml:channelProperty channel="OE" name="resolution" value="1000" units="1/deg"/>
-        </inkml:channelProperties>
-      </inkml:inkSource>
-      <inkml:timestamp xml:id="ts0" timeString="2023-11-30T23:52:02.485"/>
-    </inkml:context>
-    <inkml:brush xml:id="br0">
-      <inkml:brushProperty name="width" value="0.05" units="cm"/>
-      <inkml:brushProperty name="height" value="0.05" units="cm"/>
-    </inkml:brush>
-  </inkml:definitions>
-  <inkml:trace contextRef="#ctx0" brushRef="#br0">1 1 8287 0 0,'0'0'8520'0'0</inkml:trace>
-</inkml:ink>
-</file>
-
-<file path=ppt/ink/ink86.xml><?xml version="1.0" encoding="utf-8"?>
+<file path=ppt/ink/ink83.xml><?xml version="1.0" encoding="utf-8"?>
 <inkml:ink xmlns:inkml="http://www.w3.org/2003/InkML">
   <inkml:definitions>
     <inkml:context xml:id="ctx0">
@@ -3279,7 +3750,7 @@
 </inkml:ink>
 </file>
 
-<file path=ppt/ink/ink87.xml><?xml version="1.0" encoding="utf-8"?>
+<file path=ppt/ink/ink84.xml><?xml version="1.0" encoding="utf-8"?>
 <inkml:ink xmlns:inkml="http://www.w3.org/2003/InkML">
   <inkml:definitions>
     <inkml:context xml:id="ctx0">
@@ -3310,7 +3781,7 @@
 </inkml:ink>
 </file>
 
-<file path=ppt/ink/ink88.xml><?xml version="1.0" encoding="utf-8"?>
+<file path=ppt/ink/ink85.xml><?xml version="1.0" encoding="utf-8"?>
 <inkml:ink xmlns:inkml="http://www.w3.org/2003/InkML">
   <inkml:definitions>
     <inkml:context xml:id="ctx0">
@@ -3341,7 +3812,7 @@
 </inkml:ink>
 </file>
 
-<file path=ppt/ink/ink89.xml><?xml version="1.0" encoding="utf-8"?>
+<file path=ppt/ink/ink86.xml><?xml version="1.0" encoding="utf-8"?>
 <inkml:ink xmlns:inkml="http://www.w3.org/2003/InkML">
   <inkml:definitions>
     <inkml:context xml:id="ctx0">
@@ -3370,6 +3841,100 @@
   </inkml:definitions>
   <inkml:trace contextRef="#ctx0" brushRef="#br0">269 603 20735 0 0,'-3'3'2208'0'0,"2"0"-2136"0"0,0-1-72 0 0</inkml:trace>
   <inkml:trace contextRef="#ctx0" brushRef="#br0" timeOffset="1">3 1 18887 0 0,'0'0'2016'0'0,"-2"0"-1360"0"0,7 1-2312 0 0,1 0-360 0 0</inkml:trace>
+</inkml:ink>
+</file>
+
+<file path=ppt/ink/ink87.xml><?xml version="1.0" encoding="utf-8"?>
+<inkml:ink xmlns:inkml="http://www.w3.org/2003/InkML">
+  <inkml:definitions>
+    <inkml:context xml:id="ctx0">
+      <inkml:inkSource xml:id="inkSrc0">
+        <inkml:traceFormat>
+          <inkml:channel name="X" type="integer" min="-2.14748E9" max="2.14748E9" units="cm"/>
+          <inkml:channel name="Y" type="integer" min="-2.14748E9" max="2.14748E9" units="cm"/>
+          <inkml:channel name="F" type="integer" max="32767" units="dev"/>
+          <inkml:channel name="OA" type="integer" max="360" units="deg"/>
+          <inkml:channel name="OE" type="integer" max="90" units="deg"/>
+        </inkml:traceFormat>
+        <inkml:channelProperties>
+          <inkml:channelProperty channel="X" name="resolution" value="1000" units="1/cm"/>
+          <inkml:channelProperty channel="Y" name="resolution" value="1000" units="1/cm"/>
+          <inkml:channelProperty channel="F" name="resolution" value="0" units="1/dev"/>
+          <inkml:channelProperty channel="OA" name="resolution" value="1000" units="1/deg"/>
+          <inkml:channelProperty channel="OE" name="resolution" value="1000" units="1/deg"/>
+        </inkml:channelProperties>
+      </inkml:inkSource>
+      <inkml:timestamp xml:id="ts0" timeString="2023-11-30T23:52:01.746"/>
+    </inkml:context>
+    <inkml:brush xml:id="br0">
+      <inkml:brushProperty name="width" value="0.05" units="cm"/>
+      <inkml:brushProperty name="height" value="0.05" units="cm"/>
+    </inkml:brush>
+  </inkml:definitions>
+  <inkml:trace contextRef="#ctx0" brushRef="#br0">12 5 17159 0 0,'0'0'760'0'0,"-2"0"160"0"0,-1-1-736 0 0,0 1-184 0 0,1-1 0 0 0,1 1 256 0 0,1-3-136 0 0</inkml:trace>
+</inkml:ink>
+</file>
+
+<file path=ppt/ink/ink88.xml><?xml version="1.0" encoding="utf-8"?>
+<inkml:ink xmlns:inkml="http://www.w3.org/2003/InkML">
+  <inkml:definitions>
+    <inkml:context xml:id="ctx0">
+      <inkml:inkSource xml:id="inkSrc0">
+        <inkml:traceFormat>
+          <inkml:channel name="X" type="integer" min="-2.14748E9" max="2.14748E9" units="cm"/>
+          <inkml:channel name="Y" type="integer" min="-2.14748E9" max="2.14748E9" units="cm"/>
+          <inkml:channel name="F" type="integer" max="32767" units="dev"/>
+          <inkml:channel name="OA" type="integer" max="360" units="deg"/>
+          <inkml:channel name="OE" type="integer" max="90" units="deg"/>
+        </inkml:traceFormat>
+        <inkml:channelProperties>
+          <inkml:channelProperty channel="X" name="resolution" value="1000" units="1/cm"/>
+          <inkml:channelProperty channel="Y" name="resolution" value="1000" units="1/cm"/>
+          <inkml:channelProperty channel="F" name="resolution" value="0" units="1/dev"/>
+          <inkml:channelProperty channel="OA" name="resolution" value="1000" units="1/deg"/>
+          <inkml:channelProperty channel="OE" name="resolution" value="1000" units="1/deg"/>
+        </inkml:channelProperties>
+      </inkml:inkSource>
+      <inkml:timestamp xml:id="ts0" timeString="2023-11-30T23:52:02.139"/>
+    </inkml:context>
+    <inkml:brush xml:id="br0">
+      <inkml:brushProperty name="width" value="0.05" units="cm"/>
+      <inkml:brushProperty name="height" value="0.05" units="cm"/>
+    </inkml:brush>
+  </inkml:definitions>
+  <inkml:trace contextRef="#ctx0" brushRef="#br0">6 521 20015 0 0,'-1'6'888'0'0,"0"-3"176"0"0,0 0-848 0 0,-1 0-216 0 0,2 0 0 0 0</inkml:trace>
+  <inkml:trace contextRef="#ctx0" brushRef="#br0" timeOffset="1">306 0 9671 0 0,'-1'4'864'0'0,"-4"5"5912"0"0</inkml:trace>
+</inkml:ink>
+</file>
+
+<file path=ppt/ink/ink89.xml><?xml version="1.0" encoding="utf-8"?>
+<inkml:ink xmlns:inkml="http://www.w3.org/2003/InkML">
+  <inkml:definitions>
+    <inkml:context xml:id="ctx0">
+      <inkml:inkSource xml:id="inkSrc0">
+        <inkml:traceFormat>
+          <inkml:channel name="X" type="integer" min="-2.14748E9" max="2.14748E9" units="cm"/>
+          <inkml:channel name="Y" type="integer" min="-2.14748E9" max="2.14748E9" units="cm"/>
+          <inkml:channel name="F" type="integer" max="32767" units="dev"/>
+          <inkml:channel name="OA" type="integer" max="360" units="deg"/>
+          <inkml:channel name="OE" type="integer" max="90" units="deg"/>
+        </inkml:traceFormat>
+        <inkml:channelProperties>
+          <inkml:channelProperty channel="X" name="resolution" value="1000" units="1/cm"/>
+          <inkml:channelProperty channel="Y" name="resolution" value="1000" units="1/cm"/>
+          <inkml:channelProperty channel="F" name="resolution" value="0" units="1/dev"/>
+          <inkml:channelProperty channel="OA" name="resolution" value="1000" units="1/deg"/>
+          <inkml:channelProperty channel="OE" name="resolution" value="1000" units="1/deg"/>
+        </inkml:channelProperties>
+      </inkml:inkSource>
+      <inkml:timestamp xml:id="ts0" timeString="2023-11-30T23:52:03.543"/>
+    </inkml:context>
+    <inkml:brush xml:id="br0">
+      <inkml:brushProperty name="width" value="0.05" units="cm"/>
+      <inkml:brushProperty name="height" value="0.05" units="cm"/>
+    </inkml:brush>
+  </inkml:definitions>
+  <inkml:trace contextRef="#ctx0" brushRef="#br0">3 0 16127 0 0,'-2'6'1744'0'0,"4"-4"-1744"0"0,2-1 488 0 0,2 0 64 0 0,2-1 16 0 0,2-1 0 0 0</inkml:trace>
 </inkml:ink>
 </file>
 
@@ -3424,100 +3989,6 @@
           <inkml:channelProperty channel="OE" name="resolution" value="1000" units="1/deg"/>
         </inkml:channelProperties>
       </inkml:inkSource>
-      <inkml:timestamp xml:id="ts0" timeString="2023-11-30T23:52:01.746"/>
-    </inkml:context>
-    <inkml:brush xml:id="br0">
-      <inkml:brushProperty name="width" value="0.05" units="cm"/>
-      <inkml:brushProperty name="height" value="0.05" units="cm"/>
-    </inkml:brush>
-  </inkml:definitions>
-  <inkml:trace contextRef="#ctx0" brushRef="#br0">12 5 17159 0 0,'0'0'760'0'0,"-2"0"160"0"0,-1-1-736 0 0,0 1-184 0 0,1-1 0 0 0,1 1 256 0 0,1-3-136 0 0</inkml:trace>
-</inkml:ink>
-</file>
-
-<file path=ppt/ink/ink91.xml><?xml version="1.0" encoding="utf-8"?>
-<inkml:ink xmlns:inkml="http://www.w3.org/2003/InkML">
-  <inkml:definitions>
-    <inkml:context xml:id="ctx0">
-      <inkml:inkSource xml:id="inkSrc0">
-        <inkml:traceFormat>
-          <inkml:channel name="X" type="integer" min="-2.14748E9" max="2.14748E9" units="cm"/>
-          <inkml:channel name="Y" type="integer" min="-2.14748E9" max="2.14748E9" units="cm"/>
-          <inkml:channel name="F" type="integer" max="32767" units="dev"/>
-          <inkml:channel name="OA" type="integer" max="360" units="deg"/>
-          <inkml:channel name="OE" type="integer" max="90" units="deg"/>
-        </inkml:traceFormat>
-        <inkml:channelProperties>
-          <inkml:channelProperty channel="X" name="resolution" value="1000" units="1/cm"/>
-          <inkml:channelProperty channel="Y" name="resolution" value="1000" units="1/cm"/>
-          <inkml:channelProperty channel="F" name="resolution" value="0" units="1/dev"/>
-          <inkml:channelProperty channel="OA" name="resolution" value="1000" units="1/deg"/>
-          <inkml:channelProperty channel="OE" name="resolution" value="1000" units="1/deg"/>
-        </inkml:channelProperties>
-      </inkml:inkSource>
-      <inkml:timestamp xml:id="ts0" timeString="2023-11-30T23:52:02.139"/>
-    </inkml:context>
-    <inkml:brush xml:id="br0">
-      <inkml:brushProperty name="width" value="0.05" units="cm"/>
-      <inkml:brushProperty name="height" value="0.05" units="cm"/>
-    </inkml:brush>
-  </inkml:definitions>
-  <inkml:trace contextRef="#ctx0" brushRef="#br0">6 521 20015 0 0,'-1'6'888'0'0,"0"-3"176"0"0,0 0-848 0 0,-1 0-216 0 0,2 0 0 0 0</inkml:trace>
-  <inkml:trace contextRef="#ctx0" brushRef="#br0" timeOffset="1">306 0 9671 0 0,'-1'4'864'0'0,"-4"5"5912"0"0</inkml:trace>
-</inkml:ink>
-</file>
-
-<file path=ppt/ink/ink92.xml><?xml version="1.0" encoding="utf-8"?>
-<inkml:ink xmlns:inkml="http://www.w3.org/2003/InkML">
-  <inkml:definitions>
-    <inkml:context xml:id="ctx0">
-      <inkml:inkSource xml:id="inkSrc0">
-        <inkml:traceFormat>
-          <inkml:channel name="X" type="integer" min="-2.14748E9" max="2.14748E9" units="cm"/>
-          <inkml:channel name="Y" type="integer" min="-2.14748E9" max="2.14748E9" units="cm"/>
-          <inkml:channel name="F" type="integer" max="32767" units="dev"/>
-          <inkml:channel name="OA" type="integer" max="360" units="deg"/>
-          <inkml:channel name="OE" type="integer" max="90" units="deg"/>
-        </inkml:traceFormat>
-        <inkml:channelProperties>
-          <inkml:channelProperty channel="X" name="resolution" value="1000" units="1/cm"/>
-          <inkml:channelProperty channel="Y" name="resolution" value="1000" units="1/cm"/>
-          <inkml:channelProperty channel="F" name="resolution" value="0" units="1/dev"/>
-          <inkml:channelProperty channel="OA" name="resolution" value="1000" units="1/deg"/>
-          <inkml:channelProperty channel="OE" name="resolution" value="1000" units="1/deg"/>
-        </inkml:channelProperties>
-      </inkml:inkSource>
-      <inkml:timestamp xml:id="ts0" timeString="2023-11-30T23:52:03.543"/>
-    </inkml:context>
-    <inkml:brush xml:id="br0">
-      <inkml:brushProperty name="width" value="0.05" units="cm"/>
-      <inkml:brushProperty name="height" value="0.05" units="cm"/>
-    </inkml:brush>
-  </inkml:definitions>
-  <inkml:trace contextRef="#ctx0" brushRef="#br0">3 0 16127 0 0,'-2'6'1744'0'0,"4"-4"-1744"0"0,2-1 488 0 0,2 0 64 0 0,2-1 16 0 0,2-1 0 0 0</inkml:trace>
-</inkml:ink>
-</file>
-
-<file path=ppt/ink/ink93.xml><?xml version="1.0" encoding="utf-8"?>
-<inkml:ink xmlns:inkml="http://www.w3.org/2003/InkML">
-  <inkml:definitions>
-    <inkml:context xml:id="ctx0">
-      <inkml:inkSource xml:id="inkSrc0">
-        <inkml:traceFormat>
-          <inkml:channel name="X" type="integer" min="-2.14748E9" max="2.14748E9" units="cm"/>
-          <inkml:channel name="Y" type="integer" min="-2.14748E9" max="2.14748E9" units="cm"/>
-          <inkml:channel name="F" type="integer" max="32767" units="dev"/>
-          <inkml:channel name="OA" type="integer" max="360" units="deg"/>
-          <inkml:channel name="OE" type="integer" max="90" units="deg"/>
-        </inkml:traceFormat>
-        <inkml:channelProperties>
-          <inkml:channelProperty channel="X" name="resolution" value="1000" units="1/cm"/>
-          <inkml:channelProperty channel="Y" name="resolution" value="1000" units="1/cm"/>
-          <inkml:channelProperty channel="F" name="resolution" value="0" units="1/dev"/>
-          <inkml:channelProperty channel="OA" name="resolution" value="1000" units="1/deg"/>
-          <inkml:channelProperty channel="OE" name="resolution" value="1000" units="1/deg"/>
-        </inkml:channelProperties>
-      </inkml:inkSource>
       <inkml:timestamp xml:id="ts0" timeString="2023-11-30T23:52:08.703"/>
     </inkml:context>
     <inkml:brush xml:id="br0">
@@ -3529,7 +4000,7 @@
 </inkml:ink>
 </file>
 
-<file path=ppt/ink/ink94.xml><?xml version="1.0" encoding="utf-8"?>
+<file path=ppt/ink/ink91.xml><?xml version="1.0" encoding="utf-8"?>
 <inkml:ink xmlns:inkml="http://www.w3.org/2003/InkML">
   <inkml:definitions>
     <inkml:context xml:id="ctx0">
@@ -3560,7 +4031,7 @@
 </inkml:ink>
 </file>
 
-<file path=ppt/ink/ink95.xml><?xml version="1.0" encoding="utf-8"?>
+<file path=ppt/ink/ink92.xml><?xml version="1.0" encoding="utf-8"?>
 <inkml:ink xmlns:inkml="http://www.w3.org/2003/InkML">
   <inkml:definitions>
     <inkml:context xml:id="ctx0">
@@ -3591,7 +4062,38 @@
 </inkml:ink>
 </file>
 
-<file path=ppt/ink/ink96.xml><?xml version="1.0" encoding="utf-8"?>
+<file path=ppt/ink/ink93.xml><?xml version="1.0" encoding="utf-8"?>
+<inkml:ink xmlns:inkml="http://www.w3.org/2003/InkML">
+  <inkml:definitions>
+    <inkml:context xml:id="ctx0">
+      <inkml:inkSource xml:id="inkSrc0">
+        <inkml:traceFormat>
+          <inkml:channel name="X" type="integer" min="-2.14748E9" max="2.14748E9" units="cm"/>
+          <inkml:channel name="Y" type="integer" min="-2.14748E9" max="2.14748E9" units="cm"/>
+          <inkml:channel name="F" type="integer" max="32767" units="dev"/>
+          <inkml:channel name="OA" type="integer" max="360" units="deg"/>
+          <inkml:channel name="OE" type="integer" max="90" units="deg"/>
+        </inkml:traceFormat>
+        <inkml:channelProperties>
+          <inkml:channelProperty channel="X" name="resolution" value="1000" units="1/cm"/>
+          <inkml:channelProperty channel="Y" name="resolution" value="1000" units="1/cm"/>
+          <inkml:channelProperty channel="F" name="resolution" value="0" units="1/dev"/>
+          <inkml:channelProperty channel="OA" name="resolution" value="1000" units="1/deg"/>
+          <inkml:channelProperty channel="OE" name="resolution" value="1000" units="1/deg"/>
+        </inkml:channelProperties>
+      </inkml:inkSource>
+      <inkml:timestamp xml:id="ts0" timeString="2024-02-09T16:18:01.607"/>
+    </inkml:context>
+    <inkml:brush xml:id="br0">
+      <inkml:brushProperty name="width" value="0.05" units="cm"/>
+      <inkml:brushProperty name="height" value="0.05" units="cm"/>
+    </inkml:brush>
+  </inkml:definitions>
+  <inkml:trace contextRef="#ctx0" brushRef="#br0">8 0 1375 0 0,'-4'6'12427'0'0,"1"-2"-11535"0"0,3 2-662 0 0,0-1 1 0 0,1 1-1 0 0,-1-1 1 0 0,1 0-1 0 0,0 1 0 0 0,1-1 1 0 0,-1 0-1 0 0,1 0 1 0 0,0 1-1 0 0,4 5 0 0 0,3 14 325 0 0,1-1 43 0 0,0 0-1 0 0,1-1 0 0 0,21 31 1 0 0,-17-30-268 0 0,21 41 247 0 0,16 27-83 0 0,-36-70-248 0 0,19 21 1 0 0,-17-23-152 0 0,14 24 1 0 0,-21-29-31 0 0,0 0 0 0 0,0 0 1 0 0,2-2-1 0 0,-1 1 0 0 0,2-2 1 0 0,0 0-1 0 0,0 0 0 0 0,1-2 1 0 0,20 13-1 0 0,-1-3-17 0 0,-15-9 21 0 0,-1 0 1 0 0,35 14-1 0 0,57 17 350 0 0,7 10-174 0 0,-30-2-87 0 0,-47-26-108 0 0,51 34 142 0 0,-82-52-209 0 0,1 0-1 0 0,-1-1 1 0 0,1-1 0 0 0,18 6-1 0 0,23 11-292 0 0,-42-16 252 0 0,1-1-109 0 0,0-2 61 0 0,4 0-2051 0 0</inkml:trace>
+</inkml:ink>
+</file>
+
+<file path=ppt/ink/ink94.xml><?xml version="1.0" encoding="utf-8"?>
 <inkml:ink xmlns:inkml="http://www.w3.org/2003/InkML">
   <inkml:definitions>
     <inkml:context xml:id="ctx0">
@@ -3622,7 +4124,7 @@
 </inkml:ink>
 </file>
 
-<file path=ppt/ink/ink97.xml><?xml version="1.0" encoding="utf-8"?>
+<file path=ppt/ink/ink95.xml><?xml version="1.0" encoding="utf-8"?>
 <inkml:ink xmlns:inkml="http://www.w3.org/2003/InkML">
   <inkml:definitions>
     <inkml:context xml:id="ctx0">
@@ -3653,7 +4155,7 @@
 </inkml:ink>
 </file>
 
-<file path=ppt/ink/ink98.xml><?xml version="1.0" encoding="utf-8"?>
+<file path=ppt/ink/ink96.xml><?xml version="1.0" encoding="utf-8"?>
 <inkml:ink xmlns:inkml="http://www.w3.org/2003/InkML">
   <inkml:definitions>
     <inkml:context xml:id="ctx0">
@@ -3684,7 +4186,7 @@
 </inkml:ink>
 </file>
 
-<file path=ppt/ink/ink99.xml><?xml version="1.0" encoding="utf-8"?>
+<file path=ppt/ink/ink97.xml><?xml version="1.0" encoding="utf-8"?>
 <inkml:ink xmlns:inkml="http://www.w3.org/2003/InkML">
   <inkml:definitions>
     <inkml:context xml:id="ctx0">
@@ -3713,6 +4215,501 @@
   </inkml:definitions>
   <inkml:trace contextRef="#ctx0" brushRef="#br0">1082 0 2759 0 0,'0'0'13503'0'0,"-6"5"-12864"0"0,-36 14 827 0 0,39-18-1386 0 0,1 1-1 0 0,-1 0-7 0 0,0-1-4 0 0,-15 9 642 0 0,16-8-659 0 0,-1-1 0 0 0,1 1 0 0 0,-1-1 0 0 0,0 1 1 0 0,1-1-1 0 0,-1 0 0 0 0,0 0 0 0 0,0 0 0 0 0,-5 0 0 0 0,-8 2-3 0 0,1 1 0 0 0,-1 1 0 0 0,-15 7 0 0 0,12-4 16 0 0,-33 18 0 0 0,-7 1 0 0 0,30-16-64 0 0,-23 14 0 0 0,6-1 0 0 0,39-21 0 0 0,0-1 0 0 0,0 1 0 0 0,1 1 0 0 0,-1 0 0 0 0,-8 6 0 0 0,13-8 11 0 0,-15 10 87 0 0,7-5-49 0 0,0 0 0 0 0,-13 12 0 0 0,-7 4-49 0 0,20-17 15 0 0,0 1-1 0 0,-13 5 1 0 0,-3 1 5 0 0,-34 23-20 0 0,44-25 0 0 0,14-9 0 0 0,0 0 0 0 0,-1 0 0 0 0,-9 6 0 0 0,-12 11 0 0 0,5 0 0 0 0,-13 17 216 0 0,31-35-205 0 0,0 0 32 0 0,0 1-33 0 0,-1 0-10 0 0,-3 3 0 0 0,-8 11 11 0 0,11-14 32 0 0,0 0-33 0 0,-1-1-10 0 0,0 3 0 0 0,5-5 0 0 0,-28 16 0 0 0,24-13 0 0 0,-1 0 0 0 0,1-1 0 0 0,0 1 0 0 0,0 0 0 0 0,-23 21 0 0 0,5-4 128 0 0,14-11-161 0 0,0 0 0 0 0,1 1-1 0 0,0 0 1 0 0,1 0 0 0 0,-5 14-1 0 0,7-21 34 0 0,0 0-13 0 0,2-1-40 0 0,0 2 29 0 0,-1 0-19 0 0,0-1 32 0 0,0 1 11 0 0,1 0 0 0 0,-15 24 0 0 0,15-24 0 0 0,-1 0 0 0 0,0 0 0 0 0,0 0-6 0 0,0-1 1 0 0,0 1-1 0 0,0 0 0 0 0,1 0 1 0 0,-1 6-1 0 0,-4 10-24 0 0,-3 15 30 0 0,9-35 0 0 0,-2 3 0 0 0,-3 12 0 0 0,-1 8 0 0 0,3-4 0 0 0,-2 14 0 0 0,3-29 0 0 0,1 1 0 0 0,-1-1 0 0 0,0 0 0 0 0,1 0 0 0 0,-1 1 0 0 0,1-1 0 0 0,-4 30 0 0 0,2 29 0 0 0,2-50 0 0 0,-2 2 0 0 0,-10 29 0 0 0,5-25 0 0 0,5-15 0 0 0,0 0 0 0 0,1 0 0 0 0,0 1 0 0 0,0-1 0 0 0,0 0 0 0 0,0 1 0 0 0,0-1 0 0 0,1 0 0 0 0,-1 6 0 0 0,0 9 0 0 0,0-3 0 0 0,1 0-21 0 0,0-8 10 0 0,0-1 0 0 0,0 0 1 0 0,-2 13-1 0 0,1 7 11 0 0,1-18 0 0 0,0 0 0 0 0,0 0 0 0 0,-3 14 0 0 0,3-19-5 0 0,-1-1 0 0 0,1 1 0 0 0,-1-1 0 0 0,1 1 1 0 0,0 0-1 0 0,0-1 0 0 0,0 1 0 0 0,0 0 0 0 0,1-1 0 0 0,-1 1 0 0 0,1 0 0 0 0,1 2 0 0 0,-1 22 5 0 0,3 17 0 0 0,-3-29 0 0 0,0-3-12 0 0,5 24-29 0 0,1-18 30 0 0,-7-14 11 0 0,0-1 0 0 0,0 0 0 0 0,0 0 0 0 0,1 0 0 0 0,-1-1 0 0 0,1 1 0 0 0,-1 0 0 0 0,3 4 0 0 0,-2-3 0 0 0,1 0 0 0 0,-1 0 0 0 0,0-1 0 0 0,0 1 0 0 0,-1 0 0 0 0,1 6 0 0 0,-1-2 0 0 0,1 0 0 0 0,0 0 0 0 0,2 11 0 0 0,-2-16 0 0 0,0 0 0 0 0,3 7 0 0 0,-2-6 0 0 0,-1-1 0 0 0,1 1 0 0 0,-1 0 0 0 0,0 0 0 0 0,2 5 0 0 0,-2-5 0 0 0,2 14 0 0 0,-1-11 0 0 0,0 0 0 0 0,0-1 0 0 0,5 13 0 0 0,-1-6 0 0 0,7 17 0 0 0,-12-27 0 0 0,0 0 0 0 0,17 42 122 0 0,1 10-196 0 0,-13-40 74 0 0,1 3 0 0 0,-7-16 0 0 0,0-2 0 0 0,0 0 0 0 0,0 0 0 0 0,0 0 0 0 0,0 0 0 0 0,0 0 0 0 0,0 0 0 0 0,-1 0 0 0 0,1 0 0 0 0,0 0 0 0 0,0 0 0 0 0,0 0 0 0 0,0 0 0 0 0,0 0 0 0 0,0 0 0 0 0,0 0 0 0 0,0 0 0 0 0,0 0 0 0 0,0 0 0 0 0,0 0 0 0 0,0 0 0 0 0,0 0 0 0 0,0 0 0 0 0,0 0 0 0 0,0 0 0 0 0,0 0 0 0 0,0 0 0 0 0,0 0 0 0 0,0 0 0 0 0,6 19 0 0 0,-4-18 0 0 0,1 10 0 0 0,1 5 0 0 0,-5-15 0 0 0,6 14 0 0 0,-3-12 0 0 0,0 0 0 0 0,-1 0 0 0 0,1 0 0 0 0,0 0 0 0 0,-1 0 0 0 0,1 0 0 0 0,0 4 0 0 0,1 0 0 0 0,1-1 0 0 0,0 1 0 0 0,7 9 0 0 0,-6-10 15 0 0,-1 1-1 0 0,-1-1 0 0 0,1 1 1 0 0,4 13-1 0 0,30 38-102 0 0,-18-12 88 0 0,28 45 264 0 0,-30-59-146 0 0,21 16 84 0 0,-29-36-145 0 0,21 20-1 0 0,5 3 23 0 0,3 5 49 0 0,-36-38-128 0 0,21 16 128 0 0,-21-16-128 0 0,10 11 118 0 0,14 21 665 0 0,-25-31-772 0 0,0 0-11 0 0,1-1 0 0 0,-1 0 11 0 0,1 1 31 0 0,17 17 33 0 0,-9-11-53 0 0,0 0-1 0 0,1-1 1 0 0,0-1-1 0 0,19 10 0 0 0,-2-2 0 0 0,7 9-21 0 0,-33-22 0 0 0,-1 0 0 0 0,1 0 0 0 0,15 11 0 0 0,-15-12 28 0 0,-2 0-21 0 0,1-1 0 0 0,0 1 0 0 0,0-1 1 0 0,-1 1-1 0 0,1 0 0 0 0,0 0 0 0 0,-1 0 0 0 0,1 0 0 0 0,-1 0 0 0 0,1 0 1 0 0,-1 0-1 0 0,0 0 0 0 0,2 3 0 0 0,0-2 4 0 0,-2-1 31 0 0,2 1-31 0 0,0 0-11 0 0,1 0 0 0 0,-1 1 0 0 0,0-1 0 0 0,1 0 0 0 0,-1-1 0 0 0,0 1 0 0 0,0-1 0 0 0,3 3 0 0 0,20 11 0 0 0,-23-14 0 0 0,0 1 0 0 0,-1-1 0 0 0,1 0 0 0 0,0 1 0 0 0,0-1 0 0 0,6 3 0 0 0,-1 0 0 0 0,1-1 0 0 0,0 0 0 0 0,15 3 0 0 0,-23-6 0 0 0,45 10 64 0 0,-43-9-64 0 0,-1 0-11 0 0,-1-1-31 0 0,1 0 19 0 0,-1 1-25 0 0,2-1 36 0 0,0 1 1 0 0,-2-1-31 0 0,2 1 20 0 0,-2 0-20 0 0,2 0 31 0 0,0 1 11 0 0,1-1 0 0 0,0 0 0 0 0,-1 1 0 0 0,0-1 0 0 0,1 1 0 0 0,-1-1 0 0 0,0 0 0 0 0,1 0 0 0 0,-1 0-11 0 0,1 1-31 0 0,-1-1 31 0 0,1 0 11 0 0,-1 0-11 0 0,-2-1-31 0 0,4 0 9 0 0,-4 0 16 0 0,0 0 1 0 0,0 0-1 0 0,0 0 0 0 0,0 0 1 0 0,0 0-1 0 0,0 0 0 0 0,0 0 1 0 0,0 1-1 0 0,0-1 0 0 0,0 0 1 0 0,0 1-1 0 0,0-1 0 0 0,0 1 1 0 0,1 0-1 0 0,1 0 6 0 0,-3 0-42 0 0</inkml:trace>
 </inkml:ink>
+</file>
+
+<file path=ppt/ink/ink98.xml><?xml version="1.0" encoding="utf-8"?>
+<inkml:ink xmlns:inkml="http://www.w3.org/2003/InkML">
+  <inkml:definitions>
+    <inkml:context xml:id="ctx0">
+      <inkml:inkSource xml:id="inkSrc0">
+        <inkml:traceFormat>
+          <inkml:channel name="X" type="integer" min="-2.14748E9" max="2.14748E9" units="cm"/>
+          <inkml:channel name="Y" type="integer" min="-2.14748E9" max="2.14748E9" units="cm"/>
+          <inkml:channel name="F" type="integer" max="32767" units="dev"/>
+          <inkml:channel name="OA" type="integer" max="360" units="deg"/>
+          <inkml:channel name="OE" type="integer" max="90" units="deg"/>
+        </inkml:traceFormat>
+        <inkml:channelProperties>
+          <inkml:channelProperty channel="X" name="resolution" value="1000" units="1/cm"/>
+          <inkml:channelProperty channel="Y" name="resolution" value="1000" units="1/cm"/>
+          <inkml:channelProperty channel="F" name="resolution" value="0" units="1/dev"/>
+          <inkml:channelProperty channel="OA" name="resolution" value="1000" units="1/deg"/>
+          <inkml:channelProperty channel="OE" name="resolution" value="1000" units="1/deg"/>
+        </inkml:channelProperties>
+      </inkml:inkSource>
+      <inkml:timestamp xml:id="ts0" timeString="2023-12-01T23:50:32.812"/>
+    </inkml:context>
+    <inkml:brush xml:id="br0">
+      <inkml:brushProperty name="width" value="0.05" units="cm"/>
+      <inkml:brushProperty name="height" value="0.05" units="cm"/>
+    </inkml:brush>
+  </inkml:definitions>
+  <inkml:trace contextRef="#ctx0" brushRef="#br0">678 1 1375 0 0,'0'0'11160'0'0,"-4"10"-9421"0"0,3-8-1667 0 0,-10 15 1579 0 0,3-7-1203 0 0,7-9-384 0 0,-14 16 765 0 0,3-7-296 0 0,-4 15 3 0 0,14-22-482 0 0,0 0-44 0 0,0 0 1 0 0,1 2 36 0 0,1-5-47 0 0,0 0 0 0 0,0 0 0 0 0,0 0 0 0 0,0 0 0 0 0,0 0-1 0 0,0 0 1 0 0,0 0 0 0 0,0 0 0 0 0,0 0 0 0 0,0 0 0 0 0,0 0 0 0 0,0 0 0 0 0,0 0 0 0 0,0 0 0 0 0,0 0 0 0 0,0 0 0 0 0,0 0 0 0 0,0 0 0 0 0,0 0 0 0 0,0 0 0 0 0,0 0 0 0 0,0 0-1 0 0,0 0 1 0 0,0 0 0 0 0,0 0 0 0 0,0 0 0 0 0,0 0 0 0 0,0 1 0 0 0,0-1 0 0 0,0 0 0 0 0,0 0 0 0 0,0 0 0 0 0,0 0 0 0 0,0 0 0 0 0,0 0 0 0 0,0 0 0 0 0,1 0 0 0 0,-1 0-1 0 0,0 0 1 0 0,0 0 0 0 0,0 0 0 0 0,0 0 0 0 0,0 0 0 0 0,0 0 0 0 0,0 0 0 0 0,0 0 0 0 0,0 0 0 0 0,0 0 0 0 0,0 0 0 0 0,-10 20 393 0 0,8-17-393 0 0,0 0 0 0 0,0 0 0 0 0,1-1 11 0 0,0-1 32 0 0,0 1-22 0 0,0-1 32 0 0,1-1 1 0 0,-1 3-44 0 0,-1 0-10 0 0,1 0 0 0 0,0 1 0 0 0,0-1 0 0 0,0 0 0 0 0,0 1 0 0 0,0-1 0 0 0,-1 1 0 0 0,1 1 0 0 0,0 0 0 0 0,0-1 0 0 0,-1 7 0 0 0,1-8 0 0 0,0 0 0 0 0,0 1 0 0 0,0-1 0 0 0,1 0 0 0 0,-1 1 0 0 0,0-1 11 0 0,0-2 32 0 0,-17 43 95 0 0,9-23-74 0 0,1-3 0 0 0,-18 22 416 0 0,-12 13 256 0 0,33-48-696 0 0,0-2 18 0 0,-6 14-28 0 0,-3 10 34 0 0,8-16-64 0 0,5-10 0 0 0,-6 9 0 0 0,0 4 64 0 0,-3 2 0 0 0,10-14-64 0 0,-1 2 0 0 0,-12 11 0 0 0,4-2 0 0 0,-5 7 64 0 0,13-17-64 0 0,-1-1 0 0 0,0 1 0 0 0,0 0 0 0 0,0-1 0 0 0,0 1 0 0 0,-7 13 64 0 0,6-14-64 0 0,-1 4 0 0 0,0 1 0 0 0,3-4 0 0 0,-13 25 0 0 0,12-24 0 0 0,1-1 11 0 0,0-2 32 0 0,-16 37-33 0 0,16-35-10 0 0,0 1 0 0 0,0 0 0 0 0,-1 1 0 0 0,1-3 0 0 0,0 0 0 0 0,0 0 0 0 0,0 0 0 0 0,0 1 0 0 0,0-1 0 0 0,0 0 0 0 0,1 1 0 0 0,-1-1 0 0 0,1 5 0 0 0,-8 18 0 0 0,6-22 0 0 0,-1 10 0 0 0,1-10 0 0 0,0 0 0 0 0,0-1 0 0 0,0 1 0 0 0,0 0 0 0 0,1 0 0 0 0,-1-1 0 0 0,-4 9 0 0 0,5-8 0 0 0,0 0 0 0 0,-7 12 0 0 0,9-13 0 0 0,-10 15 0 0 0,3-9 18 0 0,1-3 12 0 0,-7 23-14 0 0,10-25-16 0 0,-8 19 0 0 0,9-19 0 0 0,-14 33 0 0 0,10-28 0 0 0,1 3 0 0 0,-2 12 0 0 0,0-9 0 0 0,4-11 0 0 0,1 1 0 0 0,-1-1 0 0 0,1 1 0 0 0,0-1 0 0 0,-1 6 0 0 0,-5 18 0 0 0,-7 10 0 0 0,8-23 0 0 0,-6 13 0 0 0,8-12 0 0 0,3-12 0 0 0,-1-1 0 0 0,-4 25 0 0 0,4-18 0 0 0,-5 20 0 0 0,5-20 0 0 0,0-2 0 0 0,0 0 0 0 0,-1 1 0 0 0,0-1 0 0 0,-5 9 0 0 0,6-13 0 0 0,2 0 0 0 0,0 2 0 0 0,-1-4 0 0 0,-6 14 0 0 0,6-12 11 0 0,1-3-11 0 0,0 0 1 0 0,0 0-1 0 0,0 0 1 0 0,0 0-1 0 0,0 0 1 0 0,0 0-1 0 0,0-1 1 0 0,0 1-1 0 0,-1 0 1 0 0,1 0-1 0 0,0 0 1 0 0,0 0-1 0 0,0 0 1 0 0,0 0-1 0 0,0 0 1 0 0,0 0-1 0 0,0 0 0 0 0,0 0 1 0 0,0 0-1 0 0,0 0 1 0 0,0 0-1 0 0,0 0 1 0 0,0 0-1 0 0,0 1 1 0 0,0-1-1 0 0,0 0 1 0 0,0 0-1 0 0,0 0 1 0 0,0 0-1 0 0,0 0 1 0 0,0 0-1 0 0,-1 0 1 0 0,1 0-1 0 0,0 0 1 0 0,0 0-1 0 0,0 0 1 0 0,0 0-1 0 0,0 0 1 0 0,0 0-1 0 0,0 0 0 0 0,0 0 1 0 0,0 0-1 0 0,0 0 1 0 0,0 0-1 0 0,0 0 1 0 0,-3 13 14 0 0,2-7-15 0 0,1-3 0 0 0,-1 0 0 0 0,0 0 0 0 0,0 0 0 0 0,0 0 14 0 0,1 0 50 0 0,-2 0-8 0 0,1 0-60 0 0,0 0-55 0 0,1-1 34 0 0,-2 0-4 0 0,2-1 17 0 0,-4 19-1 0 0,4-17 13 0 0,0 1 0 0 0,-1-1 0 0 0,1 0 0 0 0,0 0 0 0 0,0 0 0 0 0,-1 0 0 0 0,1 0 0 0 0,-2 2 0 0 0,2-5 0 0 0,0 15 0 0 0,-1 0 0 0 0,-4 31 0 0 0,1 3 128 0 0,1-29-192 0 0,1-5 75 0 0,0-2-20 0 0,0 1 0 0 0,0 21 0 0 0,0 54 9 0 0,2-83 0 0 0,1-8 0 0 0,-1 3 0 0 0,-3 25 0 0 0,3-23 0 0 0,-1-5 0 0 0,1 1 0 0 0,-1 3 0 0 0,1 24 0 0 0,0-23 0 0 0,1 0 0 0 0,-1 0 0 0 0,0 1 0 0 0,0 0 0 0 0,0 0 0 0 0,0 0 0 0 0,0-1 0 0 0,0 1 0 0 0,0-1 0 0 0,-1 0 0 0 0,1 1 0 0 0,0-1 0 0 0,1 1 0 0 0,-1 0 0 0 0,0 2 0 0 0,1-8 0 0 0,-1 2 0 0 0,-3 30 0 0 0,2-27 0 0 0,1 1 0 0 0,-1-1 0 0 0,1 0 0 0 0,-1 1 0 0 0,1-1 0 0 0,0 1 0 0 0,0-1 0 0 0,-1 0 0 0 0,2 0 0 0 0,-1 0 0 0 0,-1 1 0 0 0,1 29 0 0 0,3-6 0 0 0,-3-23 0 0 0,0 0 0 0 0,0-1 0 0 0,0 1 0 0 0,0-1 0 0 0,1 0 0 0 0,-1 1 0 0 0,1-1 0 0 0,5 42 72 0 0,-4-38-72 0 0,1 21 0 0 0,3-2 0 0 0,-5-22 0 0 0,0 8 0 0 0,-1-9 0 0 0,1 0 0 0 0,-1 0 0 0 0,1 0 0 0 0,0 0 0 0 0,0 0 0 0 0,-1 0 0 0 0,4 4 0 0 0,-4-7 0 0 0,4 12-18 0 0,-1 0 0 0 0,0 0 0 0 0,1 14 0 0 0,-4-23 18 0 0,1 0 0 0 0,0 1 0 0 0,1-2 0 0 0,-1 0 0 0 0,0 0 0 0 0,0 0 0 0 0,0 1 0 0 0,0-1 0 0 0,0 0 0 0 0,0 0 0 0 0,0 1 0 0 0,0 2 0 0 0,4 18 0 0 0,-4-20 0 0 0,1 0 0 0 0,-1 0 0 0 0,7 18 0 0 0,2 7 0 0 0,-9-24 0 0 0,0-1 0 0 0,0 5 0 0 0,0-4 0 0 0,1 1 0 0 0,-1-1 0 0 0,0 0 0 0 0,1 0 0 0 0,3 5 0 0 0,13 26 0 0 0,10 17 0 0 0,-19-34 0 0 0,-7-13 0 0 0,0 1 0 0 0,0-2 0 0 0,1 1 0 0 0,0 0 0 0 0,4 5 0 0 0,4 3 0 0 0,-9-11 0 0 0,0 0 0 0 0,0 0 0 0 0,0 1 0 0 0,0-1 0 0 0,0 1 0 0 0,-1-1 0 0 0,1 1 0 0 0,-1 0 0 0 0,2 4 0 0 0,-2-3 0 0 0,1-1 0 0 0,8 16 0 0 0,0-3 0 0 0,10 18 0 0 0,-12-22 0 0 0,6 4 0 0 0,0 6 0 0 0,-12-18 0 0 0,-1-3 0 0 0,0-1 0 0 0,-1 0 0 0 0,0 0 0 0 0,0 0 0 0 0,0 0 0 0 0,0 0 0 0 0,0 0 0 0 0,0 0 0 0 0,0 0 0 0 0,0 0 0 0 0,0 0 0 0 0,0 0 0 0 0,0 0 0 0 0,0 0 0 0 0,0 0 0 0 0,0 0 0 0 0,0 0 0 0 0,0 0 0 0 0,0 0 0 0 0,0 0 0 0 0,0 0 0 0 0,0 0 0 0 0,0 0 0 0 0,0 0 0 0 0,0 0 0 0 0,0 0 0 0 0,0 0 0 0 0,1 0 0 0 0,-1 0 0 0 0,0 0 0 0 0,0 0 0 0 0,0 0 0 0 0,0 0 0 0 0,0 0 0 0 0,0 0 0 0 0,0 0 0 0 0,0-1 0 0 0,0 1 0 0 0,0 0 0 0 0,0 0 0 0 0,0 0 0 0 0,0 0 0 0 0,0 0 0 0 0,0 0 0 0 0,0 0 0 0 0,0 0 0 0 0,0 0 0 0 0,0 0 0 0 0,0 0 0 0 0,0 0 0 0 0,0 0 0 0 0,0 0 0 0 0,0 0 0 0 0,0 0 0 0 0,0 0 0 0 0,0 0 0 0 0,0 0 0 0 0,0 0 0 0 0,18 16 0 0 0,-17-15 0 0 0,10 10 0 0 0,-8-9 0 0 0,1 0 0 0 0,0 0 0 0 0,0 0 0 0 0,-1 0 0 0 0,12 5 64 0 0,-1 0-64 0 0,-12-6 0 0 0,30 21 0 0 0,-29-20 0 0 0,23 8 0 0 0,-21-8 0 0 0,19 8 0 0 0,27 9 64 0 0,-50-18-64 0 0,2 3 0 0 0,14 1 0 0 0,-13-5 0 0 0,-1 1 0 0 0,0-1 0 0 0,0 0 12 0 0,-2 0 112 0 0,-1 0-60 0 0,3 0-22 0 0,-2 0-97 0 0,-1 0-26 0 0,3 0 63 0 0,1 1 18 0 0,0-1 0 0 0,0 1 0 0 0,0 0 0 0 0,0-1 0 0 0,1 1 0 0 0,-1 0 0 0 0,0 0 0 0 0,0-1 0 0 0,1-1 0 0 0,-1 1 0 0 0,0 1 0 0 0,0-1 0 0 0,0 2 0 0 0,0-1 0 0 0,0 0 0 0 0,0-1 0 0 0,-1 1 0 0 0,1-1 11 0 0,-3 1 32 0 0,1 0-33 0 0,1 1-10 0 0,2 1 0 0 0,-6-3 0 0 0,24 6 0 0 0,-20-6 0 0 0,1 0 0 0 0,-2 0-12 0 0,-1 0-36 0 0,2-1 36 0 0,0 1 12 0 0,0 2 0 0 0,0-1 0 0 0,-1 1 11 0 0,-2-1 32 0 0,2 0-1477 0 0</inkml:trace>
+</inkml:ink>
+</file>
+
+<file path=ppt/ink/ink99.xml><?xml version="1.0" encoding="utf-8"?>
+<inkml:ink xmlns:inkml="http://www.w3.org/2003/InkML">
+  <inkml:definitions>
+    <inkml:context xml:id="ctx0">
+      <inkml:inkSource xml:id="inkSrc0">
+        <inkml:traceFormat>
+          <inkml:channel name="X" type="integer" min="-2.14748E9" max="2.14748E9" units="cm"/>
+          <inkml:channel name="Y" type="integer" min="-2.14748E9" max="2.14748E9" units="cm"/>
+          <inkml:channel name="F" type="integer" max="32767" units="dev"/>
+          <inkml:channel name="OA" type="integer" max="360" units="deg"/>
+          <inkml:channel name="OE" type="integer" max="90" units="deg"/>
+        </inkml:traceFormat>
+        <inkml:channelProperties>
+          <inkml:channelProperty channel="X" name="resolution" value="1000" units="1/cm"/>
+          <inkml:channelProperty channel="Y" name="resolution" value="1000" units="1/cm"/>
+          <inkml:channelProperty channel="F" name="resolution" value="0" units="1/dev"/>
+          <inkml:channelProperty channel="OA" name="resolution" value="1000" units="1/deg"/>
+          <inkml:channelProperty channel="OE" name="resolution" value="1000" units="1/deg"/>
+        </inkml:channelProperties>
+      </inkml:inkSource>
+      <inkml:timestamp xml:id="ts0" timeString="2023-12-01T23:53:45.712"/>
+    </inkml:context>
+    <inkml:brush xml:id="br0">
+      <inkml:brushProperty name="width" value="0.05" units="cm"/>
+      <inkml:brushProperty name="height" value="0.05" units="cm"/>
+    </inkml:brush>
+  </inkml:definitions>
+  <inkml:trace contextRef="#ctx0" brushRef="#br0">637 1 3623 0 0,'0'0'7784'0'0,"-5"18"-6840"0"0,2-13-773 0 0,0 0 1 0 0,0 0-1 0 0,1 0 0 0 0,0 0 0 0 0,0 0 0 0 0,1 1 0 0 0,-2 5 1 0 0,-7 19 658 0 0,-9 7-154 0 0,3-5 161 0 0,-19 49 0 0 0,28-64-747 0 0,-15 25 0 0 0,15-30-33 0 0,1 0 0 0 0,0 1 1 0 0,0 0-1 0 0,-7 26 0 0 0,11-29-19 0 0,-1-1 0 0 0,0 0 1 0 0,-6 13-1 0 0,-7 14 17 0 0,-10 54-55 0 0,22-78 0 0 0,-1 0 0 0 0,-1-1 0 0 0,-12 22 0 0 0,-21 48 0 0 0,29-59 0 0 0,-44 95 0 0 0,17-44 64 0 0,18-33-64 0 0,9-21 0 0 0,2 0 0 0 0,0 0 0 0 0,-9 33 0 0 0,14-38 0 0 0,-2 0 0 0 0,-7 19 0 0 0,0-1 0 0 0,11-29 0 0 0,-6 14 41 0 0,-16 26-1 0 0,10-19 7 0 0,-12 16-47 0 0,23-37 0 0 0,-1 4 0 0 0,0 0 0 0 0,0 0 0 0 0,0 0 0 0 0,1 1 0 0 0,-3 13 0 0 0,1-3 0 0 0,1 0 0 0 0,-2 26 0 0 0,-4 80 0 0 0,4-8 0 0 0,1-16 0 0 0,2-46-1 0 0,-4 41 194 0 0,1-46-129 0 0,4-39-30 0 0,-1-1 5 0 0,1-1 1 0 0,1 0 0 0 0,0 17-1 0 0,-1-3-39 0 0,0-14 0 0 0,1 0 0 0 0,1 15 0 0 0,2 52 64 0 0,1-15 0 0 0,0-33-64 0 0,-2-13 32 0 0,0 24 0 0 0,2-16-32 0 0,-3-16 9 0 0,0 0 0 0 0,0 0 1 0 0,0 0-1 0 0,-1 0 1 0 0,0 0-1 0 0,0 0 0 0 0,-1 7 1 0 0,1 36 118 0 0,1-12-21 0 0,2 5-97 0 0,-2-39-10 0 0,-1 0 0 0 0,8 29 41 0 0,0-9-18 0 0,-2-1-25 0 0,10 23 15 0 0,-10-31 45 0 0,5 15-63 0 0,-10-26 5 0 0,11 40-5 0 0,-2-12 74 0 0,-6-11-69 0 0,-1-6 22 0 0,1 1-1 0 0,7 18 0 0 0,-5 12 43 0 0,-2-21 0 0 0,9 60-64 0 0,-11-72 0 0 0,7 46 54 0 0,-9-56-44 0 0,0 1-10 0 0,0 0 0 0 0,0-1 0 0 0,0 0 0 0 0,0 1 0 0 0,0-1 0 0 0,0 0 0 0 0,1 1 0 0 0,-1-1 0 0 0,1 0 0 0 0,0 4 0 0 0,2 1 0 0 0,-2 3 36 0 0,7 46 120 0 0,-5-38-96 0 0,6 23 72 0 0,-2-4-68 0 0,-3-24-66 0 0,-2-9 13 0 0,-1 1 0 0 0,1 0 0 0 0,-1 0 0 0 0,0 1 0 0 0,1 5 0 0 0,-1-8-11 0 0,11 47 64 0 0,-10-42-64 0 0,-1-4 0 0 0,0 0 0 0 0,0 0 0 0 0,0 0 0 0 0,0 0 0 0 0,1 0 0 0 0,0 0 0 0 0,0 0 0 0 0,3 3 0 0 0,14 31 37 0 0,-3-2-10 0 0,-8-19-27 0 0,10 14 0 0 0,-16-29 11 0 0,1 3 6 0 0,1-1 0 0 0,-1 1-1 0 0,0-1 1 0 0,-1 1 0 0 0,1 0 0 0 0,-1 0 0 0 0,2 6 0 0 0,-1-4 19 0 0,-2-4-26 0 0,7 18-12 0 0,0 4 15 0 0,-9-20 38 0 0,2-2-32 0 0,0 0 1 0 0,-1 0 0 0 0,1 0 0 0 0,0 0 0 0 0,1 0-1 0 0,1 3 1 0 0,5 11 44 0 0,0 9 0 0 0,-7-23-64 0 0,0 0 0 0 0,-1 0 0 0 0,1-1 0 0 0,-1 1 0 0 0,4 38 64 0 0,0-17-64 0 0,-3-22 11 0 0,1 4 22 0 0,-3 16-13 0 0,1-19-20 0 0,-1 0 0 0 0,-1 3 0 0 0,1-1 0 0 0,4 15 0 0 0,1-6 0 0 0,-3-9 0 0 0,0 1 0 0 0,-1 0 0 0 0,1-1 0 0 0,-1 1 0 0 0,-1 10 0 0 0,1-1 64 0 0,1-12-64 0 0,0-1 0 0 0,-1 1 0 0 0,0 0 0 0 0,1 0 0 0 0,-2 18 0 0 0,1-13 0 0 0,-1 0 0 0 0,1 0 0 0 0,1 0 0 0 0,2 11 0 0 0,-2-8 0 0 0,0-8 0 0 0,-1 0 0 0 0,12 63 11 0 0,-6-13-22 0 0,-3-39 11 0 0,0-1 0 0 0,-1 0 0 0 0,0 18 0 0 0,0-12 24 0 0,2 23 70 0 0,-3-39-94 0 0,0 9-54 0 0,-1-7 42 0 0,1 0 1 0 0,-1 1 0 0 0,1-1-1 0 0,1 0 1 0 0,-1 0 0 0 0,3 6-1 0 0,-3-9 9 0 0,11 53 54 0 0,5 32-51 0 0,-17-84 0 0 0,8 50 0 0 0,6 10 0 0 0,-1-16 0 0 0,1 11 0 0 0,-12-54 0 0 0,2 9 0 0 0,0 11 0 0 0,-3-21 0 0 0,0 0 0 0 0,0 0 0 0 0,0 0 0 0 0,0 0 0 0 0,-1 0 0 0 0,1 0 0 0 0,-1 0 0 0 0,1-1 0 0 0,0 1 0 0 0,0 0 0 0 0,0 0 0 0 0,0 0 0 0 0,1 0 0 0 0,-1 0 0 0 0,0 0 0 0 0,1 0 0 0 0,4 11 0 0 0,2 6 0 0 0,15 19 0 0 0,-21-36 0 0 0,-1-1 0 0 0,1 0 0 0 0,0 1 0 0 0,0-1 0 0 0,0 0 0 0 0,0 0 0 0 0,8 10-64 0 0,-9-12 65 0 0,1 0-5 0 0,7 11 61 0 0,-8-9-47 0 0,1 0-10 0 0,-1 1 0 0 0,1-1 0 0 0,-1 1 0 0 0,1 0 0 0 0,-1-1 0 0 0,0 0 0 0 0,1 1 0 0 0,-2-1-13 0 0,0-1-54 0 0</inkml:trace>
+</inkml:ink>
+</file>
+
+<file path=ppt/notesMasters/notesMaster1.xml><?xml version="1.0" encoding="utf-8"?>
+<p:notesMaster xmlns:a="http://schemas.openxmlformats.org/drawingml/2006/main" xmlns:r="http://schemas.openxmlformats.org/officeDocument/2006/relationships" xmlns:p="http://schemas.openxmlformats.org/presentationml/2006/main">
+  <p:cSld>
+    <p:bg>
+      <p:bgRef idx="1001">
+        <a:schemeClr val="bg1"/>
+      </p:bgRef>
+    </p:bg>
+    <p:spTree>
+      <p:nvGrpSpPr>
+        <p:cNvPr id="1" name=""/>
+        <p:cNvGrpSpPr/>
+        <p:nvPr/>
+      </p:nvGrpSpPr>
+      <p:grpSpPr>
+        <a:xfrm>
+          <a:off x="0" y="0"/>
+          <a:ext cx="0" cy="0"/>
+          <a:chOff x="0" y="0"/>
+          <a:chExt cx="0" cy="0"/>
+        </a:xfrm>
+      </p:grpSpPr>
+      <p:sp>
+        <p:nvSpPr>
+          <p:cNvPr id="2" name="Header Placeholder 1"/>
+          <p:cNvSpPr>
+            <a:spLocks noGrp="1"/>
+          </p:cNvSpPr>
+          <p:nvPr>
+            <p:ph type="hdr" sz="quarter"/>
+          </p:nvPr>
+        </p:nvSpPr>
+        <p:spPr>
+          <a:xfrm>
+            <a:off x="0" y="0"/>
+            <a:ext cx="2971800" cy="458788"/>
+          </a:xfrm>
+          <a:prstGeom prst="rect">
+            <a:avLst/>
+          </a:prstGeom>
+        </p:spPr>
+        <p:txBody>
+          <a:bodyPr vert="horz" lIns="91440" tIns="45720" rIns="91440" bIns="45720" rtlCol="0"/>
+          <a:lstStyle>
+            <a:lvl1pPr algn="l">
+              <a:defRPr sz="1200"/>
+            </a:lvl1pPr>
+          </a:lstStyle>
+          <a:p>
+            <a:endParaRPr lang="en-US"/>
+          </a:p>
+        </p:txBody>
+      </p:sp>
+      <p:sp>
+        <p:nvSpPr>
+          <p:cNvPr id="3" name="Date Placeholder 2"/>
+          <p:cNvSpPr>
+            <a:spLocks noGrp="1"/>
+          </p:cNvSpPr>
+          <p:nvPr>
+            <p:ph type="dt" idx="1"/>
+          </p:nvPr>
+        </p:nvSpPr>
+        <p:spPr>
+          <a:xfrm>
+            <a:off x="3884613" y="0"/>
+            <a:ext cx="2971800" cy="458788"/>
+          </a:xfrm>
+          <a:prstGeom prst="rect">
+            <a:avLst/>
+          </a:prstGeom>
+        </p:spPr>
+        <p:txBody>
+          <a:bodyPr vert="horz" lIns="91440" tIns="45720" rIns="91440" bIns="45720" rtlCol="0"/>
+          <a:lstStyle>
+            <a:lvl1pPr algn="r">
+              <a:defRPr sz="1200"/>
+            </a:lvl1pPr>
+          </a:lstStyle>
+          <a:p>
+            <a:fld id="{3D9C5A52-B489-4E14-A4D5-FD34DEB1E05A}" type="datetimeFigureOut">
+              <a:rPr lang="en-US" smtClean="0"/>
+              <a:t>2/9/2024</a:t>
+            </a:fld>
+            <a:endParaRPr lang="en-US"/>
+          </a:p>
+        </p:txBody>
+      </p:sp>
+      <p:sp>
+        <p:nvSpPr>
+          <p:cNvPr id="4" name="Slide Image Placeholder 3"/>
+          <p:cNvSpPr>
+            <a:spLocks noGrp="1" noRot="1" noChangeAspect="1"/>
+          </p:cNvSpPr>
+          <p:nvPr>
+            <p:ph type="sldImg" idx="2"/>
+          </p:nvPr>
+        </p:nvSpPr>
+        <p:spPr>
+          <a:xfrm>
+            <a:off x="685800" y="1143000"/>
+            <a:ext cx="5486400" cy="3086100"/>
+          </a:xfrm>
+          <a:prstGeom prst="rect">
+            <a:avLst/>
+          </a:prstGeom>
+          <a:noFill/>
+          <a:ln w="12700">
+            <a:solidFill>
+              <a:prstClr val="black"/>
+            </a:solidFill>
+          </a:ln>
+        </p:spPr>
+        <p:txBody>
+          <a:bodyPr vert="horz" lIns="91440" tIns="45720" rIns="91440" bIns="45720" rtlCol="0" anchor="ctr"/>
+          <a:lstStyle/>
+          <a:p>
+            <a:endParaRPr lang="en-US"/>
+          </a:p>
+        </p:txBody>
+      </p:sp>
+      <p:sp>
+        <p:nvSpPr>
+          <p:cNvPr id="5" name="Notes Placeholder 4"/>
+          <p:cNvSpPr>
+            <a:spLocks noGrp="1"/>
+          </p:cNvSpPr>
+          <p:nvPr>
+            <p:ph type="body" sz="quarter" idx="3"/>
+          </p:nvPr>
+        </p:nvSpPr>
+        <p:spPr>
+          <a:xfrm>
+            <a:off x="685800" y="4400550"/>
+            <a:ext cx="5486400" cy="3600450"/>
+          </a:xfrm>
+          <a:prstGeom prst="rect">
+            <a:avLst/>
+          </a:prstGeom>
+        </p:spPr>
+        <p:txBody>
+          <a:bodyPr vert="horz" lIns="91440" tIns="45720" rIns="91440" bIns="45720" rtlCol="0"/>
+          <a:lstStyle/>
+          <a:p>
+            <a:pPr lvl="0"/>
+            <a:r>
+              <a:rPr lang="en-US"/>
+              <a:t>Click to edit Master text styles</a:t>
+            </a:r>
+          </a:p>
+          <a:p>
+            <a:pPr lvl="1"/>
+            <a:r>
+              <a:rPr lang="en-US"/>
+              <a:t>Second level</a:t>
+            </a:r>
+          </a:p>
+          <a:p>
+            <a:pPr lvl="2"/>
+            <a:r>
+              <a:rPr lang="en-US"/>
+              <a:t>Third level</a:t>
+            </a:r>
+          </a:p>
+          <a:p>
+            <a:pPr lvl="3"/>
+            <a:r>
+              <a:rPr lang="en-US"/>
+              <a:t>Fourth level</a:t>
+            </a:r>
+          </a:p>
+          <a:p>
+            <a:pPr lvl="4"/>
+            <a:r>
+              <a:rPr lang="en-US"/>
+              <a:t>Fifth level</a:t>
+            </a:r>
+          </a:p>
+        </p:txBody>
+      </p:sp>
+      <p:sp>
+        <p:nvSpPr>
+          <p:cNvPr id="6" name="Footer Placeholder 5"/>
+          <p:cNvSpPr>
+            <a:spLocks noGrp="1"/>
+          </p:cNvSpPr>
+          <p:nvPr>
+            <p:ph type="ftr" sz="quarter" idx="4"/>
+          </p:nvPr>
+        </p:nvSpPr>
+        <p:spPr>
+          <a:xfrm>
+            <a:off x="0" y="8685213"/>
+            <a:ext cx="2971800" cy="458787"/>
+          </a:xfrm>
+          <a:prstGeom prst="rect">
+            <a:avLst/>
+          </a:prstGeom>
+        </p:spPr>
+        <p:txBody>
+          <a:bodyPr vert="horz" lIns="91440" tIns="45720" rIns="91440" bIns="45720" rtlCol="0" anchor="b"/>
+          <a:lstStyle>
+            <a:lvl1pPr algn="l">
+              <a:defRPr sz="1200"/>
+            </a:lvl1pPr>
+          </a:lstStyle>
+          <a:p>
+            <a:endParaRPr lang="en-US"/>
+          </a:p>
+        </p:txBody>
+      </p:sp>
+      <p:sp>
+        <p:nvSpPr>
+          <p:cNvPr id="7" name="Slide Number Placeholder 6"/>
+          <p:cNvSpPr>
+            <a:spLocks noGrp="1"/>
+          </p:cNvSpPr>
+          <p:nvPr>
+            <p:ph type="sldNum" sz="quarter" idx="5"/>
+          </p:nvPr>
+        </p:nvSpPr>
+        <p:spPr>
+          <a:xfrm>
+            <a:off x="3884613" y="8685213"/>
+            <a:ext cx="2971800" cy="458787"/>
+          </a:xfrm>
+          <a:prstGeom prst="rect">
+            <a:avLst/>
+          </a:prstGeom>
+        </p:spPr>
+        <p:txBody>
+          <a:bodyPr vert="horz" lIns="91440" tIns="45720" rIns="91440" bIns="45720" rtlCol="0" anchor="b"/>
+          <a:lstStyle>
+            <a:lvl1pPr algn="r">
+              <a:defRPr sz="1200"/>
+            </a:lvl1pPr>
+          </a:lstStyle>
+          <a:p>
+            <a:fld id="{A20B10A0-3D95-42AF-A8C8-73971733E23E}" type="slidenum">
+              <a:rPr lang="en-US" smtClean="0"/>
+              <a:t>‹#›</a:t>
+            </a:fld>
+            <a:endParaRPr lang="en-US"/>
+          </a:p>
+        </p:txBody>
+      </p:sp>
+    </p:spTree>
+    <p:extLst>
+      <p:ext uri="{BB962C8B-B14F-4D97-AF65-F5344CB8AC3E}">
+        <p14:creationId xmlns:p14="http://schemas.microsoft.com/office/powerpoint/2010/main" val="4173056060"/>
+      </p:ext>
+    </p:extLst>
+  </p:cSld>
+  <p:clrMap bg1="lt1" tx1="dk1" bg2="lt2" tx2="dk2" accent1="accent1" accent2="accent2" accent3="accent3" accent4="accent4" accent5="accent5" accent6="accent6" hlink="hlink" folHlink="folHlink"/>
+  <p:notesStyle>
+    <a:lvl1pPr marL="0" algn="l" defTabSz="914400" rtl="0" eaLnBrk="1" latinLnBrk="0" hangingPunct="1">
+      <a:defRPr sz="1200" kern="1200">
+        <a:solidFill>
+          <a:schemeClr val="tx1"/>
+        </a:solidFill>
+        <a:latin typeface="+mn-lt"/>
+        <a:ea typeface="+mn-ea"/>
+        <a:cs typeface="+mn-cs"/>
+      </a:defRPr>
+    </a:lvl1pPr>
+    <a:lvl2pPr marL="457200" algn="l" defTabSz="914400" rtl="0" eaLnBrk="1" latinLnBrk="0" hangingPunct="1">
+      <a:defRPr sz="1200" kern="1200">
+        <a:solidFill>
+          <a:schemeClr val="tx1"/>
+        </a:solidFill>
+        <a:latin typeface="+mn-lt"/>
+        <a:ea typeface="+mn-ea"/>
+        <a:cs typeface="+mn-cs"/>
+      </a:defRPr>
+    </a:lvl2pPr>
+    <a:lvl3pPr marL="914400" algn="l" defTabSz="914400" rtl="0" eaLnBrk="1" latinLnBrk="0" hangingPunct="1">
+      <a:defRPr sz="1200" kern="1200">
+        <a:solidFill>
+          <a:schemeClr val="tx1"/>
+        </a:solidFill>
+        <a:latin typeface="+mn-lt"/>
+        <a:ea typeface="+mn-ea"/>
+        <a:cs typeface="+mn-cs"/>
+      </a:defRPr>
+    </a:lvl3pPr>
+    <a:lvl4pPr marL="1371600" algn="l" defTabSz="914400" rtl="0" eaLnBrk="1" latinLnBrk="0" hangingPunct="1">
+      <a:defRPr sz="1200" kern="1200">
+        <a:solidFill>
+          <a:schemeClr val="tx1"/>
+        </a:solidFill>
+        <a:latin typeface="+mn-lt"/>
+        <a:ea typeface="+mn-ea"/>
+        <a:cs typeface="+mn-cs"/>
+      </a:defRPr>
+    </a:lvl4pPr>
+    <a:lvl5pPr marL="1828800" algn="l" defTabSz="914400" rtl="0" eaLnBrk="1" latinLnBrk="0" hangingPunct="1">
+      <a:defRPr sz="1200" kern="1200">
+        <a:solidFill>
+          <a:schemeClr val="tx1"/>
+        </a:solidFill>
+        <a:latin typeface="+mn-lt"/>
+        <a:ea typeface="+mn-ea"/>
+        <a:cs typeface="+mn-cs"/>
+      </a:defRPr>
+    </a:lvl5pPr>
+    <a:lvl6pPr marL="2286000" algn="l" defTabSz="914400" rtl="0" eaLnBrk="1" latinLnBrk="0" hangingPunct="1">
+      <a:defRPr sz="1200" kern="1200">
+        <a:solidFill>
+          <a:schemeClr val="tx1"/>
+        </a:solidFill>
+        <a:latin typeface="+mn-lt"/>
+        <a:ea typeface="+mn-ea"/>
+        <a:cs typeface="+mn-cs"/>
+      </a:defRPr>
+    </a:lvl6pPr>
+    <a:lvl7pPr marL="2743200" algn="l" defTabSz="914400" rtl="0" eaLnBrk="1" latinLnBrk="0" hangingPunct="1">
+      <a:defRPr sz="1200" kern="1200">
+        <a:solidFill>
+          <a:schemeClr val="tx1"/>
+        </a:solidFill>
+        <a:latin typeface="+mn-lt"/>
+        <a:ea typeface="+mn-ea"/>
+        <a:cs typeface="+mn-cs"/>
+      </a:defRPr>
+    </a:lvl7pPr>
+    <a:lvl8pPr marL="3200400" algn="l" defTabSz="914400" rtl="0" eaLnBrk="1" latinLnBrk="0" hangingPunct="1">
+      <a:defRPr sz="1200" kern="1200">
+        <a:solidFill>
+          <a:schemeClr val="tx1"/>
+        </a:solidFill>
+        <a:latin typeface="+mn-lt"/>
+        <a:ea typeface="+mn-ea"/>
+        <a:cs typeface="+mn-cs"/>
+      </a:defRPr>
+    </a:lvl8pPr>
+    <a:lvl9pPr marL="3657600" algn="l" defTabSz="914400" rtl="0" eaLnBrk="1" latinLnBrk="0" hangingPunct="1">
+      <a:defRPr sz="1200" kern="1200">
+        <a:solidFill>
+          <a:schemeClr val="tx1"/>
+        </a:solidFill>
+        <a:latin typeface="+mn-lt"/>
+        <a:ea typeface="+mn-ea"/>
+        <a:cs typeface="+mn-cs"/>
+      </a:defRPr>
+    </a:lvl9pPr>
+  </p:notesStyle>
+</p:notesMaster>
+</file>
+
+<file path=ppt/notesSlides/notesSlide1.xml><?xml version="1.0" encoding="utf-8"?>
+<p:notes xmlns:a="http://schemas.openxmlformats.org/drawingml/2006/main" xmlns:r="http://schemas.openxmlformats.org/officeDocument/2006/relationships" xmlns:p="http://schemas.openxmlformats.org/presentationml/2006/main">
+  <p:cSld>
+    <p:spTree>
+      <p:nvGrpSpPr>
+        <p:cNvPr id="1" name=""/>
+        <p:cNvGrpSpPr/>
+        <p:nvPr/>
+      </p:nvGrpSpPr>
+      <p:grpSpPr>
+        <a:xfrm>
+          <a:off x="0" y="0"/>
+          <a:ext cx="0" cy="0"/>
+          <a:chOff x="0" y="0"/>
+          <a:chExt cx="0" cy="0"/>
+        </a:xfrm>
+      </p:grpSpPr>
+      <p:sp>
+        <p:nvSpPr>
+          <p:cNvPr id="2" name="Slide Image Placeholder 1"/>
+          <p:cNvSpPr>
+            <a:spLocks noGrp="1" noRot="1" noChangeAspect="1"/>
+          </p:cNvSpPr>
+          <p:nvPr>
+            <p:ph type="sldImg"/>
+          </p:nvPr>
+        </p:nvSpPr>
+        <p:spPr/>
+      </p:sp>
+      <p:sp>
+        <p:nvSpPr>
+          <p:cNvPr id="3" name="Notes Placeholder 2"/>
+          <p:cNvSpPr>
+            <a:spLocks noGrp="1"/>
+          </p:cNvSpPr>
+          <p:nvPr>
+            <p:ph type="body" idx="1"/>
+          </p:nvPr>
+        </p:nvSpPr>
+        <p:spPr/>
+        <p:txBody>
+          <a:bodyPr/>
+          <a:lstStyle/>
+          <a:p>
+            <a:endParaRPr lang="en-US" dirty="0"/>
+          </a:p>
+        </p:txBody>
+      </p:sp>
+      <p:sp>
+        <p:nvSpPr>
+          <p:cNvPr id="4" name="Slide Number Placeholder 3"/>
+          <p:cNvSpPr>
+            <a:spLocks noGrp="1"/>
+          </p:cNvSpPr>
+          <p:nvPr>
+            <p:ph type="sldNum" sz="quarter" idx="5"/>
+          </p:nvPr>
+        </p:nvSpPr>
+        <p:spPr/>
+        <p:txBody>
+          <a:bodyPr/>
+          <a:lstStyle/>
+          <a:p>
+            <a:fld id="{A20B10A0-3D95-42AF-A8C8-73971733E23E}" type="slidenum">
+              <a:rPr lang="en-US" smtClean="0"/>
+              <a:t>4</a:t>
+            </a:fld>
+            <a:endParaRPr lang="en-US"/>
+          </a:p>
+        </p:txBody>
+      </p:sp>
+    </p:spTree>
+    <p:extLst>
+      <p:ext uri="{BB962C8B-B14F-4D97-AF65-F5344CB8AC3E}">
+        <p14:creationId xmlns:p14="http://schemas.microsoft.com/office/powerpoint/2010/main" val="3026643"/>
+      </p:ext>
+    </p:extLst>
+  </p:cSld>
+  <p:clrMapOvr>
+    <a:masterClrMapping/>
+  </p:clrMapOvr>
+</p:notes>
 </file>
 
 <file path=ppt/slideLayouts/slideLayout1.xml><?xml version="1.0" encoding="utf-8"?>
@@ -3862,7 +4859,7 @@
           <a:p>
             <a:fld id="{163D218E-43FB-4039-B3FD-FB4E9D4A6F67}" type="datetimeFigureOut">
               <a:rPr lang="en-US" smtClean="0"/>
-              <a:t>12/4/2023</a:t>
+              <a:t>2/9/2024</a:t>
             </a:fld>
             <a:endParaRPr lang="en-US"/>
           </a:p>
@@ -4060,7 +5057,7 @@
           <a:p>
             <a:fld id="{163D218E-43FB-4039-B3FD-FB4E9D4A6F67}" type="datetimeFigureOut">
               <a:rPr lang="en-US" smtClean="0"/>
-              <a:t>12/4/2023</a:t>
+              <a:t>2/9/2024</a:t>
             </a:fld>
             <a:endParaRPr lang="en-US"/>
           </a:p>
@@ -4268,7 +5265,7 @@
           <a:p>
             <a:fld id="{163D218E-43FB-4039-B3FD-FB4E9D4A6F67}" type="datetimeFigureOut">
               <a:rPr lang="en-US" smtClean="0"/>
-              <a:t>12/4/2023</a:t>
+              <a:t>2/9/2024</a:t>
             </a:fld>
             <a:endParaRPr lang="en-US"/>
           </a:p>
@@ -4466,7 +5463,7 @@
           <a:p>
             <a:fld id="{163D218E-43FB-4039-B3FD-FB4E9D4A6F67}" type="datetimeFigureOut">
               <a:rPr lang="en-US" smtClean="0"/>
-              <a:t>12/4/2023</a:t>
+              <a:t>2/9/2024</a:t>
             </a:fld>
             <a:endParaRPr lang="en-US"/>
           </a:p>
@@ -4741,7 +5738,7 @@
           <a:p>
             <a:fld id="{163D218E-43FB-4039-B3FD-FB4E9D4A6F67}" type="datetimeFigureOut">
               <a:rPr lang="en-US" smtClean="0"/>
-              <a:t>12/4/2023</a:t>
+              <a:t>2/9/2024</a:t>
             </a:fld>
             <a:endParaRPr lang="en-US"/>
           </a:p>
@@ -5006,7 +6003,7 @@
           <a:p>
             <a:fld id="{163D218E-43FB-4039-B3FD-FB4E9D4A6F67}" type="datetimeFigureOut">
               <a:rPr lang="en-US" smtClean="0"/>
-              <a:t>12/4/2023</a:t>
+              <a:t>2/9/2024</a:t>
             </a:fld>
             <a:endParaRPr lang="en-US"/>
           </a:p>
@@ -5418,7 +6415,7 @@
           <a:p>
             <a:fld id="{163D218E-43FB-4039-B3FD-FB4E9D4A6F67}" type="datetimeFigureOut">
               <a:rPr lang="en-US" smtClean="0"/>
-              <a:t>12/4/2023</a:t>
+              <a:t>2/9/2024</a:t>
             </a:fld>
             <a:endParaRPr lang="en-US"/>
           </a:p>
@@ -5559,7 +6556,7 @@
           <a:p>
             <a:fld id="{163D218E-43FB-4039-B3FD-FB4E9D4A6F67}" type="datetimeFigureOut">
               <a:rPr lang="en-US" smtClean="0"/>
-              <a:t>12/4/2023</a:t>
+              <a:t>2/9/2024</a:t>
             </a:fld>
             <a:endParaRPr lang="en-US"/>
           </a:p>
@@ -5672,7 +6669,7 @@
           <a:p>
             <a:fld id="{163D218E-43FB-4039-B3FD-FB4E9D4A6F67}" type="datetimeFigureOut">
               <a:rPr lang="en-US" smtClean="0"/>
-              <a:t>12/4/2023</a:t>
+              <a:t>2/9/2024</a:t>
             </a:fld>
             <a:endParaRPr lang="en-US"/>
           </a:p>
@@ -5983,7 +6980,7 @@
           <a:p>
             <a:fld id="{163D218E-43FB-4039-B3FD-FB4E9D4A6F67}" type="datetimeFigureOut">
               <a:rPr lang="en-US" smtClean="0"/>
-              <a:t>12/4/2023</a:t>
+              <a:t>2/9/2024</a:t>
             </a:fld>
             <a:endParaRPr lang="en-US"/>
           </a:p>
@@ -6271,7 +7268,7 @@
           <a:p>
             <a:fld id="{163D218E-43FB-4039-B3FD-FB4E9D4A6F67}" type="datetimeFigureOut">
               <a:rPr lang="en-US" smtClean="0"/>
-              <a:t>12/4/2023</a:t>
+              <a:t>2/9/2024</a:t>
             </a:fld>
             <a:endParaRPr lang="en-US"/>
           </a:p>
@@ -6512,7 +7509,7 @@
           <a:p>
             <a:fld id="{163D218E-43FB-4039-B3FD-FB4E9D4A6F67}" type="datetimeFigureOut">
               <a:rPr lang="en-US" smtClean="0"/>
-              <a:t>12/4/2023</a:t>
+              <a:t>2/9/2024</a:t>
             </a:fld>
             <a:endParaRPr lang="en-US"/>
           </a:p>
@@ -12360,8 +13357,8 @@
             <a:chExt cx="356655" cy="1555750"/>
           </a:xfrm>
         </p:grpSpPr>
-        <mc:AlternateContent xmlns:mc="http://schemas.openxmlformats.org/markup-compatibility/2006">
-          <mc:Choice xmlns:p14="http://schemas.microsoft.com/office/powerpoint/2010/main" Requires="p14">
+        <mc:AlternateContent xmlns:mc="http://schemas.openxmlformats.org/markup-compatibility/2006" xmlns:p14="http://schemas.microsoft.com/office/powerpoint/2010/main">
+          <mc:Choice Requires="p14">
             <p:contentPart p14:bwMode="auto" r:id="rId2">
               <p14:nvContentPartPr>
                 <p14:cNvPr id="26" name="Ink 25">
@@ -12380,7 +13377,7 @@
               </p14:xfrm>
             </p:contentPart>
           </mc:Choice>
-          <mc:Fallback>
+          <mc:Fallback xmlns="">
             <p:pic>
               <p:nvPicPr>
                 <p:cNvPr id="26" name="Ink 25">
@@ -12411,8 +13408,8 @@
             </p:pic>
           </mc:Fallback>
         </mc:AlternateContent>
-        <mc:AlternateContent xmlns:mc="http://schemas.openxmlformats.org/markup-compatibility/2006">
-          <mc:Choice xmlns:p14="http://schemas.microsoft.com/office/powerpoint/2010/main" Requires="p14">
+        <mc:AlternateContent xmlns:mc="http://schemas.openxmlformats.org/markup-compatibility/2006" xmlns:p14="http://schemas.microsoft.com/office/powerpoint/2010/main">
+          <mc:Choice Requires="p14">
             <p:contentPart p14:bwMode="auto" r:id="rId4">
               <p14:nvContentPartPr>
                 <p14:cNvPr id="34" name="Ink 33">
@@ -12431,7 +13428,7 @@
               </p14:xfrm>
             </p:contentPart>
           </mc:Choice>
-          <mc:Fallback>
+          <mc:Fallback xmlns="">
             <p:pic>
               <p:nvPicPr>
                 <p:cNvPr id="34" name="Ink 33">
@@ -12483,8 +13480,8 @@
             <a:chExt cx="875550" cy="1582737"/>
           </a:xfrm>
         </p:grpSpPr>
-        <mc:AlternateContent xmlns:mc="http://schemas.openxmlformats.org/markup-compatibility/2006">
-          <mc:Choice xmlns:p14="http://schemas.microsoft.com/office/powerpoint/2010/main" Requires="p14">
+        <mc:AlternateContent xmlns:mc="http://schemas.openxmlformats.org/markup-compatibility/2006" xmlns:p14="http://schemas.microsoft.com/office/powerpoint/2010/main">
+          <mc:Choice Requires="p14">
             <p:contentPart p14:bwMode="auto" r:id="rId6">
               <p14:nvContentPartPr>
                 <p14:cNvPr id="32" name="Ink 31">
@@ -12503,7 +13500,7 @@
               </p14:xfrm>
             </p:contentPart>
           </mc:Choice>
-          <mc:Fallback>
+          <mc:Fallback xmlns="">
             <p:pic>
               <p:nvPicPr>
                 <p:cNvPr id="32" name="Ink 31">
@@ -12534,8 +13531,8 @@
             </p:pic>
           </mc:Fallback>
         </mc:AlternateContent>
-        <mc:AlternateContent xmlns:mc="http://schemas.openxmlformats.org/markup-compatibility/2006">
-          <mc:Choice xmlns:p14="http://schemas.microsoft.com/office/powerpoint/2010/main" Requires="p14">
+        <mc:AlternateContent xmlns:mc="http://schemas.openxmlformats.org/markup-compatibility/2006" xmlns:p14="http://schemas.microsoft.com/office/powerpoint/2010/main">
+          <mc:Choice Requires="p14">
             <p:contentPart p14:bwMode="auto" r:id="rId8">
               <p14:nvContentPartPr>
                 <p14:cNvPr id="35" name="Ink 34">
@@ -12554,7 +13551,7 @@
               </p14:xfrm>
             </p:contentPart>
           </mc:Choice>
-          <mc:Fallback>
+          <mc:Fallback xmlns="">
             <p:pic>
               <p:nvPicPr>
                 <p:cNvPr id="35" name="Ink 34">
@@ -12606,8 +13603,8 @@
             <a:chExt cx="1001063" cy="1127125"/>
           </a:xfrm>
         </p:grpSpPr>
-        <mc:AlternateContent xmlns:mc="http://schemas.openxmlformats.org/markup-compatibility/2006">
-          <mc:Choice xmlns:p14="http://schemas.microsoft.com/office/powerpoint/2010/main" Requires="p14">
+        <mc:AlternateContent xmlns:mc="http://schemas.openxmlformats.org/markup-compatibility/2006" xmlns:p14="http://schemas.microsoft.com/office/powerpoint/2010/main">
+          <mc:Choice Requires="p14">
             <p:contentPart p14:bwMode="auto" r:id="rId10">
               <p14:nvContentPartPr>
                 <p14:cNvPr id="33" name="Ink 32">
@@ -12626,7 +13623,7 @@
               </p14:xfrm>
             </p:contentPart>
           </mc:Choice>
-          <mc:Fallback>
+          <mc:Fallback xmlns="">
             <p:pic>
               <p:nvPicPr>
                 <p:cNvPr id="33" name="Ink 32">
@@ -12657,8 +13654,8 @@
             </p:pic>
           </mc:Fallback>
         </mc:AlternateContent>
-        <mc:AlternateContent xmlns:mc="http://schemas.openxmlformats.org/markup-compatibility/2006">
-          <mc:Choice xmlns:p14="http://schemas.microsoft.com/office/powerpoint/2010/main" Requires="p14">
+        <mc:AlternateContent xmlns:mc="http://schemas.openxmlformats.org/markup-compatibility/2006" xmlns:p14="http://schemas.microsoft.com/office/powerpoint/2010/main">
+          <mc:Choice Requires="p14">
             <p:contentPart p14:bwMode="auto" r:id="rId12">
               <p14:nvContentPartPr>
                 <p14:cNvPr id="36" name="Ink 35">
@@ -12677,7 +13674,7 @@
               </p14:xfrm>
             </p:contentPart>
           </mc:Choice>
-          <mc:Fallback>
+          <mc:Fallback xmlns="">
             <p:pic>
               <p:nvPicPr>
                 <p:cNvPr id="36" name="Ink 35">
@@ -12713,6 +13710,1151 @@
     <p:extLst>
       <p:ext uri="{BB962C8B-B14F-4D97-AF65-F5344CB8AC3E}">
         <p14:creationId xmlns:p14="http://schemas.microsoft.com/office/powerpoint/2010/main" val="4119147712"/>
+      </p:ext>
+    </p:extLst>
+  </p:cSld>
+  <p:clrMapOvr>
+    <a:masterClrMapping/>
+  </p:clrMapOvr>
+</p:sld>
+</file>
+
+<file path=ppt/slides/slide11.xml><?xml version="1.0" encoding="utf-8"?>
+<p:sld xmlns:a="http://schemas.openxmlformats.org/drawingml/2006/main" xmlns:r="http://schemas.openxmlformats.org/officeDocument/2006/relationships" xmlns:p="http://schemas.openxmlformats.org/presentationml/2006/main">
+  <p:cSld>
+    <p:spTree>
+      <p:nvGrpSpPr>
+        <p:cNvPr id="1" name="">
+          <a:extLst>
+            <a:ext uri="{FF2B5EF4-FFF2-40B4-BE49-F238E27FC236}">
+              <a16:creationId xmlns:a16="http://schemas.microsoft.com/office/drawing/2014/main" id="{B08233FA-10AC-529C-73FA-10623835FF11}"/>
+            </a:ext>
+          </a:extLst>
+        </p:cNvPr>
+        <p:cNvGrpSpPr/>
+        <p:nvPr/>
+      </p:nvGrpSpPr>
+      <p:grpSpPr>
+        <a:xfrm>
+          <a:off x="0" y="0"/>
+          <a:ext cx="0" cy="0"/>
+          <a:chOff x="0" y="0"/>
+          <a:chExt cx="0" cy="0"/>
+        </a:xfrm>
+      </p:grpSpPr>
+      <p:sp>
+        <p:nvSpPr>
+          <p:cNvPr id="4" name="Rectangle 3">
+            <a:extLst>
+              <a:ext uri="{FF2B5EF4-FFF2-40B4-BE49-F238E27FC236}">
+                <a16:creationId xmlns:a16="http://schemas.microsoft.com/office/drawing/2014/main" id="{20394889-4CFE-E97C-52E1-D022C86C130B}"/>
+              </a:ext>
+            </a:extLst>
+          </p:cNvPr>
+          <p:cNvSpPr/>
+          <p:nvPr/>
+        </p:nvSpPr>
+        <p:spPr>
+          <a:xfrm>
+            <a:off x="2015175" y="2154955"/>
+            <a:ext cx="2451989" cy="2253967"/>
+          </a:xfrm>
+          <a:prstGeom prst="rect">
+            <a:avLst/>
+          </a:prstGeom>
+          <a:noFill/>
+        </p:spPr>
+        <p:style>
+          <a:lnRef idx="2">
+            <a:schemeClr val="accent1">
+              <a:shade val="15000"/>
+            </a:schemeClr>
+          </a:lnRef>
+          <a:fillRef idx="1">
+            <a:schemeClr val="accent1"/>
+          </a:fillRef>
+          <a:effectRef idx="0">
+            <a:schemeClr val="accent1"/>
+          </a:effectRef>
+          <a:fontRef idx="minor">
+            <a:schemeClr val="lt1"/>
+          </a:fontRef>
+        </p:style>
+        <p:txBody>
+          <a:bodyPr rtlCol="0" anchor="ctr"/>
+          <a:lstStyle/>
+          <a:p>
+            <a:pPr algn="ctr"/>
+            <a:endParaRPr lang="en-US"/>
+          </a:p>
+        </p:txBody>
+      </p:sp>
+      <mc:AlternateContent xmlns:mc="http://schemas.openxmlformats.org/markup-compatibility/2006" xmlns:p14="http://schemas.microsoft.com/office/powerpoint/2010/main">
+        <mc:Choice Requires="p14">
+          <p:contentPart p14:bwMode="auto" r:id="rId2">
+            <p14:nvContentPartPr>
+              <p14:cNvPr id="3" name="Ink 2">
+                <a:extLst>
+                  <a:ext uri="{FF2B5EF4-FFF2-40B4-BE49-F238E27FC236}">
+                    <a16:creationId xmlns:a16="http://schemas.microsoft.com/office/drawing/2014/main" id="{FC821799-8537-C40A-C992-CF1E9B5861A7}"/>
+                  </a:ext>
+                </a:extLst>
+              </p14:cNvPr>
+              <p14:cNvContentPartPr/>
+              <p14:nvPr/>
+            </p14:nvContentPartPr>
+            <p14:xfrm>
+              <a:off x="2907018" y="2668437"/>
+              <a:ext cx="789840" cy="1213200"/>
+            </p14:xfrm>
+          </p:contentPart>
+        </mc:Choice>
+        <mc:Fallback xmlns="">
+          <p:pic>
+            <p:nvPicPr>
+              <p:cNvPr id="3" name="Ink 2">
+                <a:extLst>
+                  <a:ext uri="{FF2B5EF4-FFF2-40B4-BE49-F238E27FC236}">
+                    <a16:creationId xmlns:a16="http://schemas.microsoft.com/office/drawing/2014/main" id="{99D47AD7-A686-DDBF-73B3-326F2A8F32BF}"/>
+                  </a:ext>
+                </a:extLst>
+              </p:cNvPr>
+              <p:cNvPicPr/>
+              <p:nvPr/>
+            </p:nvPicPr>
+            <p:blipFill>
+              <a:blip r:embed="rId3"/>
+              <a:stretch>
+                <a:fillRect/>
+              </a:stretch>
+            </p:blipFill>
+            <p:spPr>
+              <a:xfrm>
+                <a:off x="2898378" y="2659797"/>
+                <a:ext cx="807480" cy="1230840"/>
+              </a:xfrm>
+              <a:prstGeom prst="rect">
+                <a:avLst/>
+              </a:prstGeom>
+            </p:spPr>
+          </p:pic>
+        </mc:Fallback>
+      </mc:AlternateContent>
+      <mc:AlternateContent xmlns:mc="http://schemas.openxmlformats.org/markup-compatibility/2006" xmlns:p14="http://schemas.microsoft.com/office/powerpoint/2010/main">
+        <mc:Choice Requires="p14">
+          <p:contentPart p14:bwMode="auto" r:id="rId4">
+            <p14:nvContentPartPr>
+              <p14:cNvPr id="6" name="Ink 5">
+                <a:extLst>
+                  <a:ext uri="{FF2B5EF4-FFF2-40B4-BE49-F238E27FC236}">
+                    <a16:creationId xmlns:a16="http://schemas.microsoft.com/office/drawing/2014/main" id="{9A2C7C8E-3480-5844-27B1-EA6113EB77EA}"/>
+                  </a:ext>
+                </a:extLst>
+              </p14:cNvPr>
+              <p14:cNvContentPartPr/>
+              <p14:nvPr/>
+            </p14:nvContentPartPr>
+            <p14:xfrm>
+              <a:off x="3174138" y="2897037"/>
+              <a:ext cx="399600" cy="94320"/>
+            </p14:xfrm>
+          </p:contentPart>
+        </mc:Choice>
+        <mc:Fallback xmlns="">
+          <p:pic>
+            <p:nvPicPr>
+              <p:cNvPr id="6" name="Ink 5">
+                <a:extLst>
+                  <a:ext uri="{FF2B5EF4-FFF2-40B4-BE49-F238E27FC236}">
+                    <a16:creationId xmlns:a16="http://schemas.microsoft.com/office/drawing/2014/main" id="{F4030113-AFB5-38BE-DAEA-5236AAC78E0B}"/>
+                  </a:ext>
+                </a:extLst>
+              </p:cNvPr>
+              <p:cNvPicPr/>
+              <p:nvPr/>
+            </p:nvPicPr>
+            <p:blipFill>
+              <a:blip r:embed="rId5"/>
+              <a:stretch>
+                <a:fillRect/>
+              </a:stretch>
+            </p:blipFill>
+            <p:spPr>
+              <a:xfrm>
+                <a:off x="3165138" y="2888037"/>
+                <a:ext cx="417240" cy="111960"/>
+              </a:xfrm>
+              <a:prstGeom prst="rect">
+                <a:avLst/>
+              </a:prstGeom>
+            </p:spPr>
+          </p:pic>
+        </mc:Fallback>
+      </mc:AlternateContent>
+      <mc:AlternateContent xmlns:mc="http://schemas.openxmlformats.org/markup-compatibility/2006" xmlns:p14="http://schemas.microsoft.com/office/powerpoint/2010/main">
+        <mc:Choice Requires="p14">
+          <p:contentPart p14:bwMode="auto" r:id="rId6">
+            <p14:nvContentPartPr>
+              <p14:cNvPr id="9" name="Ink 8">
+                <a:extLst>
+                  <a:ext uri="{FF2B5EF4-FFF2-40B4-BE49-F238E27FC236}">
+                    <a16:creationId xmlns:a16="http://schemas.microsoft.com/office/drawing/2014/main" id="{7BDC4F90-D49F-9962-E543-E97FFA4E056E}"/>
+                  </a:ext>
+                </a:extLst>
+              </p14:cNvPr>
+              <p14:cNvContentPartPr/>
+              <p14:nvPr/>
+            </p14:nvContentPartPr>
+            <p14:xfrm>
+              <a:off x="2944185" y="2792419"/>
+              <a:ext cx="210600" cy="491760"/>
+            </p14:xfrm>
+          </p:contentPart>
+        </mc:Choice>
+        <mc:Fallback xmlns="">
+          <p:pic>
+            <p:nvPicPr>
+              <p:cNvPr id="9" name="Ink 8">
+                <a:extLst>
+                  <a:ext uri="{FF2B5EF4-FFF2-40B4-BE49-F238E27FC236}">
+                    <a16:creationId xmlns:a16="http://schemas.microsoft.com/office/drawing/2014/main" id="{5F43C28B-ED1A-5CCF-A109-84CB0F25272B}"/>
+                  </a:ext>
+                </a:extLst>
+              </p:cNvPr>
+              <p:cNvPicPr/>
+              <p:nvPr/>
+            </p:nvPicPr>
+            <p:blipFill>
+              <a:blip r:embed="rId7"/>
+              <a:stretch>
+                <a:fillRect/>
+              </a:stretch>
+            </p:blipFill>
+            <p:spPr>
+              <a:xfrm>
+                <a:off x="2935185" y="2783419"/>
+                <a:ext cx="228240" cy="509400"/>
+              </a:xfrm>
+              <a:prstGeom prst="rect">
+                <a:avLst/>
+              </a:prstGeom>
+            </p:spPr>
+          </p:pic>
+        </mc:Fallback>
+      </mc:AlternateContent>
+      <mc:AlternateContent xmlns:mc="http://schemas.openxmlformats.org/markup-compatibility/2006" xmlns:p14="http://schemas.microsoft.com/office/powerpoint/2010/main">
+        <mc:Choice Requires="p14">
+          <p:contentPart p14:bwMode="auto" r:id="rId8">
+            <p14:nvContentPartPr>
+              <p14:cNvPr id="10" name="Ink 9">
+                <a:extLst>
+                  <a:ext uri="{FF2B5EF4-FFF2-40B4-BE49-F238E27FC236}">
+                    <a16:creationId xmlns:a16="http://schemas.microsoft.com/office/drawing/2014/main" id="{1D583768-80A3-1A0E-D426-2480B8622C86}"/>
+                  </a:ext>
+                </a:extLst>
+              </p14:cNvPr>
+              <p14:cNvContentPartPr/>
+              <p14:nvPr/>
+            </p14:nvContentPartPr>
+            <p14:xfrm>
+              <a:off x="3157305" y="2888539"/>
+              <a:ext cx="11520" cy="12600"/>
+            </p14:xfrm>
+          </p:contentPart>
+        </mc:Choice>
+        <mc:Fallback xmlns="">
+          <p:pic>
+            <p:nvPicPr>
+              <p:cNvPr id="10" name="Ink 9">
+                <a:extLst>
+                  <a:ext uri="{FF2B5EF4-FFF2-40B4-BE49-F238E27FC236}">
+                    <a16:creationId xmlns:a16="http://schemas.microsoft.com/office/drawing/2014/main" id="{60959E9C-FD05-4478-91B4-CA2D57C9F9D2}"/>
+                  </a:ext>
+                </a:extLst>
+              </p:cNvPr>
+              <p:cNvPicPr/>
+              <p:nvPr/>
+            </p:nvPicPr>
+            <p:blipFill>
+              <a:blip r:embed="rId9"/>
+              <a:stretch>
+                <a:fillRect/>
+              </a:stretch>
+            </p:blipFill>
+            <p:spPr>
+              <a:xfrm>
+                <a:off x="3148305" y="2879899"/>
+                <a:ext cx="29160" cy="30240"/>
+              </a:xfrm>
+              <a:prstGeom prst="rect">
+                <a:avLst/>
+              </a:prstGeom>
+            </p:spPr>
+          </p:pic>
+        </mc:Fallback>
+      </mc:AlternateContent>
+      <p:grpSp>
+        <p:nvGrpSpPr>
+          <p:cNvPr id="27" name="Group 26">
+            <a:extLst>
+              <a:ext uri="{FF2B5EF4-FFF2-40B4-BE49-F238E27FC236}">
+                <a16:creationId xmlns:a16="http://schemas.microsoft.com/office/drawing/2014/main" id="{06A1193E-9C6C-66E0-3F1B-4D682A576008}"/>
+              </a:ext>
+            </a:extLst>
+          </p:cNvPr>
+          <p:cNvGrpSpPr/>
+          <p:nvPr/>
+        </p:nvGrpSpPr>
+        <p:grpSpPr>
+          <a:xfrm>
+            <a:off x="3140385" y="2990059"/>
+            <a:ext cx="501840" cy="320760"/>
+            <a:chOff x="3140385" y="2990059"/>
+            <a:chExt cx="501840" cy="320760"/>
+          </a:xfrm>
+        </p:grpSpPr>
+        <mc:AlternateContent xmlns:mc="http://schemas.openxmlformats.org/markup-compatibility/2006" xmlns:p14="http://schemas.microsoft.com/office/powerpoint/2010/main">
+          <mc:Choice Requires="p14">
+            <p:contentPart p14:bwMode="auto" r:id="rId10">
+              <p14:nvContentPartPr>
+                <p14:cNvPr id="12" name="Ink 11">
+                  <a:extLst>
+                    <a:ext uri="{FF2B5EF4-FFF2-40B4-BE49-F238E27FC236}">
+                      <a16:creationId xmlns:a16="http://schemas.microsoft.com/office/drawing/2014/main" id="{9C7002FE-2586-A2F4-D878-3958993A7F68}"/>
+                    </a:ext>
+                  </a:extLst>
+                </p14:cNvPr>
+                <p14:cNvContentPartPr/>
+                <p14:nvPr/>
+              </p14:nvContentPartPr>
+              <p14:xfrm>
+                <a:off x="3461145" y="2990059"/>
+                <a:ext cx="181080" cy="246240"/>
+              </p14:xfrm>
+            </p:contentPart>
+          </mc:Choice>
+          <mc:Fallback xmlns="">
+            <p:pic>
+              <p:nvPicPr>
+                <p:cNvPr id="12" name="Ink 11">
+                  <a:extLst>
+                    <a:ext uri="{FF2B5EF4-FFF2-40B4-BE49-F238E27FC236}">
+                      <a16:creationId xmlns:a16="http://schemas.microsoft.com/office/drawing/2014/main" id="{4B818534-5AAD-1FFD-0DF7-5959412E6A46}"/>
+                    </a:ext>
+                  </a:extLst>
+                </p:cNvPr>
+                <p:cNvPicPr/>
+                <p:nvPr/>
+              </p:nvPicPr>
+              <p:blipFill>
+                <a:blip r:embed="rId11"/>
+                <a:stretch>
+                  <a:fillRect/>
+                </a:stretch>
+              </p:blipFill>
+              <p:spPr>
+                <a:xfrm>
+                  <a:off x="3452145" y="2981059"/>
+                  <a:ext cx="198720" cy="263880"/>
+                </a:xfrm>
+                <a:prstGeom prst="rect">
+                  <a:avLst/>
+                </a:prstGeom>
+              </p:spPr>
+            </p:pic>
+          </mc:Fallback>
+        </mc:AlternateContent>
+        <mc:AlternateContent xmlns:mc="http://schemas.openxmlformats.org/markup-compatibility/2006" xmlns:p14="http://schemas.microsoft.com/office/powerpoint/2010/main">
+          <mc:Choice Requires="p14">
+            <p:contentPart p14:bwMode="auto" r:id="rId12">
+              <p14:nvContentPartPr>
+                <p14:cNvPr id="14" name="Ink 13">
+                  <a:extLst>
+                    <a:ext uri="{FF2B5EF4-FFF2-40B4-BE49-F238E27FC236}">
+                      <a16:creationId xmlns:a16="http://schemas.microsoft.com/office/drawing/2014/main" id="{91B709A3-DFF7-FED2-90B5-7E9991BA8B2F}"/>
+                    </a:ext>
+                  </a:extLst>
+                </p14:cNvPr>
+                <p14:cNvContentPartPr/>
+                <p14:nvPr/>
+              </p14:nvContentPartPr>
+              <p14:xfrm>
+                <a:off x="3288705" y="3033979"/>
+                <a:ext cx="2520" cy="720"/>
+              </p14:xfrm>
+            </p:contentPart>
+          </mc:Choice>
+          <mc:Fallback xmlns="">
+            <p:pic>
+              <p:nvPicPr>
+                <p:cNvPr id="14" name="Ink 13">
+                  <a:extLst>
+                    <a:ext uri="{FF2B5EF4-FFF2-40B4-BE49-F238E27FC236}">
+                      <a16:creationId xmlns:a16="http://schemas.microsoft.com/office/drawing/2014/main" id="{DC2E5383-897A-B875-B278-F7E63166A62A}"/>
+                    </a:ext>
+                  </a:extLst>
+                </p:cNvPr>
+                <p:cNvPicPr/>
+                <p:nvPr/>
+              </p:nvPicPr>
+              <p:blipFill>
+                <a:blip r:embed="rId13"/>
+                <a:stretch>
+                  <a:fillRect/>
+                </a:stretch>
+              </p:blipFill>
+              <p:spPr>
+                <a:xfrm>
+                  <a:off x="3280065" y="3025339"/>
+                  <a:ext cx="20160" cy="18360"/>
+                </a:xfrm>
+                <a:prstGeom prst="rect">
+                  <a:avLst/>
+                </a:prstGeom>
+              </p:spPr>
+            </p:pic>
+          </mc:Fallback>
+        </mc:AlternateContent>
+        <mc:AlternateContent xmlns:mc="http://schemas.openxmlformats.org/markup-compatibility/2006" xmlns:p14="http://schemas.microsoft.com/office/powerpoint/2010/main">
+          <mc:Choice Requires="p14">
+            <p:contentPart p14:bwMode="auto" r:id="rId14">
+              <p14:nvContentPartPr>
+                <p14:cNvPr id="15" name="Ink 14">
+                  <a:extLst>
+                    <a:ext uri="{FF2B5EF4-FFF2-40B4-BE49-F238E27FC236}">
+                      <a16:creationId xmlns:a16="http://schemas.microsoft.com/office/drawing/2014/main" id="{5D2B16BA-24FC-2DCC-AB8B-F475332A260E}"/>
+                    </a:ext>
+                  </a:extLst>
+                </p14:cNvPr>
+                <p14:cNvContentPartPr/>
+                <p14:nvPr/>
+              </p14:nvContentPartPr>
+              <p14:xfrm>
+                <a:off x="3288705" y="3160699"/>
+                <a:ext cx="3240" cy="4680"/>
+              </p14:xfrm>
+            </p:contentPart>
+          </mc:Choice>
+          <mc:Fallback xmlns="">
+            <p:pic>
+              <p:nvPicPr>
+                <p:cNvPr id="15" name="Ink 14">
+                  <a:extLst>
+                    <a:ext uri="{FF2B5EF4-FFF2-40B4-BE49-F238E27FC236}">
+                      <a16:creationId xmlns:a16="http://schemas.microsoft.com/office/drawing/2014/main" id="{0B2194BA-782C-3FA0-2960-84118116F90F}"/>
+                    </a:ext>
+                  </a:extLst>
+                </p:cNvPr>
+                <p:cNvPicPr/>
+                <p:nvPr/>
+              </p:nvPicPr>
+              <p:blipFill>
+                <a:blip r:embed="rId13"/>
+                <a:stretch>
+                  <a:fillRect/>
+                </a:stretch>
+              </p:blipFill>
+              <p:spPr>
+                <a:xfrm>
+                  <a:off x="3280065" y="3152059"/>
+                  <a:ext cx="20880" cy="22320"/>
+                </a:xfrm>
+                <a:prstGeom prst="rect">
+                  <a:avLst/>
+                </a:prstGeom>
+              </p:spPr>
+            </p:pic>
+          </mc:Fallback>
+        </mc:AlternateContent>
+        <mc:AlternateContent xmlns:mc="http://schemas.openxmlformats.org/markup-compatibility/2006" xmlns:p14="http://schemas.microsoft.com/office/powerpoint/2010/main">
+          <mc:Choice Requires="p14">
+            <p:contentPart p14:bwMode="auto" r:id="rId15">
+              <p14:nvContentPartPr>
+                <p14:cNvPr id="16" name="Ink 15">
+                  <a:extLst>
+                    <a:ext uri="{FF2B5EF4-FFF2-40B4-BE49-F238E27FC236}">
+                      <a16:creationId xmlns:a16="http://schemas.microsoft.com/office/drawing/2014/main" id="{C11E4194-C474-2B98-8FF5-C540CFA50352}"/>
+                    </a:ext>
+                  </a:extLst>
+                </p14:cNvPr>
+                <p14:cNvContentPartPr/>
+                <p14:nvPr/>
+              </p14:nvContentPartPr>
+              <p14:xfrm>
+                <a:off x="3186105" y="3310459"/>
+                <a:ext cx="360" cy="360"/>
+              </p14:xfrm>
+            </p:contentPart>
+          </mc:Choice>
+          <mc:Fallback xmlns="">
+            <p:pic>
+              <p:nvPicPr>
+                <p:cNvPr id="16" name="Ink 15">
+                  <a:extLst>
+                    <a:ext uri="{FF2B5EF4-FFF2-40B4-BE49-F238E27FC236}">
+                      <a16:creationId xmlns:a16="http://schemas.microsoft.com/office/drawing/2014/main" id="{5909A408-3048-F14A-92BC-5CE164BA226A}"/>
+                    </a:ext>
+                  </a:extLst>
+                </p:cNvPr>
+                <p:cNvPicPr/>
+                <p:nvPr/>
+              </p:nvPicPr>
+              <p:blipFill>
+                <a:blip r:embed="rId13"/>
+                <a:stretch>
+                  <a:fillRect/>
+                </a:stretch>
+              </p:blipFill>
+              <p:spPr>
+                <a:xfrm>
+                  <a:off x="3177465" y="3301819"/>
+                  <a:ext cx="18000" cy="18000"/>
+                </a:xfrm>
+                <a:prstGeom prst="rect">
+                  <a:avLst/>
+                </a:prstGeom>
+              </p:spPr>
+            </p:pic>
+          </mc:Fallback>
+        </mc:AlternateContent>
+        <mc:AlternateContent xmlns:mc="http://schemas.openxmlformats.org/markup-compatibility/2006" xmlns:p14="http://schemas.microsoft.com/office/powerpoint/2010/main">
+          <mc:Choice Requires="p14">
+            <p:contentPart p14:bwMode="auto" r:id="rId16">
+              <p14:nvContentPartPr>
+                <p14:cNvPr id="17" name="Ink 16">
+                  <a:extLst>
+                    <a:ext uri="{FF2B5EF4-FFF2-40B4-BE49-F238E27FC236}">
+                      <a16:creationId xmlns:a16="http://schemas.microsoft.com/office/drawing/2014/main" id="{B2003F29-4546-2F05-95AD-4A0AB023173F}"/>
+                    </a:ext>
+                  </a:extLst>
+                </p14:cNvPr>
+                <p14:cNvContentPartPr/>
+                <p14:nvPr/>
+              </p14:nvContentPartPr>
+              <p14:xfrm>
+                <a:off x="3408225" y="3305059"/>
+                <a:ext cx="2520" cy="1440"/>
+              </p14:xfrm>
+            </p:contentPart>
+          </mc:Choice>
+          <mc:Fallback xmlns="">
+            <p:pic>
+              <p:nvPicPr>
+                <p:cNvPr id="17" name="Ink 16">
+                  <a:extLst>
+                    <a:ext uri="{FF2B5EF4-FFF2-40B4-BE49-F238E27FC236}">
+                      <a16:creationId xmlns:a16="http://schemas.microsoft.com/office/drawing/2014/main" id="{B92AD1AE-2F19-5A5E-0087-67C72AAA668B}"/>
+                    </a:ext>
+                  </a:extLst>
+                </p:cNvPr>
+                <p:cNvPicPr/>
+                <p:nvPr/>
+              </p:nvPicPr>
+              <p:blipFill>
+                <a:blip r:embed="rId13"/>
+                <a:stretch>
+                  <a:fillRect/>
+                </a:stretch>
+              </p:blipFill>
+              <p:spPr>
+                <a:xfrm>
+                  <a:off x="3399585" y="3296419"/>
+                  <a:ext cx="20160" cy="19080"/>
+                </a:xfrm>
+                <a:prstGeom prst="rect">
+                  <a:avLst/>
+                </a:prstGeom>
+              </p:spPr>
+            </p:pic>
+          </mc:Fallback>
+        </mc:AlternateContent>
+        <mc:AlternateContent xmlns:mc="http://schemas.openxmlformats.org/markup-compatibility/2006" xmlns:p14="http://schemas.microsoft.com/office/powerpoint/2010/main">
+          <mc:Choice Requires="p14">
+            <p:contentPart p14:bwMode="auto" r:id="rId17">
+              <p14:nvContentPartPr>
+                <p14:cNvPr id="22" name="Ink 21">
+                  <a:extLst>
+                    <a:ext uri="{FF2B5EF4-FFF2-40B4-BE49-F238E27FC236}">
+                      <a16:creationId xmlns:a16="http://schemas.microsoft.com/office/drawing/2014/main" id="{84E68025-C178-7E3E-6EF4-AC309F7AACB9}"/>
+                    </a:ext>
+                  </a:extLst>
+                </p14:cNvPr>
+                <p14:cNvContentPartPr/>
+                <p14:nvPr/>
+              </p14:nvContentPartPr>
+              <p14:xfrm>
+                <a:off x="3465465" y="3179419"/>
+                <a:ext cx="360" cy="360"/>
+              </p14:xfrm>
+            </p:contentPart>
+          </mc:Choice>
+          <mc:Fallback xmlns="">
+            <p:pic>
+              <p:nvPicPr>
+                <p:cNvPr id="22" name="Ink 21">
+                  <a:extLst>
+                    <a:ext uri="{FF2B5EF4-FFF2-40B4-BE49-F238E27FC236}">
+                      <a16:creationId xmlns:a16="http://schemas.microsoft.com/office/drawing/2014/main" id="{1B7C8F2C-71E1-CAFC-232D-9AD1AF501DC1}"/>
+                    </a:ext>
+                  </a:extLst>
+                </p:cNvPr>
+                <p:cNvPicPr/>
+                <p:nvPr/>
+              </p:nvPicPr>
+              <p:blipFill>
+                <a:blip r:embed="rId13"/>
+                <a:stretch>
+                  <a:fillRect/>
+                </a:stretch>
+              </p:blipFill>
+              <p:spPr>
+                <a:xfrm>
+                  <a:off x="3456825" y="3170779"/>
+                  <a:ext cx="18000" cy="18000"/>
+                </a:xfrm>
+                <a:prstGeom prst="rect">
+                  <a:avLst/>
+                </a:prstGeom>
+              </p:spPr>
+            </p:pic>
+          </mc:Fallback>
+        </mc:AlternateContent>
+        <mc:AlternateContent xmlns:mc="http://schemas.openxmlformats.org/markup-compatibility/2006" xmlns:p14="http://schemas.microsoft.com/office/powerpoint/2010/main">
+          <mc:Choice Requires="p14">
+            <p:contentPart p14:bwMode="auto" r:id="rId18">
+              <p14:nvContentPartPr>
+                <p14:cNvPr id="23" name="Ink 22">
+                  <a:extLst>
+                    <a:ext uri="{FF2B5EF4-FFF2-40B4-BE49-F238E27FC236}">
+                      <a16:creationId xmlns:a16="http://schemas.microsoft.com/office/drawing/2014/main" id="{A001EBF5-4BCA-AADD-7C37-97BB56E653CC}"/>
+                    </a:ext>
+                  </a:extLst>
+                </p14:cNvPr>
+                <p14:cNvContentPartPr/>
+                <p14:nvPr/>
+              </p14:nvContentPartPr>
+              <p14:xfrm>
+                <a:off x="3244065" y="3246739"/>
+                <a:ext cx="2160" cy="360"/>
+              </p14:xfrm>
+            </p:contentPart>
+          </mc:Choice>
+          <mc:Fallback xmlns="">
+            <p:pic>
+              <p:nvPicPr>
+                <p:cNvPr id="23" name="Ink 22">
+                  <a:extLst>
+                    <a:ext uri="{FF2B5EF4-FFF2-40B4-BE49-F238E27FC236}">
+                      <a16:creationId xmlns:a16="http://schemas.microsoft.com/office/drawing/2014/main" id="{857390C7-B6C8-D3E3-C267-FF22D050DC38}"/>
+                    </a:ext>
+                  </a:extLst>
+                </p:cNvPr>
+                <p:cNvPicPr/>
+                <p:nvPr/>
+              </p:nvPicPr>
+              <p:blipFill>
+                <a:blip r:embed="rId13"/>
+                <a:stretch>
+                  <a:fillRect/>
+                </a:stretch>
+              </p:blipFill>
+              <p:spPr>
+                <a:xfrm>
+                  <a:off x="3235425" y="3238099"/>
+                  <a:ext cx="19800" cy="18000"/>
+                </a:xfrm>
+                <a:prstGeom prst="rect">
+                  <a:avLst/>
+                </a:prstGeom>
+              </p:spPr>
+            </p:pic>
+          </mc:Fallback>
+        </mc:AlternateContent>
+        <mc:AlternateContent xmlns:mc="http://schemas.openxmlformats.org/markup-compatibility/2006" xmlns:p14="http://schemas.microsoft.com/office/powerpoint/2010/main">
+          <mc:Choice Requires="p14">
+            <p:contentPart p14:bwMode="auto" r:id="rId19">
+              <p14:nvContentPartPr>
+                <p14:cNvPr id="24" name="Ink 23">
+                  <a:extLst>
+                    <a:ext uri="{FF2B5EF4-FFF2-40B4-BE49-F238E27FC236}">
+                      <a16:creationId xmlns:a16="http://schemas.microsoft.com/office/drawing/2014/main" id="{A79C8C5F-D198-58B6-4D1C-61152DB81822}"/>
+                    </a:ext>
+                  </a:extLst>
+                </p14:cNvPr>
+                <p14:cNvContentPartPr/>
+                <p14:nvPr/>
+              </p14:nvContentPartPr>
+              <p14:xfrm>
+                <a:off x="3140385" y="3213619"/>
+                <a:ext cx="5400" cy="12600"/>
+              </p14:xfrm>
+            </p:contentPart>
+          </mc:Choice>
+          <mc:Fallback xmlns="">
+            <p:pic>
+              <p:nvPicPr>
+                <p:cNvPr id="24" name="Ink 23">
+                  <a:extLst>
+                    <a:ext uri="{FF2B5EF4-FFF2-40B4-BE49-F238E27FC236}">
+                      <a16:creationId xmlns:a16="http://schemas.microsoft.com/office/drawing/2014/main" id="{F06B29E0-114E-0524-B370-C267565EADCB}"/>
+                    </a:ext>
+                  </a:extLst>
+                </p:cNvPr>
+                <p:cNvPicPr/>
+                <p:nvPr/>
+              </p:nvPicPr>
+              <p:blipFill>
+                <a:blip r:embed="rId20"/>
+                <a:stretch>
+                  <a:fillRect/>
+                </a:stretch>
+              </p:blipFill>
+              <p:spPr>
+                <a:xfrm>
+                  <a:off x="3131745" y="3204979"/>
+                  <a:ext cx="23040" cy="30240"/>
+                </a:xfrm>
+                <a:prstGeom prst="rect">
+                  <a:avLst/>
+                </a:prstGeom>
+              </p:spPr>
+            </p:pic>
+          </mc:Fallback>
+        </mc:AlternateContent>
+      </p:grpSp>
+      <p:grpSp>
+        <p:nvGrpSpPr>
+          <p:cNvPr id="26" name="Group 25">
+            <a:extLst>
+              <a:ext uri="{FF2B5EF4-FFF2-40B4-BE49-F238E27FC236}">
+                <a16:creationId xmlns:a16="http://schemas.microsoft.com/office/drawing/2014/main" id="{FAA04B20-70A4-0CA7-9744-477A5C738A41}"/>
+              </a:ext>
+            </a:extLst>
+          </p:cNvPr>
+          <p:cNvGrpSpPr/>
+          <p:nvPr/>
+        </p:nvGrpSpPr>
+        <p:grpSpPr>
+          <a:xfrm>
+            <a:off x="3035625" y="3385339"/>
+            <a:ext cx="440280" cy="248400"/>
+            <a:chOff x="3035625" y="3385339"/>
+            <a:chExt cx="440280" cy="248400"/>
+          </a:xfrm>
+        </p:grpSpPr>
+        <mc:AlternateContent xmlns:mc="http://schemas.openxmlformats.org/markup-compatibility/2006" xmlns:p14="http://schemas.microsoft.com/office/powerpoint/2010/main">
+          <mc:Choice Requires="p14">
+            <p:contentPart p14:bwMode="auto" r:id="rId21">
+              <p14:nvContentPartPr>
+                <p14:cNvPr id="18" name="Ink 17">
+                  <a:extLst>
+                    <a:ext uri="{FF2B5EF4-FFF2-40B4-BE49-F238E27FC236}">
+                      <a16:creationId xmlns:a16="http://schemas.microsoft.com/office/drawing/2014/main" id="{0C850215-E877-497B-799D-7B656D7DC8BA}"/>
+                    </a:ext>
+                  </a:extLst>
+                </p14:cNvPr>
+                <p14:cNvContentPartPr/>
+                <p14:nvPr/>
+              </p14:nvContentPartPr>
+              <p14:xfrm>
+                <a:off x="3376905" y="3445819"/>
+                <a:ext cx="4680" cy="4320"/>
+              </p14:xfrm>
+            </p:contentPart>
+          </mc:Choice>
+          <mc:Fallback xmlns="">
+            <p:pic>
+              <p:nvPicPr>
+                <p:cNvPr id="18" name="Ink 17">
+                  <a:extLst>
+                    <a:ext uri="{FF2B5EF4-FFF2-40B4-BE49-F238E27FC236}">
+                      <a16:creationId xmlns:a16="http://schemas.microsoft.com/office/drawing/2014/main" id="{3FB73132-7F36-08C5-E582-34F282163FF3}"/>
+                    </a:ext>
+                  </a:extLst>
+                </p:cNvPr>
+                <p:cNvPicPr/>
+                <p:nvPr/>
+              </p:nvPicPr>
+              <p:blipFill>
+                <a:blip r:embed="rId13"/>
+                <a:stretch>
+                  <a:fillRect/>
+                </a:stretch>
+              </p:blipFill>
+              <p:spPr>
+                <a:xfrm>
+                  <a:off x="3367905" y="3436819"/>
+                  <a:ext cx="22320" cy="21960"/>
+                </a:xfrm>
+                <a:prstGeom prst="rect">
+                  <a:avLst/>
+                </a:prstGeom>
+              </p:spPr>
+            </p:pic>
+          </mc:Fallback>
+        </mc:AlternateContent>
+        <mc:AlternateContent xmlns:mc="http://schemas.openxmlformats.org/markup-compatibility/2006" xmlns:p14="http://schemas.microsoft.com/office/powerpoint/2010/main">
+          <mc:Choice Requires="p14">
+            <p:contentPart p14:bwMode="auto" r:id="rId22">
+              <p14:nvContentPartPr>
+                <p14:cNvPr id="19" name="Ink 18">
+                  <a:extLst>
+                    <a:ext uri="{FF2B5EF4-FFF2-40B4-BE49-F238E27FC236}">
+                      <a16:creationId xmlns:a16="http://schemas.microsoft.com/office/drawing/2014/main" id="{3E0AEEB7-8332-A527-3D05-AA0110388A71}"/>
+                    </a:ext>
+                  </a:extLst>
+                </p14:cNvPr>
+                <p14:cNvContentPartPr/>
+                <p14:nvPr/>
+              </p14:nvContentPartPr>
+              <p14:xfrm>
+                <a:off x="3101145" y="3385339"/>
+                <a:ext cx="96840" cy="220320"/>
+              </p14:xfrm>
+            </p:contentPart>
+          </mc:Choice>
+          <mc:Fallback xmlns="">
+            <p:pic>
+              <p:nvPicPr>
+                <p:cNvPr id="19" name="Ink 18">
+                  <a:extLst>
+                    <a:ext uri="{FF2B5EF4-FFF2-40B4-BE49-F238E27FC236}">
+                      <a16:creationId xmlns:a16="http://schemas.microsoft.com/office/drawing/2014/main" id="{A1D2EC17-A162-C577-1311-78C30A872541}"/>
+                    </a:ext>
+                  </a:extLst>
+                </p:cNvPr>
+                <p:cNvPicPr/>
+                <p:nvPr/>
+              </p:nvPicPr>
+              <p:blipFill>
+                <a:blip r:embed="rId23"/>
+                <a:stretch>
+                  <a:fillRect/>
+                </a:stretch>
+              </p:blipFill>
+              <p:spPr>
+                <a:xfrm>
+                  <a:off x="3092505" y="3376699"/>
+                  <a:ext cx="114480" cy="237960"/>
+                </a:xfrm>
+                <a:prstGeom prst="rect">
+                  <a:avLst/>
+                </a:prstGeom>
+              </p:spPr>
+            </p:pic>
+          </mc:Fallback>
+        </mc:AlternateContent>
+        <mc:AlternateContent xmlns:mc="http://schemas.openxmlformats.org/markup-compatibility/2006" xmlns:p14="http://schemas.microsoft.com/office/powerpoint/2010/main">
+          <mc:Choice Requires="p14">
+            <p:contentPart p14:bwMode="auto" r:id="rId24">
+              <p14:nvContentPartPr>
+                <p14:cNvPr id="20" name="Ink 19">
+                  <a:extLst>
+                    <a:ext uri="{FF2B5EF4-FFF2-40B4-BE49-F238E27FC236}">
+                      <a16:creationId xmlns:a16="http://schemas.microsoft.com/office/drawing/2014/main" id="{B039C99B-5A31-188C-1F97-F94CA6D8AF38}"/>
+                    </a:ext>
+                  </a:extLst>
+                </p14:cNvPr>
+                <p14:cNvContentPartPr/>
+                <p14:nvPr/>
+              </p14:nvContentPartPr>
+              <p14:xfrm>
+                <a:off x="3278625" y="3481459"/>
+                <a:ext cx="4680" cy="2160"/>
+              </p14:xfrm>
+            </p:contentPart>
+          </mc:Choice>
+          <mc:Fallback xmlns="">
+            <p:pic>
+              <p:nvPicPr>
+                <p:cNvPr id="20" name="Ink 19">
+                  <a:extLst>
+                    <a:ext uri="{FF2B5EF4-FFF2-40B4-BE49-F238E27FC236}">
+                      <a16:creationId xmlns:a16="http://schemas.microsoft.com/office/drawing/2014/main" id="{EB5A16A2-478E-EDA8-75A2-3793739E880E}"/>
+                    </a:ext>
+                  </a:extLst>
+                </p:cNvPr>
+                <p:cNvPicPr/>
+                <p:nvPr/>
+              </p:nvPicPr>
+              <p:blipFill>
+                <a:blip r:embed="rId13"/>
+                <a:stretch>
+                  <a:fillRect/>
+                </a:stretch>
+              </p:blipFill>
+              <p:spPr>
+                <a:xfrm>
+                  <a:off x="3269985" y="3472459"/>
+                  <a:ext cx="22320" cy="19800"/>
+                </a:xfrm>
+                <a:prstGeom prst="rect">
+                  <a:avLst/>
+                </a:prstGeom>
+              </p:spPr>
+            </p:pic>
+          </mc:Fallback>
+        </mc:AlternateContent>
+        <mc:AlternateContent xmlns:mc="http://schemas.openxmlformats.org/markup-compatibility/2006" xmlns:p14="http://schemas.microsoft.com/office/powerpoint/2010/main">
+          <mc:Choice Requires="p14">
+            <p:contentPart p14:bwMode="auto" r:id="rId25">
+              <p14:nvContentPartPr>
+                <p14:cNvPr id="21" name="Ink 20">
+                  <a:extLst>
+                    <a:ext uri="{FF2B5EF4-FFF2-40B4-BE49-F238E27FC236}">
+                      <a16:creationId xmlns:a16="http://schemas.microsoft.com/office/drawing/2014/main" id="{B2BBA131-2A3B-721B-C960-40EE1AFD9A25}"/>
+                    </a:ext>
+                  </a:extLst>
+                </p14:cNvPr>
+                <p14:cNvContentPartPr/>
+                <p14:nvPr/>
+              </p14:nvContentPartPr>
+              <p14:xfrm>
+                <a:off x="3365745" y="3439339"/>
+                <a:ext cx="110160" cy="194400"/>
+              </p14:xfrm>
+            </p:contentPart>
+          </mc:Choice>
+          <mc:Fallback xmlns="">
+            <p:pic>
+              <p:nvPicPr>
+                <p:cNvPr id="21" name="Ink 20">
+                  <a:extLst>
+                    <a:ext uri="{FF2B5EF4-FFF2-40B4-BE49-F238E27FC236}">
+                      <a16:creationId xmlns:a16="http://schemas.microsoft.com/office/drawing/2014/main" id="{059C6783-808A-1480-8244-4D2EDE1B2C83}"/>
+                    </a:ext>
+                  </a:extLst>
+                </p:cNvPr>
+                <p:cNvPicPr/>
+                <p:nvPr/>
+              </p:nvPicPr>
+              <p:blipFill>
+                <a:blip r:embed="rId26"/>
+                <a:stretch>
+                  <a:fillRect/>
+                </a:stretch>
+              </p:blipFill>
+              <p:spPr>
+                <a:xfrm>
+                  <a:off x="3357105" y="3430339"/>
+                  <a:ext cx="127800" cy="212040"/>
+                </a:xfrm>
+                <a:prstGeom prst="rect">
+                  <a:avLst/>
+                </a:prstGeom>
+              </p:spPr>
+            </p:pic>
+          </mc:Fallback>
+        </mc:AlternateContent>
+        <mc:AlternateContent xmlns:mc="http://schemas.openxmlformats.org/markup-compatibility/2006" xmlns:p14="http://schemas.microsoft.com/office/powerpoint/2010/main">
+          <mc:Choice Requires="p14">
+            <p:contentPart p14:bwMode="auto" r:id="rId27">
+              <p14:nvContentPartPr>
+                <p14:cNvPr id="25" name="Ink 24">
+                  <a:extLst>
+                    <a:ext uri="{FF2B5EF4-FFF2-40B4-BE49-F238E27FC236}">
+                      <a16:creationId xmlns:a16="http://schemas.microsoft.com/office/drawing/2014/main" id="{14FE4C64-28A3-0796-A69B-F1AF7AEF864D}"/>
+                    </a:ext>
+                  </a:extLst>
+                </p14:cNvPr>
+                <p14:cNvContentPartPr/>
+                <p14:nvPr/>
+              </p14:nvContentPartPr>
+              <p14:xfrm>
+                <a:off x="3035625" y="3419179"/>
+                <a:ext cx="11160" cy="3960"/>
+              </p14:xfrm>
+            </p:contentPart>
+          </mc:Choice>
+          <mc:Fallback xmlns="">
+            <p:pic>
+              <p:nvPicPr>
+                <p:cNvPr id="25" name="Ink 24">
+                  <a:extLst>
+                    <a:ext uri="{FF2B5EF4-FFF2-40B4-BE49-F238E27FC236}">
+                      <a16:creationId xmlns:a16="http://schemas.microsoft.com/office/drawing/2014/main" id="{9A6899E1-136B-D016-B804-ABEBBF1DC596}"/>
+                    </a:ext>
+                  </a:extLst>
+                </p:cNvPr>
+                <p:cNvPicPr/>
+                <p:nvPr/>
+              </p:nvPicPr>
+              <p:blipFill>
+                <a:blip r:embed="rId28"/>
+                <a:stretch>
+                  <a:fillRect/>
+                </a:stretch>
+              </p:blipFill>
+              <p:spPr>
+                <a:xfrm>
+                  <a:off x="3026985" y="3410179"/>
+                  <a:ext cx="28800" cy="21600"/>
+                </a:xfrm>
+                <a:prstGeom prst="rect">
+                  <a:avLst/>
+                </a:prstGeom>
+              </p:spPr>
+            </p:pic>
+          </mc:Fallback>
+        </mc:AlternateContent>
+      </p:grpSp>
+      <mc:AlternateContent xmlns:mc="http://schemas.openxmlformats.org/markup-compatibility/2006" xmlns:p14="http://schemas.microsoft.com/office/powerpoint/2010/main">
+        <mc:Choice Requires="p14">
+          <p:contentPart p14:bwMode="auto" r:id="rId29">
+            <p14:nvContentPartPr>
+              <p14:cNvPr id="28" name="Ink 27">
+                <a:extLst>
+                  <a:ext uri="{FF2B5EF4-FFF2-40B4-BE49-F238E27FC236}">
+                    <a16:creationId xmlns:a16="http://schemas.microsoft.com/office/drawing/2014/main" id="{1FC09995-1934-4880-7DCF-5B42677E921D}"/>
+                  </a:ext>
+                </a:extLst>
+              </p14:cNvPr>
+              <p14:cNvContentPartPr/>
+              <p14:nvPr/>
+            </p14:nvContentPartPr>
+            <p14:xfrm>
+              <a:off x="3086283" y="3477369"/>
+              <a:ext cx="7560" cy="6840"/>
+            </p14:xfrm>
+          </p:contentPart>
+        </mc:Choice>
+        <mc:Fallback xmlns="">
+          <p:pic>
+            <p:nvPicPr>
+              <p:cNvPr id="28" name="Ink 27">
+                <a:extLst>
+                  <a:ext uri="{FF2B5EF4-FFF2-40B4-BE49-F238E27FC236}">
+                    <a16:creationId xmlns:a16="http://schemas.microsoft.com/office/drawing/2014/main" id="{953622A0-B8D5-2A0E-9362-4B92C88C7EB3}"/>
+                  </a:ext>
+                </a:extLst>
+              </p:cNvPr>
+              <p:cNvPicPr/>
+              <p:nvPr/>
+            </p:nvPicPr>
+            <p:blipFill>
+              <a:blip r:embed="rId30"/>
+              <a:stretch>
+                <a:fillRect/>
+              </a:stretch>
+            </p:blipFill>
+            <p:spPr>
+              <a:xfrm>
+                <a:off x="3077643" y="3468729"/>
+                <a:ext cx="25200" cy="24480"/>
+              </a:xfrm>
+              <a:prstGeom prst="rect">
+                <a:avLst/>
+              </a:prstGeom>
+            </p:spPr>
+          </p:pic>
+        </mc:Fallback>
+      </mc:AlternateContent>
+      <mc:AlternateContent xmlns:mc="http://schemas.openxmlformats.org/markup-compatibility/2006" xmlns:p14="http://schemas.microsoft.com/office/powerpoint/2010/main">
+        <mc:Choice Requires="p14">
+          <p:contentPart p14:bwMode="auto" r:id="rId31">
+            <p14:nvContentPartPr>
+              <p14:cNvPr id="29" name="Ink 28">
+                <a:extLst>
+                  <a:ext uri="{FF2B5EF4-FFF2-40B4-BE49-F238E27FC236}">
+                    <a16:creationId xmlns:a16="http://schemas.microsoft.com/office/drawing/2014/main" id="{86E88C49-EBFE-06FD-C7C9-969231B1CDAD}"/>
+                  </a:ext>
+                </a:extLst>
+              </p14:cNvPr>
+              <p14:cNvContentPartPr/>
+              <p14:nvPr/>
+            </p14:nvContentPartPr>
+            <p14:xfrm>
+              <a:off x="3454923" y="3551169"/>
+              <a:ext cx="360" cy="360"/>
+            </p14:xfrm>
+          </p:contentPart>
+        </mc:Choice>
+        <mc:Fallback xmlns="">
+          <p:pic>
+            <p:nvPicPr>
+              <p:cNvPr id="29" name="Ink 28">
+                <a:extLst>
+                  <a:ext uri="{FF2B5EF4-FFF2-40B4-BE49-F238E27FC236}">
+                    <a16:creationId xmlns:a16="http://schemas.microsoft.com/office/drawing/2014/main" id="{FDEF05DD-A333-D57B-9F2C-95F93A8EA046}"/>
+                  </a:ext>
+                </a:extLst>
+              </p:cNvPr>
+              <p:cNvPicPr/>
+              <p:nvPr/>
+            </p:nvPicPr>
+            <p:blipFill>
+              <a:blip r:embed="rId13"/>
+              <a:stretch>
+                <a:fillRect/>
+              </a:stretch>
+            </p:blipFill>
+            <p:spPr>
+              <a:xfrm>
+                <a:off x="3446283" y="3542169"/>
+                <a:ext cx="18000" cy="18000"/>
+              </a:xfrm>
+              <a:prstGeom prst="rect">
+                <a:avLst/>
+              </a:prstGeom>
+            </p:spPr>
+          </p:pic>
+        </mc:Fallback>
+      </mc:AlternateContent>
+      <mc:AlternateContent xmlns:mc="http://schemas.openxmlformats.org/markup-compatibility/2006" xmlns:p14="http://schemas.microsoft.com/office/powerpoint/2010/main">
+        <mc:Choice Requires="p14">
+          <p:contentPart p14:bwMode="auto" r:id="rId32">
+            <p14:nvContentPartPr>
+              <p14:cNvPr id="30" name="Ink 29">
+                <a:extLst>
+                  <a:ext uri="{FF2B5EF4-FFF2-40B4-BE49-F238E27FC236}">
+                    <a16:creationId xmlns:a16="http://schemas.microsoft.com/office/drawing/2014/main" id="{90803A1A-A95F-F5AF-877B-B397EB6D92C7}"/>
+                  </a:ext>
+                </a:extLst>
+              </p14:cNvPr>
+              <p14:cNvContentPartPr/>
+              <p14:nvPr/>
+            </p14:nvContentPartPr>
+            <p14:xfrm>
+              <a:off x="3240003" y="3755649"/>
+              <a:ext cx="15480" cy="15120"/>
+            </p14:xfrm>
+          </p:contentPart>
+        </mc:Choice>
+        <mc:Fallback xmlns="">
+          <p:pic>
+            <p:nvPicPr>
+              <p:cNvPr id="30" name="Ink 29">
+                <a:extLst>
+                  <a:ext uri="{FF2B5EF4-FFF2-40B4-BE49-F238E27FC236}">
+                    <a16:creationId xmlns:a16="http://schemas.microsoft.com/office/drawing/2014/main" id="{842AB369-2014-037E-6FBC-D1200D4D3EDE}"/>
+                  </a:ext>
+                </a:extLst>
+              </p:cNvPr>
+              <p:cNvPicPr/>
+              <p:nvPr/>
+            </p:nvPicPr>
+            <p:blipFill>
+              <a:blip r:embed="rId33"/>
+              <a:stretch>
+                <a:fillRect/>
+              </a:stretch>
+            </p:blipFill>
+            <p:spPr>
+              <a:xfrm>
+                <a:off x="3231003" y="3747009"/>
+                <a:ext cx="33120" cy="32760"/>
+              </a:xfrm>
+              <a:prstGeom prst="rect">
+                <a:avLst/>
+              </a:prstGeom>
+            </p:spPr>
+          </p:pic>
+        </mc:Fallback>
+      </mc:AlternateContent>
+    </p:spTree>
+    <p:extLst>
+      <p:ext uri="{BB962C8B-B14F-4D97-AF65-F5344CB8AC3E}">
+        <p14:creationId xmlns:p14="http://schemas.microsoft.com/office/powerpoint/2010/main" val="2198600234"/>
       </p:ext>
     </p:extLst>
   </p:cSld>
@@ -14973,7 +17115,7 @@
       </p:sp>
       <mc:AlternateContent xmlns:mc="http://schemas.openxmlformats.org/markup-compatibility/2006" xmlns:p14="http://schemas.microsoft.com/office/powerpoint/2010/main">
         <mc:Choice Requires="p14">
-          <p:contentPart p14:bwMode="auto" r:id="rId2">
+          <p:contentPart p14:bwMode="auto" r:id="rId3">
             <p14:nvContentPartPr>
               <p14:cNvPr id="3" name="Ink 2">
                 <a:extLst>
@@ -15005,7 +17147,7 @@
               <p:nvPr/>
             </p:nvPicPr>
             <p:blipFill>
-              <a:blip r:embed="rId3"/>
+              <a:blip r:embed="rId4"/>
               <a:stretch>
                 <a:fillRect/>
               </a:stretch>
@@ -15024,7 +17166,7 @@
       </mc:AlternateContent>
       <mc:AlternateContent xmlns:mc="http://schemas.openxmlformats.org/markup-compatibility/2006" xmlns:p14="http://schemas.microsoft.com/office/powerpoint/2010/main">
         <mc:Choice Requires="p14">
-          <p:contentPart p14:bwMode="auto" r:id="rId4">
+          <p:contentPart p14:bwMode="auto" r:id="rId5">
             <p14:nvContentPartPr>
               <p14:cNvPr id="6" name="Ink 5">
                 <a:extLst>
@@ -15056,7 +17198,7 @@
               <p:nvPr/>
             </p:nvPicPr>
             <p:blipFill>
-              <a:blip r:embed="rId5"/>
+              <a:blip r:embed="rId6"/>
               <a:stretch>
                 <a:fillRect/>
               </a:stretch>
@@ -15075,7 +17217,7 @@
       </mc:AlternateContent>
       <mc:AlternateContent xmlns:mc="http://schemas.openxmlformats.org/markup-compatibility/2006" xmlns:p14="http://schemas.microsoft.com/office/powerpoint/2010/main">
         <mc:Choice Requires="p14">
-          <p:contentPart p14:bwMode="auto" r:id="rId6">
+          <p:contentPart p14:bwMode="auto" r:id="rId7">
             <p14:nvContentPartPr>
               <p14:cNvPr id="9" name="Ink 8">
                 <a:extLst>
@@ -15107,7 +17249,7 @@
               <p:nvPr/>
             </p:nvPicPr>
             <p:blipFill>
-              <a:blip r:embed="rId7"/>
+              <a:blip r:embed="rId8"/>
               <a:stretch>
                 <a:fillRect/>
               </a:stretch>
@@ -15126,7 +17268,7 @@
       </mc:AlternateContent>
       <mc:AlternateContent xmlns:mc="http://schemas.openxmlformats.org/markup-compatibility/2006" xmlns:p14="http://schemas.microsoft.com/office/powerpoint/2010/main">
         <mc:Choice Requires="p14">
-          <p:contentPart p14:bwMode="auto" r:id="rId8">
+          <p:contentPart p14:bwMode="auto" r:id="rId9">
             <p14:nvContentPartPr>
               <p14:cNvPr id="10" name="Ink 9">
                 <a:extLst>
@@ -15158,7 +17300,7 @@
               <p:nvPr/>
             </p:nvPicPr>
             <p:blipFill>
-              <a:blip r:embed="rId9"/>
+              <a:blip r:embed="rId10"/>
               <a:stretch>
                 <a:fillRect/>
               </a:stretch>
@@ -15189,117 +17331,15 @@
         </p:nvGrpSpPr>
         <p:grpSpPr>
           <a:xfrm>
-            <a:off x="3140385" y="2990059"/>
-            <a:ext cx="501840" cy="320760"/>
-            <a:chOff x="3140385" y="2990059"/>
-            <a:chExt cx="501840" cy="320760"/>
+            <a:off x="3140385" y="3160699"/>
+            <a:ext cx="270360" cy="150120"/>
+            <a:chOff x="3140385" y="3160699"/>
+            <a:chExt cx="270360" cy="150120"/>
           </a:xfrm>
         </p:grpSpPr>
         <mc:AlternateContent xmlns:mc="http://schemas.openxmlformats.org/markup-compatibility/2006" xmlns:p14="http://schemas.microsoft.com/office/powerpoint/2010/main">
           <mc:Choice Requires="p14">
-            <p:contentPart p14:bwMode="auto" r:id="rId10">
-              <p14:nvContentPartPr>
-                <p14:cNvPr id="12" name="Ink 11">
-                  <a:extLst>
-                    <a:ext uri="{FF2B5EF4-FFF2-40B4-BE49-F238E27FC236}">
-                      <a16:creationId xmlns:a16="http://schemas.microsoft.com/office/drawing/2014/main" id="{4B818534-5AAD-1FFD-0DF7-5959412E6A46}"/>
-                    </a:ext>
-                  </a:extLst>
-                </p14:cNvPr>
-                <p14:cNvContentPartPr/>
-                <p14:nvPr/>
-              </p14:nvContentPartPr>
-              <p14:xfrm>
-                <a:off x="3461145" y="2990059"/>
-                <a:ext cx="181080" cy="246240"/>
-              </p14:xfrm>
-            </p:contentPart>
-          </mc:Choice>
-          <mc:Fallback xmlns="">
-            <p:pic>
-              <p:nvPicPr>
-                <p:cNvPr id="12" name="Ink 11">
-                  <a:extLst>
-                    <a:ext uri="{FF2B5EF4-FFF2-40B4-BE49-F238E27FC236}">
-                      <a16:creationId xmlns:a16="http://schemas.microsoft.com/office/drawing/2014/main" id="{4B818534-5AAD-1FFD-0DF7-5959412E6A46}"/>
-                    </a:ext>
-                  </a:extLst>
-                </p:cNvPr>
-                <p:cNvPicPr/>
-                <p:nvPr/>
-              </p:nvPicPr>
-              <p:blipFill>
-                <a:blip r:embed="rId11"/>
-                <a:stretch>
-                  <a:fillRect/>
-                </a:stretch>
-              </p:blipFill>
-              <p:spPr>
-                <a:xfrm>
-                  <a:off x="3452145" y="2981059"/>
-                  <a:ext cx="198720" cy="263880"/>
-                </a:xfrm>
-                <a:prstGeom prst="rect">
-                  <a:avLst/>
-                </a:prstGeom>
-              </p:spPr>
-            </p:pic>
-          </mc:Fallback>
-        </mc:AlternateContent>
-        <mc:AlternateContent xmlns:mc="http://schemas.openxmlformats.org/markup-compatibility/2006" xmlns:p14="http://schemas.microsoft.com/office/powerpoint/2010/main">
-          <mc:Choice Requires="p14">
-            <p:contentPart p14:bwMode="auto" r:id="rId12">
-              <p14:nvContentPartPr>
-                <p14:cNvPr id="14" name="Ink 13">
-                  <a:extLst>
-                    <a:ext uri="{FF2B5EF4-FFF2-40B4-BE49-F238E27FC236}">
-                      <a16:creationId xmlns:a16="http://schemas.microsoft.com/office/drawing/2014/main" id="{DC2E5383-897A-B875-B278-F7E63166A62A}"/>
-                    </a:ext>
-                  </a:extLst>
-                </p14:cNvPr>
-                <p14:cNvContentPartPr/>
-                <p14:nvPr/>
-              </p14:nvContentPartPr>
-              <p14:xfrm>
-                <a:off x="3288705" y="3033979"/>
-                <a:ext cx="2520" cy="720"/>
-              </p14:xfrm>
-            </p:contentPart>
-          </mc:Choice>
-          <mc:Fallback xmlns="">
-            <p:pic>
-              <p:nvPicPr>
-                <p:cNvPr id="14" name="Ink 13">
-                  <a:extLst>
-                    <a:ext uri="{FF2B5EF4-FFF2-40B4-BE49-F238E27FC236}">
-                      <a16:creationId xmlns:a16="http://schemas.microsoft.com/office/drawing/2014/main" id="{DC2E5383-897A-B875-B278-F7E63166A62A}"/>
-                    </a:ext>
-                  </a:extLst>
-                </p:cNvPr>
-                <p:cNvPicPr/>
-                <p:nvPr/>
-              </p:nvPicPr>
-              <p:blipFill>
-                <a:blip r:embed="rId13"/>
-                <a:stretch>
-                  <a:fillRect/>
-                </a:stretch>
-              </p:blipFill>
-              <p:spPr>
-                <a:xfrm>
-                  <a:off x="3280065" y="3025339"/>
-                  <a:ext cx="20160" cy="18360"/>
-                </a:xfrm>
-                <a:prstGeom prst="rect">
-                  <a:avLst/>
-                </a:prstGeom>
-              </p:spPr>
-            </p:pic>
-          </mc:Fallback>
-        </mc:AlternateContent>
-        <mc:AlternateContent xmlns:mc="http://schemas.openxmlformats.org/markup-compatibility/2006" xmlns:p14="http://schemas.microsoft.com/office/powerpoint/2010/main">
-          <mc:Choice Requires="p14">
-            <p:contentPart p14:bwMode="auto" r:id="rId14">
+            <p:contentPart p14:bwMode="auto" r:id="rId11">
               <p14:nvContentPartPr>
                 <p14:cNvPr id="15" name="Ink 14">
                   <a:extLst>
@@ -15350,7 +17390,7 @@
         </mc:AlternateContent>
         <mc:AlternateContent xmlns:mc="http://schemas.openxmlformats.org/markup-compatibility/2006" xmlns:p14="http://schemas.microsoft.com/office/powerpoint/2010/main">
           <mc:Choice Requires="p14">
-            <p:contentPart p14:bwMode="auto" r:id="rId15">
+            <p:contentPart p14:bwMode="auto" r:id="rId14">
               <p14:nvContentPartPr>
                 <p14:cNvPr id="16" name="Ink 15">
                   <a:extLst>
@@ -15401,7 +17441,7 @@
         </mc:AlternateContent>
         <mc:AlternateContent xmlns:mc="http://schemas.openxmlformats.org/markup-compatibility/2006" xmlns:p14="http://schemas.microsoft.com/office/powerpoint/2010/main">
           <mc:Choice Requires="p14">
-            <p:contentPart p14:bwMode="auto" r:id="rId16">
+            <p:contentPart p14:bwMode="auto" r:id="rId15">
               <p14:nvContentPartPr>
                 <p14:cNvPr id="17" name="Ink 16">
                   <a:extLst>
@@ -15452,58 +17492,7 @@
         </mc:AlternateContent>
         <mc:AlternateContent xmlns:mc="http://schemas.openxmlformats.org/markup-compatibility/2006" xmlns:p14="http://schemas.microsoft.com/office/powerpoint/2010/main">
           <mc:Choice Requires="p14">
-            <p:contentPart p14:bwMode="auto" r:id="rId17">
-              <p14:nvContentPartPr>
-                <p14:cNvPr id="22" name="Ink 21">
-                  <a:extLst>
-                    <a:ext uri="{FF2B5EF4-FFF2-40B4-BE49-F238E27FC236}">
-                      <a16:creationId xmlns:a16="http://schemas.microsoft.com/office/drawing/2014/main" id="{1B7C8F2C-71E1-CAFC-232D-9AD1AF501DC1}"/>
-                    </a:ext>
-                  </a:extLst>
-                </p14:cNvPr>
-                <p14:cNvContentPartPr/>
-                <p14:nvPr/>
-              </p14:nvContentPartPr>
-              <p14:xfrm>
-                <a:off x="3465465" y="3179419"/>
-                <a:ext cx="360" cy="360"/>
-              </p14:xfrm>
-            </p:contentPart>
-          </mc:Choice>
-          <mc:Fallback xmlns="">
-            <p:pic>
-              <p:nvPicPr>
-                <p:cNvPr id="22" name="Ink 21">
-                  <a:extLst>
-                    <a:ext uri="{FF2B5EF4-FFF2-40B4-BE49-F238E27FC236}">
-                      <a16:creationId xmlns:a16="http://schemas.microsoft.com/office/drawing/2014/main" id="{1B7C8F2C-71E1-CAFC-232D-9AD1AF501DC1}"/>
-                    </a:ext>
-                  </a:extLst>
-                </p:cNvPr>
-                <p:cNvPicPr/>
-                <p:nvPr/>
-              </p:nvPicPr>
-              <p:blipFill>
-                <a:blip r:embed="rId13"/>
-                <a:stretch>
-                  <a:fillRect/>
-                </a:stretch>
-              </p:blipFill>
-              <p:spPr>
-                <a:xfrm>
-                  <a:off x="3456825" y="3170779"/>
-                  <a:ext cx="18000" cy="18000"/>
-                </a:xfrm>
-                <a:prstGeom prst="rect">
-                  <a:avLst/>
-                </a:prstGeom>
-              </p:spPr>
-            </p:pic>
-          </mc:Fallback>
-        </mc:AlternateContent>
-        <mc:AlternateContent xmlns:mc="http://schemas.openxmlformats.org/markup-compatibility/2006" xmlns:p14="http://schemas.microsoft.com/office/powerpoint/2010/main">
-          <mc:Choice Requires="p14">
-            <p:contentPart p14:bwMode="auto" r:id="rId18">
+            <p:contentPart p14:bwMode="auto" r:id="rId16">
               <p14:nvContentPartPr>
                 <p14:cNvPr id="23" name="Ink 22">
                   <a:extLst>
@@ -15554,7 +17543,7 @@
         </mc:AlternateContent>
         <mc:AlternateContent xmlns:mc="http://schemas.openxmlformats.org/markup-compatibility/2006" xmlns:p14="http://schemas.microsoft.com/office/powerpoint/2010/main">
           <mc:Choice Requires="p14">
-            <p:contentPart p14:bwMode="auto" r:id="rId19">
+            <p:contentPart p14:bwMode="auto" r:id="rId17">
               <p14:nvContentPartPr>
                 <p14:cNvPr id="24" name="Ink 23">
                   <a:extLst>
@@ -16025,6 +18014,57 @@
               <a:xfrm>
                 <a:off x="3231003" y="3747009"/>
                 <a:ext cx="33120" cy="32760"/>
+              </a:xfrm>
+              <a:prstGeom prst="rect">
+                <a:avLst/>
+              </a:prstGeom>
+            </p:spPr>
+          </p:pic>
+        </mc:Fallback>
+      </mc:AlternateContent>
+      <mc:AlternateContent xmlns:mc="http://schemas.openxmlformats.org/markup-compatibility/2006">
+        <mc:Choice xmlns:p14="http://schemas.microsoft.com/office/powerpoint/2010/main" Requires="p14">
+          <p:contentPart p14:bwMode="auto" r:id="rId34">
+            <p14:nvContentPartPr>
+              <p14:cNvPr id="5" name="Ink 4">
+                <a:extLst>
+                  <a:ext uri="{FF2B5EF4-FFF2-40B4-BE49-F238E27FC236}">
+                    <a16:creationId xmlns:a16="http://schemas.microsoft.com/office/drawing/2014/main" id="{5D7FC986-5427-3FC6-EDCF-53E570FC13F5}"/>
+                  </a:ext>
+                </a:extLst>
+              </p14:cNvPr>
+              <p14:cNvContentPartPr/>
+              <p14:nvPr/>
+            </p14:nvContentPartPr>
+            <p14:xfrm>
+              <a:off x="3261951" y="2963420"/>
+              <a:ext cx="421920" cy="372600"/>
+            </p14:xfrm>
+          </p:contentPart>
+        </mc:Choice>
+        <mc:Fallback>
+          <p:pic>
+            <p:nvPicPr>
+              <p:cNvPr id="5" name="Ink 4">
+                <a:extLst>
+                  <a:ext uri="{FF2B5EF4-FFF2-40B4-BE49-F238E27FC236}">
+                    <a16:creationId xmlns:a16="http://schemas.microsoft.com/office/drawing/2014/main" id="{5D7FC986-5427-3FC6-EDCF-53E570FC13F5}"/>
+                  </a:ext>
+                </a:extLst>
+              </p:cNvPr>
+              <p:cNvPicPr/>
+              <p:nvPr/>
+            </p:nvPicPr>
+            <p:blipFill>
+              <a:blip r:embed="rId35"/>
+              <a:stretch>
+                <a:fillRect/>
+              </a:stretch>
+            </p:blipFill>
+            <p:spPr>
+              <a:xfrm>
+                <a:off x="3253311" y="2954420"/>
+                <a:ext cx="439560" cy="390240"/>
               </a:xfrm>
               <a:prstGeom prst="rect">
                 <a:avLst/>
@@ -29517,8 +31557,8 @@
           </p:style>
         </p:cxnSp>
       </p:grpSp>
-      <mc:AlternateContent xmlns:mc="http://schemas.openxmlformats.org/markup-compatibility/2006">
-        <mc:Choice xmlns:p14="http://schemas.microsoft.com/office/powerpoint/2010/main" Requires="p14">
+      <mc:AlternateContent xmlns:mc="http://schemas.openxmlformats.org/markup-compatibility/2006" xmlns:p14="http://schemas.microsoft.com/office/powerpoint/2010/main">
+        <mc:Choice Requires="p14">
           <p:contentPart p14:bwMode="auto" r:id="rId2">
             <p14:nvContentPartPr>
               <p14:cNvPr id="26" name="Ink 25">
@@ -29537,7 +31577,7 @@
             </p14:xfrm>
           </p:contentPart>
         </mc:Choice>
-        <mc:Fallback>
+        <mc:Fallback xmlns="">
           <p:pic>
             <p:nvPicPr>
               <p:cNvPr id="26" name="Ink 25">
@@ -29568,8 +31608,8 @@
           </p:pic>
         </mc:Fallback>
       </mc:AlternateContent>
-      <mc:AlternateContent xmlns:mc="http://schemas.openxmlformats.org/markup-compatibility/2006">
-        <mc:Choice xmlns:p14="http://schemas.microsoft.com/office/powerpoint/2010/main" Requires="p14">
+      <mc:AlternateContent xmlns:mc="http://schemas.openxmlformats.org/markup-compatibility/2006" xmlns:p14="http://schemas.microsoft.com/office/powerpoint/2010/main">
+        <mc:Choice Requires="p14">
           <p:contentPart p14:bwMode="auto" r:id="rId4">
             <p14:nvContentPartPr>
               <p14:cNvPr id="32" name="Ink 31">
@@ -29588,7 +31628,7 @@
             </p14:xfrm>
           </p:contentPart>
         </mc:Choice>
-        <mc:Fallback>
+        <mc:Fallback xmlns="">
           <p:pic>
             <p:nvPicPr>
               <p:cNvPr id="32" name="Ink 31">
@@ -29619,8 +31659,8 @@
           </p:pic>
         </mc:Fallback>
       </mc:AlternateContent>
-      <mc:AlternateContent xmlns:mc="http://schemas.openxmlformats.org/markup-compatibility/2006">
-        <mc:Choice xmlns:p14="http://schemas.microsoft.com/office/powerpoint/2010/main" Requires="p14">
+      <mc:AlternateContent xmlns:mc="http://schemas.openxmlformats.org/markup-compatibility/2006" xmlns:p14="http://schemas.microsoft.com/office/powerpoint/2010/main">
+        <mc:Choice Requires="p14">
           <p:contentPart p14:bwMode="auto" r:id="rId6">
             <p14:nvContentPartPr>
               <p14:cNvPr id="33" name="Ink 32">
@@ -29639,7 +31679,7 @@
             </p14:xfrm>
           </p:contentPart>
         </mc:Choice>
-        <mc:Fallback>
+        <mc:Fallback xmlns="">
           <p:pic>
             <p:nvPicPr>
               <p:cNvPr id="33" name="Ink 32">
@@ -29670,8 +31710,8 @@
           </p:pic>
         </mc:Fallback>
       </mc:AlternateContent>
-      <mc:AlternateContent xmlns:mc="http://schemas.openxmlformats.org/markup-compatibility/2006">
-        <mc:Choice xmlns:p14="http://schemas.microsoft.com/office/powerpoint/2010/main" Requires="p14">
+      <mc:AlternateContent xmlns:mc="http://schemas.openxmlformats.org/markup-compatibility/2006" xmlns:p14="http://schemas.microsoft.com/office/powerpoint/2010/main">
+        <mc:Choice Requires="p14">
           <p:contentPart p14:bwMode="auto" r:id="rId8">
             <p14:nvContentPartPr>
               <p14:cNvPr id="34" name="Ink 33">
@@ -29690,7 +31730,7 @@
             </p14:xfrm>
           </p:contentPart>
         </mc:Choice>
-        <mc:Fallback>
+        <mc:Fallback xmlns="">
           <p:pic>
             <p:nvPicPr>
               <p:cNvPr id="34" name="Ink 33">
@@ -29721,8 +31761,8 @@
           </p:pic>
         </mc:Fallback>
       </mc:AlternateContent>
-      <mc:AlternateContent xmlns:mc="http://schemas.openxmlformats.org/markup-compatibility/2006">
-        <mc:Choice xmlns:p14="http://schemas.microsoft.com/office/powerpoint/2010/main" Requires="p14">
+      <mc:AlternateContent xmlns:mc="http://schemas.openxmlformats.org/markup-compatibility/2006" xmlns:p14="http://schemas.microsoft.com/office/powerpoint/2010/main">
+        <mc:Choice Requires="p14">
           <p:contentPart p14:bwMode="auto" r:id="rId10">
             <p14:nvContentPartPr>
               <p14:cNvPr id="35" name="Ink 34">
@@ -29741,7 +31781,7 @@
             </p14:xfrm>
           </p:contentPart>
         </mc:Choice>
-        <mc:Fallback>
+        <mc:Fallback xmlns="">
           <p:pic>
             <p:nvPicPr>
               <p:cNvPr id="35" name="Ink 34">
@@ -29772,8 +31812,8 @@
           </p:pic>
         </mc:Fallback>
       </mc:AlternateContent>
-      <mc:AlternateContent xmlns:mc="http://schemas.openxmlformats.org/markup-compatibility/2006">
-        <mc:Choice xmlns:p14="http://schemas.microsoft.com/office/powerpoint/2010/main" Requires="p14">
+      <mc:AlternateContent xmlns:mc="http://schemas.openxmlformats.org/markup-compatibility/2006" xmlns:p14="http://schemas.microsoft.com/office/powerpoint/2010/main">
+        <mc:Choice Requires="p14">
           <p:contentPart p14:bwMode="auto" r:id="rId12">
             <p14:nvContentPartPr>
               <p14:cNvPr id="36" name="Ink 35">
@@ -29792,7 +31832,7 @@
             </p14:xfrm>
           </p:contentPart>
         </mc:Choice>
-        <mc:Fallback>
+        <mc:Fallback xmlns="">
           <p:pic>
             <p:nvPicPr>
               <p:cNvPr id="36" name="Ink 35">
@@ -30129,4 +32169,299 @@
     </a:ext>
   </a:extLst>
 </a:theme>
+</file>
+
+<file path=ppt/theme/theme2.xml><?xml version="1.0" encoding="utf-8"?>
+<a:theme xmlns:a="http://schemas.openxmlformats.org/drawingml/2006/main" name="Office Theme">
+  <a:themeElements>
+    <a:clrScheme name="Office">
+      <a:dk1>
+        <a:sysClr val="windowText" lastClr="000000"/>
+      </a:dk1>
+      <a:lt1>
+        <a:sysClr val="window" lastClr="FFFFFF"/>
+      </a:lt1>
+      <a:dk2>
+        <a:srgbClr val="44546A"/>
+      </a:dk2>
+      <a:lt2>
+        <a:srgbClr val="E7E6E6"/>
+      </a:lt2>
+      <a:accent1>
+        <a:srgbClr val="4472C4"/>
+      </a:accent1>
+      <a:accent2>
+        <a:srgbClr val="ED7D31"/>
+      </a:accent2>
+      <a:accent3>
+        <a:srgbClr val="A5A5A5"/>
+      </a:accent3>
+      <a:accent4>
+        <a:srgbClr val="FFC000"/>
+      </a:accent4>
+      <a:accent5>
+        <a:srgbClr val="5B9BD5"/>
+      </a:accent5>
+      <a:accent6>
+        <a:srgbClr val="70AD47"/>
+      </a:accent6>
+      <a:hlink>
+        <a:srgbClr val="0563C1"/>
+      </a:hlink>
+      <a:folHlink>
+        <a:srgbClr val="954F72"/>
+      </a:folHlink>
+    </a:clrScheme>
+    <a:fontScheme name="Office">
+      <a:majorFont>
+        <a:latin typeface="Calibri Light" panose="020F0302020204030204"/>
+        <a:ea typeface=""/>
+        <a:cs typeface=""/>
+        <a:font script="Jpan" typeface="游ゴシック Light"/>
+        <a:font script="Hang" typeface="맑은 고딕"/>
+        <a:font script="Hans" typeface="等线 Light"/>
+        <a:font script="Hant" typeface="新細明體"/>
+        <a:font script="Arab" typeface="Times New Roman"/>
+        <a:font script="Hebr" typeface="Times New Roman"/>
+        <a:font script="Thai" typeface="Angsana New"/>
+        <a:font script="Ethi" typeface="Nyala"/>
+        <a:font script="Beng" typeface="Vrinda"/>
+        <a:font script="Gujr" typeface="Shruti"/>
+        <a:font script="Khmr" typeface="MoolBoran"/>
+        <a:font script="Knda" typeface="Tunga"/>
+        <a:font script="Guru" typeface="Raavi"/>
+        <a:font script="Cans" typeface="Euphemia"/>
+        <a:font script="Cher" typeface="Plantagenet Cherokee"/>
+        <a:font script="Yiii" typeface="Microsoft Yi Baiti"/>
+        <a:font script="Tibt" typeface="Microsoft Himalaya"/>
+        <a:font script="Thaa" typeface="MV Boli"/>
+        <a:font script="Deva" typeface="Mangal"/>
+        <a:font script="Telu" typeface="Gautami"/>
+        <a:font script="Taml" typeface="Latha"/>
+        <a:font script="Syrc" typeface="Estrangelo Edessa"/>
+        <a:font script="Orya" typeface="Kalinga"/>
+        <a:font script="Mlym" typeface="Kartika"/>
+        <a:font script="Laoo" typeface="DokChampa"/>
+        <a:font script="Sinh" typeface="Iskoola Pota"/>
+        <a:font script="Mong" typeface="Mongolian Baiti"/>
+        <a:font script="Viet" typeface="Times New Roman"/>
+        <a:font script="Uigh" typeface="Microsoft Uighur"/>
+        <a:font script="Geor" typeface="Sylfaen"/>
+        <a:font script="Armn" typeface="Arial"/>
+        <a:font script="Bugi" typeface="Leelawadee UI"/>
+        <a:font script="Bopo" typeface="Microsoft JhengHei"/>
+        <a:font script="Java" typeface="Javanese Text"/>
+        <a:font script="Lisu" typeface="Segoe UI"/>
+        <a:font script="Mymr" typeface="Myanmar Text"/>
+        <a:font script="Nkoo" typeface="Ebrima"/>
+        <a:font script="Olck" typeface="Nirmala UI"/>
+        <a:font script="Osma" typeface="Ebrima"/>
+        <a:font script="Phag" typeface="Phagspa"/>
+        <a:font script="Syrn" typeface="Estrangelo Edessa"/>
+        <a:font script="Syrj" typeface="Estrangelo Edessa"/>
+        <a:font script="Syre" typeface="Estrangelo Edessa"/>
+        <a:font script="Sora" typeface="Nirmala UI"/>
+        <a:font script="Tale" typeface="Microsoft Tai Le"/>
+        <a:font script="Talu" typeface="Microsoft New Tai Lue"/>
+        <a:font script="Tfng" typeface="Ebrima"/>
+      </a:majorFont>
+      <a:minorFont>
+        <a:latin typeface="Calibri" panose="020F0502020204030204"/>
+        <a:ea typeface=""/>
+        <a:cs typeface=""/>
+        <a:font script="Jpan" typeface="游ゴシック"/>
+        <a:font script="Hang" typeface="맑은 고딕"/>
+        <a:font script="Hans" typeface="等线"/>
+        <a:font script="Hant" typeface="新細明體"/>
+        <a:font script="Arab" typeface="Arial"/>
+        <a:font script="Hebr" typeface="Arial"/>
+        <a:font script="Thai" typeface="Cordia New"/>
+        <a:font script="Ethi" typeface="Nyala"/>
+        <a:font script="Beng" typeface="Vrinda"/>
+        <a:font script="Gujr" typeface="Shruti"/>
+        <a:font script="Khmr" typeface="DaunPenh"/>
+        <a:font script="Knda" typeface="Tunga"/>
+        <a:font script="Guru" typeface="Raavi"/>
+        <a:font script="Cans" typeface="Euphemia"/>
+        <a:font script="Cher" typeface="Plantagenet Cherokee"/>
+        <a:font script="Yiii" typeface="Microsoft Yi Baiti"/>
+        <a:font script="Tibt" typeface="Microsoft Himalaya"/>
+        <a:font script="Thaa" typeface="MV Boli"/>
+        <a:font script="Deva" typeface="Mangal"/>
+        <a:font script="Telu" typeface="Gautami"/>
+        <a:font script="Taml" typeface="Latha"/>
+        <a:font script="Syrc" typeface="Estrangelo Edessa"/>
+        <a:font script="Orya" typeface="Kalinga"/>
+        <a:font script="Mlym" typeface="Kartika"/>
+        <a:font script="Laoo" typeface="DokChampa"/>
+        <a:font script="Sinh" typeface="Iskoola Pota"/>
+        <a:font script="Mong" typeface="Mongolian Baiti"/>
+        <a:font script="Viet" typeface="Arial"/>
+        <a:font script="Uigh" typeface="Microsoft Uighur"/>
+        <a:font script="Geor" typeface="Sylfaen"/>
+        <a:font script="Armn" typeface="Arial"/>
+        <a:font script="Bugi" typeface="Leelawadee UI"/>
+        <a:font script="Bopo" typeface="Microsoft JhengHei"/>
+        <a:font script="Java" typeface="Javanese Text"/>
+        <a:font script="Lisu" typeface="Segoe UI"/>
+        <a:font script="Mymr" typeface="Myanmar Text"/>
+        <a:font script="Nkoo" typeface="Ebrima"/>
+        <a:font script="Olck" typeface="Nirmala UI"/>
+        <a:font script="Osma" typeface="Ebrima"/>
+        <a:font script="Phag" typeface="Phagspa"/>
+        <a:font script="Syrn" typeface="Estrangelo Edessa"/>
+        <a:font script="Syrj" typeface="Estrangelo Edessa"/>
+        <a:font script="Syre" typeface="Estrangelo Edessa"/>
+        <a:font script="Sora" typeface="Nirmala UI"/>
+        <a:font script="Tale" typeface="Microsoft Tai Le"/>
+        <a:font script="Talu" typeface="Microsoft New Tai Lue"/>
+        <a:font script="Tfng" typeface="Ebrima"/>
+      </a:minorFont>
+    </a:fontScheme>
+    <a:fmtScheme name="Office">
+      <a:fillStyleLst>
+        <a:solidFill>
+          <a:schemeClr val="phClr"/>
+        </a:solidFill>
+        <a:gradFill rotWithShape="1">
+          <a:gsLst>
+            <a:gs pos="0">
+              <a:schemeClr val="phClr">
+                <a:lumMod val="110000"/>
+                <a:satMod val="105000"/>
+                <a:tint val="67000"/>
+              </a:schemeClr>
+            </a:gs>
+            <a:gs pos="50000">
+              <a:schemeClr val="phClr">
+                <a:lumMod val="105000"/>
+                <a:satMod val="103000"/>
+                <a:tint val="73000"/>
+              </a:schemeClr>
+            </a:gs>
+            <a:gs pos="100000">
+              <a:schemeClr val="phClr">
+                <a:lumMod val="105000"/>
+                <a:satMod val="109000"/>
+                <a:tint val="81000"/>
+              </a:schemeClr>
+            </a:gs>
+          </a:gsLst>
+          <a:lin ang="5400000" scaled="0"/>
+        </a:gradFill>
+        <a:gradFill rotWithShape="1">
+          <a:gsLst>
+            <a:gs pos="0">
+              <a:schemeClr val="phClr">
+                <a:satMod val="103000"/>
+                <a:lumMod val="102000"/>
+                <a:tint val="94000"/>
+              </a:schemeClr>
+            </a:gs>
+            <a:gs pos="50000">
+              <a:schemeClr val="phClr">
+                <a:satMod val="110000"/>
+                <a:lumMod val="100000"/>
+                <a:shade val="100000"/>
+              </a:schemeClr>
+            </a:gs>
+            <a:gs pos="100000">
+              <a:schemeClr val="phClr">
+                <a:lumMod val="99000"/>
+                <a:satMod val="120000"/>
+                <a:shade val="78000"/>
+              </a:schemeClr>
+            </a:gs>
+          </a:gsLst>
+          <a:lin ang="5400000" scaled="0"/>
+        </a:gradFill>
+      </a:fillStyleLst>
+      <a:lnStyleLst>
+        <a:ln w="6350" cap="flat" cmpd="sng" algn="ctr">
+          <a:solidFill>
+            <a:schemeClr val="phClr"/>
+          </a:solidFill>
+          <a:prstDash val="solid"/>
+          <a:miter lim="800000"/>
+        </a:ln>
+        <a:ln w="12700" cap="flat" cmpd="sng" algn="ctr">
+          <a:solidFill>
+            <a:schemeClr val="phClr"/>
+          </a:solidFill>
+          <a:prstDash val="solid"/>
+          <a:miter lim="800000"/>
+        </a:ln>
+        <a:ln w="19050" cap="flat" cmpd="sng" algn="ctr">
+          <a:solidFill>
+            <a:schemeClr val="phClr"/>
+          </a:solidFill>
+          <a:prstDash val="solid"/>
+          <a:miter lim="800000"/>
+        </a:ln>
+      </a:lnStyleLst>
+      <a:effectStyleLst>
+        <a:effectStyle>
+          <a:effectLst/>
+        </a:effectStyle>
+        <a:effectStyle>
+          <a:effectLst/>
+        </a:effectStyle>
+        <a:effectStyle>
+          <a:effectLst>
+            <a:outerShdw blurRad="57150" dist="19050" dir="5400000" algn="ctr" rotWithShape="0">
+              <a:srgbClr val="000000">
+                <a:alpha val="63000"/>
+              </a:srgbClr>
+            </a:outerShdw>
+          </a:effectLst>
+        </a:effectStyle>
+      </a:effectStyleLst>
+      <a:bgFillStyleLst>
+        <a:solidFill>
+          <a:schemeClr val="phClr"/>
+        </a:solidFill>
+        <a:solidFill>
+          <a:schemeClr val="phClr">
+            <a:tint val="95000"/>
+            <a:satMod val="170000"/>
+          </a:schemeClr>
+        </a:solidFill>
+        <a:gradFill rotWithShape="1">
+          <a:gsLst>
+            <a:gs pos="0">
+              <a:schemeClr val="phClr">
+                <a:tint val="93000"/>
+                <a:satMod val="150000"/>
+                <a:shade val="98000"/>
+                <a:lumMod val="102000"/>
+              </a:schemeClr>
+            </a:gs>
+            <a:gs pos="50000">
+              <a:schemeClr val="phClr">
+                <a:tint val="98000"/>
+                <a:satMod val="130000"/>
+                <a:shade val="90000"/>
+                <a:lumMod val="103000"/>
+              </a:schemeClr>
+            </a:gs>
+            <a:gs pos="100000">
+              <a:schemeClr val="phClr">
+                <a:shade val="63000"/>
+                <a:satMod val="120000"/>
+              </a:schemeClr>
+            </a:gs>
+          </a:gsLst>
+          <a:lin ang="5400000" scaled="0"/>
+        </a:gradFill>
+      </a:bgFillStyleLst>
+    </a:fmtScheme>
+  </a:themeElements>
+  <a:objectDefaults/>
+  <a:extraClrSchemeLst/>
+  <a:extLst>
+    <a:ext uri="{05A4C25C-085E-4340-85A3-A5531E510DB2}">
+      <thm15:themeFamily xmlns:thm15="http://schemas.microsoft.com/office/thememl/2012/main" name="Office Theme" id="{62F939B6-93AF-4DB8-9C6B-D6C7DFDC589F}" vid="{4A3C46E8-61CC-4603-A589-7422A47A8E4A}"/>
+    </a:ext>
+  </a:extLst>
+</a:theme>
 </file>
</xml_diff>